<commit_message>
added layouts upto 4 elements
</commit_message>
<xml_diff>
--- a/code/assets/layouts/layouts.pptx
+++ b/code/assets/layouts/layouts.pptx
@@ -7,13 +7,16 @@
   <p:sldIdLst>
     <p:sldId id="257" r:id="rId2"/>
     <p:sldId id="265" r:id="rId3"/>
-    <p:sldId id="256" r:id="rId4"/>
-    <p:sldId id="259" r:id="rId5"/>
+    <p:sldId id="259" r:id="rId4"/>
+    <p:sldId id="256" r:id="rId5"/>
     <p:sldId id="260" r:id="rId6"/>
-    <p:sldId id="261" r:id="rId7"/>
-    <p:sldId id="262" r:id="rId8"/>
-    <p:sldId id="263" r:id="rId9"/>
-    <p:sldId id="264" r:id="rId10"/>
+    <p:sldId id="266" r:id="rId7"/>
+    <p:sldId id="267" r:id="rId8"/>
+    <p:sldId id="261" r:id="rId9"/>
+    <p:sldId id="262" r:id="rId10"/>
+    <p:sldId id="263" r:id="rId11"/>
+    <p:sldId id="264" r:id="rId12"/>
+    <p:sldId id="268" r:id="rId13"/>
   </p:sldIdLst>
   <p:sldSz cx="9144000" cy="6858000" type="screen4x3"/>
   <p:notesSz cx="6858000" cy="9144000"/>
@@ -310,7 +313,7 @@
           <a:p>
             <a:fld id="{5BCAD085-E8A6-8845-BD4E-CB4CCA059FC4}" type="datetimeFigureOut">
               <a:rPr lang="en-US" smtClean="0"/>
-              <a:t>3/7/2024</a:t>
+              <a:t>3/13/2024</a:t>
             </a:fld>
             <a:endParaRPr lang="en-US"/>
           </a:p>
@@ -478,7 +481,7 @@
           <a:p>
             <a:fld id="{5BCAD085-E8A6-8845-BD4E-CB4CCA059FC4}" type="datetimeFigureOut">
               <a:rPr lang="en-US" smtClean="0"/>
-              <a:t>3/7/2024</a:t>
+              <a:t>3/13/2024</a:t>
             </a:fld>
             <a:endParaRPr lang="en-US"/>
           </a:p>
@@ -656,7 +659,7 @@
           <a:p>
             <a:fld id="{5BCAD085-E8A6-8845-BD4E-CB4CCA059FC4}" type="datetimeFigureOut">
               <a:rPr lang="en-US" smtClean="0"/>
-              <a:t>3/7/2024</a:t>
+              <a:t>3/13/2024</a:t>
             </a:fld>
             <a:endParaRPr lang="en-US"/>
           </a:p>
@@ -824,7 +827,7 @@
           <a:p>
             <a:fld id="{5BCAD085-E8A6-8845-BD4E-CB4CCA059FC4}" type="datetimeFigureOut">
               <a:rPr lang="en-US" smtClean="0"/>
-              <a:t>3/7/2024</a:t>
+              <a:t>3/13/2024</a:t>
             </a:fld>
             <a:endParaRPr lang="en-US"/>
           </a:p>
@@ -1069,7 +1072,7 @@
           <a:p>
             <a:fld id="{5BCAD085-E8A6-8845-BD4E-CB4CCA059FC4}" type="datetimeFigureOut">
               <a:rPr lang="en-US" smtClean="0"/>
-              <a:t>3/7/2024</a:t>
+              <a:t>3/13/2024</a:t>
             </a:fld>
             <a:endParaRPr lang="en-US"/>
           </a:p>
@@ -1354,7 +1357,7 @@
           <a:p>
             <a:fld id="{5BCAD085-E8A6-8845-BD4E-CB4CCA059FC4}" type="datetimeFigureOut">
               <a:rPr lang="en-US" smtClean="0"/>
-              <a:t>3/7/2024</a:t>
+              <a:t>3/13/2024</a:t>
             </a:fld>
             <a:endParaRPr lang="en-US"/>
           </a:p>
@@ -1773,7 +1776,7 @@
           <a:p>
             <a:fld id="{5BCAD085-E8A6-8845-BD4E-CB4CCA059FC4}" type="datetimeFigureOut">
               <a:rPr lang="en-US" smtClean="0"/>
-              <a:t>3/7/2024</a:t>
+              <a:t>3/13/2024</a:t>
             </a:fld>
             <a:endParaRPr lang="en-US"/>
           </a:p>
@@ -1890,7 +1893,7 @@
           <a:p>
             <a:fld id="{5BCAD085-E8A6-8845-BD4E-CB4CCA059FC4}" type="datetimeFigureOut">
               <a:rPr lang="en-US" smtClean="0"/>
-              <a:t>3/7/2024</a:t>
+              <a:t>3/13/2024</a:t>
             </a:fld>
             <a:endParaRPr lang="en-US"/>
           </a:p>
@@ -1985,7 +1988,7 @@
           <a:p>
             <a:fld id="{5BCAD085-E8A6-8845-BD4E-CB4CCA059FC4}" type="datetimeFigureOut">
               <a:rPr lang="en-US" smtClean="0"/>
-              <a:t>3/7/2024</a:t>
+              <a:t>3/13/2024</a:t>
             </a:fld>
             <a:endParaRPr lang="en-US"/>
           </a:p>
@@ -2260,7 +2263,7 @@
           <a:p>
             <a:fld id="{5BCAD085-E8A6-8845-BD4E-CB4CCA059FC4}" type="datetimeFigureOut">
               <a:rPr lang="en-US" smtClean="0"/>
-              <a:t>3/7/2024</a:t>
+              <a:t>3/13/2024</a:t>
             </a:fld>
             <a:endParaRPr lang="en-US"/>
           </a:p>
@@ -2512,7 +2515,7 @@
           <a:p>
             <a:fld id="{5BCAD085-E8A6-8845-BD4E-CB4CCA059FC4}" type="datetimeFigureOut">
               <a:rPr lang="en-US" smtClean="0"/>
-              <a:t>3/7/2024</a:t>
+              <a:t>3/13/2024</a:t>
             </a:fld>
             <a:endParaRPr lang="en-US"/>
           </a:p>
@@ -2723,7 +2726,7 @@
           <a:p>
             <a:fld id="{5BCAD085-E8A6-8845-BD4E-CB4CCA059FC4}" type="datetimeFigureOut">
               <a:rPr lang="en-US" smtClean="0"/>
-              <a:t>3/7/2024</a:t>
+              <a:t>3/13/2024</a:t>
             </a:fld>
             <a:endParaRPr lang="en-US"/>
           </a:p>
@@ -3153,6 +3156,957 @@
 </p:sld>
 </file>
 
+<file path=ppt/slides/slide10.xml><?xml version="1.0" encoding="utf-8"?>
+<p:sld xmlns:a="http://schemas.openxmlformats.org/drawingml/2006/main" xmlns:r="http://schemas.openxmlformats.org/officeDocument/2006/relationships" xmlns:p="http://schemas.openxmlformats.org/presentationml/2006/main">
+  <p:cSld>
+    <p:spTree>
+      <p:nvGrpSpPr>
+        <p:cNvPr id="1" name="">
+          <a:extLst>
+            <a:ext uri="{FF2B5EF4-FFF2-40B4-BE49-F238E27FC236}">
+              <a16:creationId xmlns:a16="http://schemas.microsoft.com/office/drawing/2014/main" id="{FD8A78F3-D0D0-5C8D-68F4-44127AC56C0C}"/>
+            </a:ext>
+          </a:extLst>
+        </p:cNvPr>
+        <p:cNvGrpSpPr/>
+        <p:nvPr/>
+      </p:nvGrpSpPr>
+      <p:grpSpPr>
+        <a:xfrm>
+          <a:off x="0" y="0"/>
+          <a:ext cx="0" cy="0"/>
+          <a:chOff x="0" y="0"/>
+          <a:chExt cx="0" cy="0"/>
+        </a:xfrm>
+      </p:grpSpPr>
+      <p:sp>
+        <p:nvSpPr>
+          <p:cNvPr id="2" name="Title 1">
+            <a:extLst>
+              <a:ext uri="{FF2B5EF4-FFF2-40B4-BE49-F238E27FC236}">
+                <a16:creationId xmlns:a16="http://schemas.microsoft.com/office/drawing/2014/main" id="{787B718D-9204-CCFF-BEC3-4BF9E55E542B}"/>
+              </a:ext>
+            </a:extLst>
+          </p:cNvPr>
+          <p:cNvSpPr>
+            <a:spLocks noGrp="1"/>
+          </p:cNvSpPr>
+          <p:nvPr>
+            <p:ph type="title"/>
+          </p:nvPr>
+        </p:nvSpPr>
+        <p:spPr>
+          <a:xfrm>
+            <a:off x="457201" y="342197"/>
+            <a:ext cx="8229600" cy="1143000"/>
+          </a:xfrm>
+          <a:solidFill>
+            <a:schemeClr val="accent4">
+              <a:lumMod val="20000"/>
+              <a:lumOff val="80000"/>
+            </a:schemeClr>
+          </a:solidFill>
+        </p:spPr>
+        <p:txBody>
+          <a:bodyPr/>
+          <a:lstStyle/>
+          <a:p>
+            <a:endParaRPr lang="en-IN" dirty="0"/>
+          </a:p>
+        </p:txBody>
+      </p:sp>
+      <p:sp>
+        <p:nvSpPr>
+          <p:cNvPr id="4" name="TextBox 3">
+            <a:extLst>
+              <a:ext uri="{FF2B5EF4-FFF2-40B4-BE49-F238E27FC236}">
+                <a16:creationId xmlns:a16="http://schemas.microsoft.com/office/drawing/2014/main" id="{B6CCBFFB-EBFF-CBDB-2D01-CE3B04836125}"/>
+              </a:ext>
+            </a:extLst>
+          </p:cNvPr>
+          <p:cNvSpPr txBox="1"/>
+          <p:nvPr/>
+        </p:nvSpPr>
+        <p:spPr>
+          <a:xfrm>
+            <a:off x="457199" y="4318484"/>
+            <a:ext cx="4018548" cy="2308324"/>
+          </a:xfrm>
+          <a:prstGeom prst="rect">
+            <a:avLst/>
+          </a:prstGeom>
+          <a:solidFill>
+            <a:schemeClr val="bg2">
+              <a:lumMod val="90000"/>
+            </a:schemeClr>
+          </a:solidFill>
+        </p:spPr>
+        <p:txBody>
+          <a:bodyPr wrap="square" rtlCol="0">
+            <a:spAutoFit/>
+          </a:bodyPr>
+          <a:lstStyle/>
+          <a:p>
+            <a:endParaRPr lang="en-US" dirty="0"/>
+          </a:p>
+          <a:p>
+            <a:endParaRPr lang="en-IN" dirty="0"/>
+          </a:p>
+          <a:p>
+            <a:endParaRPr lang="en-IN" dirty="0"/>
+          </a:p>
+          <a:p>
+            <a:endParaRPr lang="en-IN" dirty="0"/>
+          </a:p>
+          <a:p>
+            <a:endParaRPr lang="en-IN" dirty="0"/>
+          </a:p>
+          <a:p>
+            <a:endParaRPr lang="en-IN" dirty="0"/>
+          </a:p>
+          <a:p>
+            <a:endParaRPr lang="en-IN" dirty="0"/>
+          </a:p>
+          <a:p>
+            <a:r>
+              <a:rPr lang="en-IN" dirty="0"/>
+              <a:t>4</a:t>
+            </a:r>
+          </a:p>
+        </p:txBody>
+      </p:sp>
+      <p:sp>
+        <p:nvSpPr>
+          <p:cNvPr id="6" name="TextBox 5">
+            <a:extLst>
+              <a:ext uri="{FF2B5EF4-FFF2-40B4-BE49-F238E27FC236}">
+                <a16:creationId xmlns:a16="http://schemas.microsoft.com/office/drawing/2014/main" id="{B8FC0409-2633-A65E-D5B6-0568F20DC12D}"/>
+              </a:ext>
+            </a:extLst>
+          </p:cNvPr>
+          <p:cNvSpPr txBox="1"/>
+          <p:nvPr/>
+        </p:nvSpPr>
+        <p:spPr>
+          <a:xfrm>
+            <a:off x="457201" y="1692174"/>
+            <a:ext cx="4018546" cy="2308324"/>
+          </a:xfrm>
+          <a:prstGeom prst="rect">
+            <a:avLst/>
+          </a:prstGeom>
+          <a:solidFill>
+            <a:schemeClr val="accent1">
+              <a:lumMod val="20000"/>
+              <a:lumOff val="80000"/>
+            </a:schemeClr>
+          </a:solidFill>
+        </p:spPr>
+        <p:txBody>
+          <a:bodyPr wrap="square" rtlCol="0">
+            <a:spAutoFit/>
+          </a:bodyPr>
+          <a:lstStyle/>
+          <a:p>
+            <a:endParaRPr lang="en-US" dirty="0"/>
+          </a:p>
+          <a:p>
+            <a:endParaRPr lang="en-IN" dirty="0"/>
+          </a:p>
+          <a:p>
+            <a:endParaRPr lang="en-IN" dirty="0"/>
+          </a:p>
+          <a:p>
+            <a:endParaRPr lang="en-IN" dirty="0"/>
+          </a:p>
+          <a:p>
+            <a:endParaRPr lang="en-IN" dirty="0"/>
+          </a:p>
+          <a:p>
+            <a:endParaRPr lang="en-IN" dirty="0"/>
+          </a:p>
+          <a:p>
+            <a:endParaRPr lang="en-IN" dirty="0"/>
+          </a:p>
+          <a:p>
+            <a:r>
+              <a:rPr lang="en-IN" dirty="0"/>
+              <a:t>4</a:t>
+            </a:r>
+          </a:p>
+        </p:txBody>
+      </p:sp>
+      <p:sp>
+        <p:nvSpPr>
+          <p:cNvPr id="3" name="TextBox 2">
+            <a:extLst>
+              <a:ext uri="{FF2B5EF4-FFF2-40B4-BE49-F238E27FC236}">
+                <a16:creationId xmlns:a16="http://schemas.microsoft.com/office/drawing/2014/main" id="{0893CD41-C665-7211-BA83-10859F140BF9}"/>
+              </a:ext>
+            </a:extLst>
+          </p:cNvPr>
+          <p:cNvSpPr txBox="1"/>
+          <p:nvPr/>
+        </p:nvSpPr>
+        <p:spPr>
+          <a:xfrm>
+            <a:off x="4668253" y="1692174"/>
+            <a:ext cx="4018546" cy="2308324"/>
+          </a:xfrm>
+          <a:prstGeom prst="rect">
+            <a:avLst/>
+          </a:prstGeom>
+          <a:solidFill>
+            <a:schemeClr val="accent3">
+              <a:lumMod val="40000"/>
+              <a:lumOff val="60000"/>
+            </a:schemeClr>
+          </a:solidFill>
+        </p:spPr>
+        <p:txBody>
+          <a:bodyPr wrap="square" rtlCol="0">
+            <a:spAutoFit/>
+          </a:bodyPr>
+          <a:lstStyle/>
+          <a:p>
+            <a:endParaRPr lang="en-US" dirty="0"/>
+          </a:p>
+          <a:p>
+            <a:endParaRPr lang="en-IN" dirty="0"/>
+          </a:p>
+          <a:p>
+            <a:endParaRPr lang="en-IN" dirty="0"/>
+          </a:p>
+          <a:p>
+            <a:endParaRPr lang="en-IN" dirty="0"/>
+          </a:p>
+          <a:p>
+            <a:endParaRPr lang="en-IN" dirty="0"/>
+          </a:p>
+          <a:p>
+            <a:endParaRPr lang="en-IN" dirty="0"/>
+          </a:p>
+          <a:p>
+            <a:endParaRPr lang="en-IN" dirty="0"/>
+          </a:p>
+          <a:p>
+            <a:r>
+              <a:rPr lang="en-IN" dirty="0"/>
+              <a:t>4</a:t>
+            </a:r>
+          </a:p>
+        </p:txBody>
+      </p:sp>
+      <p:sp>
+        <p:nvSpPr>
+          <p:cNvPr id="7" name="TextBox 6">
+            <a:extLst>
+              <a:ext uri="{FF2B5EF4-FFF2-40B4-BE49-F238E27FC236}">
+                <a16:creationId xmlns:a16="http://schemas.microsoft.com/office/drawing/2014/main" id="{23A99C75-D42A-F902-FE17-9A2ADA643591}"/>
+              </a:ext>
+            </a:extLst>
+          </p:cNvPr>
+          <p:cNvSpPr txBox="1"/>
+          <p:nvPr/>
+        </p:nvSpPr>
+        <p:spPr>
+          <a:xfrm>
+            <a:off x="4668253" y="4318484"/>
+            <a:ext cx="4018548" cy="2308324"/>
+          </a:xfrm>
+          <a:prstGeom prst="rect">
+            <a:avLst/>
+          </a:prstGeom>
+          <a:solidFill>
+            <a:schemeClr val="accent5">
+              <a:lumMod val="20000"/>
+              <a:lumOff val="80000"/>
+            </a:schemeClr>
+          </a:solidFill>
+        </p:spPr>
+        <p:txBody>
+          <a:bodyPr wrap="square" rtlCol="0">
+            <a:spAutoFit/>
+          </a:bodyPr>
+          <a:lstStyle/>
+          <a:p>
+            <a:endParaRPr lang="en-US" dirty="0"/>
+          </a:p>
+          <a:p>
+            <a:endParaRPr lang="en-IN" dirty="0"/>
+          </a:p>
+          <a:p>
+            <a:endParaRPr lang="en-IN" dirty="0"/>
+          </a:p>
+          <a:p>
+            <a:endParaRPr lang="en-IN" dirty="0"/>
+          </a:p>
+          <a:p>
+            <a:endParaRPr lang="en-IN" dirty="0"/>
+          </a:p>
+          <a:p>
+            <a:endParaRPr lang="en-IN" dirty="0"/>
+          </a:p>
+          <a:p>
+            <a:endParaRPr lang="en-IN" dirty="0"/>
+          </a:p>
+          <a:p>
+            <a:r>
+              <a:rPr lang="en-IN" dirty="0"/>
+              <a:t>4</a:t>
+            </a:r>
+          </a:p>
+        </p:txBody>
+      </p:sp>
+    </p:spTree>
+    <p:extLst>
+      <p:ext uri="{BB962C8B-B14F-4D97-AF65-F5344CB8AC3E}">
+        <p14:creationId xmlns:p14="http://schemas.microsoft.com/office/powerpoint/2010/main" val="2923260744"/>
+      </p:ext>
+    </p:extLst>
+  </p:cSld>
+  <p:clrMapOvr>
+    <a:masterClrMapping/>
+  </p:clrMapOvr>
+</p:sld>
+</file>
+
+<file path=ppt/slides/slide11.xml><?xml version="1.0" encoding="utf-8"?>
+<p:sld xmlns:a="http://schemas.openxmlformats.org/drawingml/2006/main" xmlns:r="http://schemas.openxmlformats.org/officeDocument/2006/relationships" xmlns:p="http://schemas.openxmlformats.org/presentationml/2006/main">
+  <p:cSld>
+    <p:spTree>
+      <p:nvGrpSpPr>
+        <p:cNvPr id="1" name="">
+          <a:extLst>
+            <a:ext uri="{FF2B5EF4-FFF2-40B4-BE49-F238E27FC236}">
+              <a16:creationId xmlns:a16="http://schemas.microsoft.com/office/drawing/2014/main" id="{04E1EE28-6ABC-7A05-017D-00173CFBE784}"/>
+            </a:ext>
+          </a:extLst>
+        </p:cNvPr>
+        <p:cNvGrpSpPr/>
+        <p:nvPr/>
+      </p:nvGrpSpPr>
+      <p:grpSpPr>
+        <a:xfrm>
+          <a:off x="0" y="0"/>
+          <a:ext cx="0" cy="0"/>
+          <a:chOff x="0" y="0"/>
+          <a:chExt cx="0" cy="0"/>
+        </a:xfrm>
+      </p:grpSpPr>
+      <p:sp>
+        <p:nvSpPr>
+          <p:cNvPr id="2" name="Title 1">
+            <a:extLst>
+              <a:ext uri="{FF2B5EF4-FFF2-40B4-BE49-F238E27FC236}">
+                <a16:creationId xmlns:a16="http://schemas.microsoft.com/office/drawing/2014/main" id="{F509857C-7F82-7818-D538-2417C306A735}"/>
+              </a:ext>
+            </a:extLst>
+          </p:cNvPr>
+          <p:cNvSpPr>
+            <a:spLocks noGrp="1"/>
+          </p:cNvSpPr>
+          <p:nvPr>
+            <p:ph type="title"/>
+          </p:nvPr>
+        </p:nvSpPr>
+        <p:spPr>
+          <a:xfrm>
+            <a:off x="457201" y="342197"/>
+            <a:ext cx="8229600" cy="1143000"/>
+          </a:xfrm>
+          <a:solidFill>
+            <a:schemeClr val="accent4">
+              <a:lumMod val="20000"/>
+              <a:lumOff val="80000"/>
+            </a:schemeClr>
+          </a:solidFill>
+        </p:spPr>
+        <p:txBody>
+          <a:bodyPr/>
+          <a:lstStyle/>
+          <a:p>
+            <a:endParaRPr lang="en-IN" dirty="0"/>
+          </a:p>
+        </p:txBody>
+      </p:sp>
+      <p:sp>
+        <p:nvSpPr>
+          <p:cNvPr id="4" name="TextBox 3">
+            <a:extLst>
+              <a:ext uri="{FF2B5EF4-FFF2-40B4-BE49-F238E27FC236}">
+                <a16:creationId xmlns:a16="http://schemas.microsoft.com/office/drawing/2014/main" id="{7D5CF9BA-B724-D7FE-AE14-4FC2F9017754}"/>
+              </a:ext>
+            </a:extLst>
+          </p:cNvPr>
+          <p:cNvSpPr txBox="1"/>
+          <p:nvPr/>
+        </p:nvSpPr>
+        <p:spPr>
+          <a:xfrm>
+            <a:off x="457199" y="4318484"/>
+            <a:ext cx="2610000" cy="2308324"/>
+          </a:xfrm>
+          <a:prstGeom prst="rect">
+            <a:avLst/>
+          </a:prstGeom>
+          <a:solidFill>
+            <a:schemeClr val="bg2">
+              <a:lumMod val="90000"/>
+            </a:schemeClr>
+          </a:solidFill>
+        </p:spPr>
+        <p:txBody>
+          <a:bodyPr wrap="square" rtlCol="0">
+            <a:spAutoFit/>
+          </a:bodyPr>
+          <a:lstStyle/>
+          <a:p>
+            <a:endParaRPr lang="en-US" dirty="0"/>
+          </a:p>
+          <a:p>
+            <a:endParaRPr lang="en-IN" dirty="0"/>
+          </a:p>
+          <a:p>
+            <a:endParaRPr lang="en-IN" dirty="0"/>
+          </a:p>
+          <a:p>
+            <a:endParaRPr lang="en-IN" dirty="0"/>
+          </a:p>
+          <a:p>
+            <a:endParaRPr lang="en-IN" dirty="0"/>
+          </a:p>
+          <a:p>
+            <a:endParaRPr lang="en-IN" dirty="0"/>
+          </a:p>
+          <a:p>
+            <a:endParaRPr lang="en-IN" dirty="0"/>
+          </a:p>
+          <a:p>
+            <a:r>
+              <a:rPr lang="en-IN" dirty="0"/>
+              <a:t>5</a:t>
+            </a:r>
+          </a:p>
+        </p:txBody>
+      </p:sp>
+      <p:sp>
+        <p:nvSpPr>
+          <p:cNvPr id="6" name="TextBox 5">
+            <a:extLst>
+              <a:ext uri="{FF2B5EF4-FFF2-40B4-BE49-F238E27FC236}">
+                <a16:creationId xmlns:a16="http://schemas.microsoft.com/office/drawing/2014/main" id="{30DDAB8C-14FE-BD4A-68C2-5468D94F0896}"/>
+              </a:ext>
+            </a:extLst>
+          </p:cNvPr>
+          <p:cNvSpPr txBox="1"/>
+          <p:nvPr/>
+        </p:nvSpPr>
+        <p:spPr>
+          <a:xfrm>
+            <a:off x="457199" y="1609179"/>
+            <a:ext cx="8229600" cy="2585323"/>
+          </a:xfrm>
+          <a:prstGeom prst="rect">
+            <a:avLst/>
+          </a:prstGeom>
+          <a:solidFill>
+            <a:schemeClr val="accent1">
+              <a:lumMod val="20000"/>
+              <a:lumOff val="80000"/>
+            </a:schemeClr>
+          </a:solidFill>
+        </p:spPr>
+        <p:txBody>
+          <a:bodyPr wrap="square" rtlCol="0">
+            <a:spAutoFit/>
+          </a:bodyPr>
+          <a:lstStyle/>
+          <a:p>
+            <a:endParaRPr lang="en-US" dirty="0"/>
+          </a:p>
+          <a:p>
+            <a:endParaRPr lang="en-IN" dirty="0"/>
+          </a:p>
+          <a:p>
+            <a:endParaRPr lang="en-IN" dirty="0"/>
+          </a:p>
+          <a:p>
+            <a:endParaRPr lang="en-IN" dirty="0"/>
+          </a:p>
+          <a:p>
+            <a:endParaRPr lang="en-IN" dirty="0"/>
+          </a:p>
+          <a:p>
+            <a:endParaRPr lang="en-IN" dirty="0"/>
+          </a:p>
+          <a:p>
+            <a:endParaRPr lang="en-IN" dirty="0"/>
+          </a:p>
+          <a:p>
+            <a:endParaRPr lang="en-IN" dirty="0"/>
+          </a:p>
+          <a:p>
+            <a:r>
+              <a:rPr lang="en-IN" dirty="0"/>
+              <a:t>2</a:t>
+            </a:r>
+          </a:p>
+        </p:txBody>
+      </p:sp>
+      <p:sp>
+        <p:nvSpPr>
+          <p:cNvPr id="8" name="TextBox 7">
+            <a:extLst>
+              <a:ext uri="{FF2B5EF4-FFF2-40B4-BE49-F238E27FC236}">
+                <a16:creationId xmlns:a16="http://schemas.microsoft.com/office/drawing/2014/main" id="{4F7A78C0-E37E-1C47-1110-62BE515A7686}"/>
+              </a:ext>
+            </a:extLst>
+          </p:cNvPr>
+          <p:cNvSpPr txBox="1"/>
+          <p:nvPr/>
+        </p:nvSpPr>
+        <p:spPr>
+          <a:xfrm>
+            <a:off x="3267000" y="4318484"/>
+            <a:ext cx="2610000" cy="2308324"/>
+          </a:xfrm>
+          <a:prstGeom prst="rect">
+            <a:avLst/>
+          </a:prstGeom>
+          <a:solidFill>
+            <a:schemeClr val="accent3">
+              <a:lumMod val="40000"/>
+              <a:lumOff val="60000"/>
+            </a:schemeClr>
+          </a:solidFill>
+        </p:spPr>
+        <p:txBody>
+          <a:bodyPr wrap="square" rtlCol="0">
+            <a:spAutoFit/>
+          </a:bodyPr>
+          <a:lstStyle/>
+          <a:p>
+            <a:endParaRPr lang="en-US" dirty="0"/>
+          </a:p>
+          <a:p>
+            <a:endParaRPr lang="en-IN" dirty="0"/>
+          </a:p>
+          <a:p>
+            <a:endParaRPr lang="en-IN" dirty="0"/>
+          </a:p>
+          <a:p>
+            <a:endParaRPr lang="en-IN" dirty="0"/>
+          </a:p>
+          <a:p>
+            <a:endParaRPr lang="en-IN" dirty="0"/>
+          </a:p>
+          <a:p>
+            <a:endParaRPr lang="en-IN" dirty="0"/>
+          </a:p>
+          <a:p>
+            <a:endParaRPr lang="en-IN" dirty="0"/>
+          </a:p>
+          <a:p>
+            <a:r>
+              <a:rPr lang="en-IN" dirty="0"/>
+              <a:t>5</a:t>
+            </a:r>
+          </a:p>
+        </p:txBody>
+      </p:sp>
+      <p:sp>
+        <p:nvSpPr>
+          <p:cNvPr id="9" name="TextBox 8">
+            <a:extLst>
+              <a:ext uri="{FF2B5EF4-FFF2-40B4-BE49-F238E27FC236}">
+                <a16:creationId xmlns:a16="http://schemas.microsoft.com/office/drawing/2014/main" id="{13EA3866-5434-87EC-B88B-AC642EDB05C0}"/>
+              </a:ext>
+            </a:extLst>
+          </p:cNvPr>
+          <p:cNvSpPr txBox="1"/>
+          <p:nvPr/>
+        </p:nvSpPr>
+        <p:spPr>
+          <a:xfrm>
+            <a:off x="6076799" y="4318484"/>
+            <a:ext cx="2610000" cy="2308324"/>
+          </a:xfrm>
+          <a:prstGeom prst="rect">
+            <a:avLst/>
+          </a:prstGeom>
+          <a:solidFill>
+            <a:schemeClr val="tx2">
+              <a:lumMod val="20000"/>
+              <a:lumOff val="80000"/>
+            </a:schemeClr>
+          </a:solidFill>
+        </p:spPr>
+        <p:txBody>
+          <a:bodyPr wrap="square" rtlCol="0">
+            <a:spAutoFit/>
+          </a:bodyPr>
+          <a:lstStyle/>
+          <a:p>
+            <a:endParaRPr lang="en-US" dirty="0"/>
+          </a:p>
+          <a:p>
+            <a:endParaRPr lang="en-IN" dirty="0"/>
+          </a:p>
+          <a:p>
+            <a:endParaRPr lang="en-IN" dirty="0"/>
+          </a:p>
+          <a:p>
+            <a:endParaRPr lang="en-IN" dirty="0"/>
+          </a:p>
+          <a:p>
+            <a:endParaRPr lang="en-IN" dirty="0"/>
+          </a:p>
+          <a:p>
+            <a:endParaRPr lang="en-IN" dirty="0"/>
+          </a:p>
+          <a:p>
+            <a:endParaRPr lang="en-IN" dirty="0"/>
+          </a:p>
+          <a:p>
+            <a:r>
+              <a:rPr lang="en-IN" dirty="0"/>
+              <a:t>5</a:t>
+            </a:r>
+          </a:p>
+        </p:txBody>
+      </p:sp>
+    </p:spTree>
+    <p:extLst>
+      <p:ext uri="{BB962C8B-B14F-4D97-AF65-F5344CB8AC3E}">
+        <p14:creationId xmlns:p14="http://schemas.microsoft.com/office/powerpoint/2010/main" val="456530527"/>
+      </p:ext>
+    </p:extLst>
+  </p:cSld>
+  <p:clrMapOvr>
+    <a:masterClrMapping/>
+  </p:clrMapOvr>
+</p:sld>
+</file>
+
+<file path=ppt/slides/slide12.xml><?xml version="1.0" encoding="utf-8"?>
+<p:sld xmlns:a="http://schemas.openxmlformats.org/drawingml/2006/main" xmlns:r="http://schemas.openxmlformats.org/officeDocument/2006/relationships" xmlns:p="http://schemas.openxmlformats.org/presentationml/2006/main">
+  <p:cSld>
+    <p:spTree>
+      <p:nvGrpSpPr>
+        <p:cNvPr id="1" name="">
+          <a:extLst>
+            <a:ext uri="{FF2B5EF4-FFF2-40B4-BE49-F238E27FC236}">
+              <a16:creationId xmlns:a16="http://schemas.microsoft.com/office/drawing/2014/main" id="{04E1EE28-6ABC-7A05-017D-00173CFBE784}"/>
+            </a:ext>
+          </a:extLst>
+        </p:cNvPr>
+        <p:cNvGrpSpPr/>
+        <p:nvPr/>
+      </p:nvGrpSpPr>
+      <p:grpSpPr>
+        <a:xfrm>
+          <a:off x="0" y="0"/>
+          <a:ext cx="0" cy="0"/>
+          <a:chOff x="0" y="0"/>
+          <a:chExt cx="0" cy="0"/>
+        </a:xfrm>
+      </p:grpSpPr>
+      <p:sp>
+        <p:nvSpPr>
+          <p:cNvPr id="2" name="Title 1">
+            <a:extLst>
+              <a:ext uri="{FF2B5EF4-FFF2-40B4-BE49-F238E27FC236}">
+                <a16:creationId xmlns:a16="http://schemas.microsoft.com/office/drawing/2014/main" id="{F509857C-7F82-7818-D538-2417C306A735}"/>
+              </a:ext>
+            </a:extLst>
+          </p:cNvPr>
+          <p:cNvSpPr>
+            <a:spLocks noGrp="1"/>
+          </p:cNvSpPr>
+          <p:nvPr>
+            <p:ph type="title"/>
+          </p:nvPr>
+        </p:nvSpPr>
+        <p:spPr>
+          <a:xfrm>
+            <a:off x="457201" y="342197"/>
+            <a:ext cx="8229600" cy="1143000"/>
+          </a:xfrm>
+          <a:solidFill>
+            <a:schemeClr val="accent4">
+              <a:lumMod val="20000"/>
+              <a:lumOff val="80000"/>
+            </a:schemeClr>
+          </a:solidFill>
+        </p:spPr>
+        <p:txBody>
+          <a:bodyPr/>
+          <a:lstStyle/>
+          <a:p>
+            <a:endParaRPr lang="en-IN" dirty="0"/>
+          </a:p>
+        </p:txBody>
+      </p:sp>
+      <p:sp>
+        <p:nvSpPr>
+          <p:cNvPr id="4" name="TextBox 3">
+            <a:extLst>
+              <a:ext uri="{FF2B5EF4-FFF2-40B4-BE49-F238E27FC236}">
+                <a16:creationId xmlns:a16="http://schemas.microsoft.com/office/drawing/2014/main" id="{7D5CF9BA-B724-D7FE-AE14-4FC2F9017754}"/>
+              </a:ext>
+            </a:extLst>
+          </p:cNvPr>
+          <p:cNvSpPr txBox="1"/>
+          <p:nvPr/>
+        </p:nvSpPr>
+        <p:spPr>
+          <a:xfrm>
+            <a:off x="457201" y="1626964"/>
+            <a:ext cx="2610000" cy="2308324"/>
+          </a:xfrm>
+          <a:prstGeom prst="rect">
+            <a:avLst/>
+          </a:prstGeom>
+          <a:solidFill>
+            <a:schemeClr val="bg2">
+              <a:lumMod val="90000"/>
+            </a:schemeClr>
+          </a:solidFill>
+        </p:spPr>
+        <p:txBody>
+          <a:bodyPr wrap="square" rtlCol="0">
+            <a:spAutoFit/>
+          </a:bodyPr>
+          <a:lstStyle/>
+          <a:p>
+            <a:endParaRPr lang="en-US" dirty="0"/>
+          </a:p>
+          <a:p>
+            <a:endParaRPr lang="en-IN" dirty="0"/>
+          </a:p>
+          <a:p>
+            <a:endParaRPr lang="en-IN" dirty="0"/>
+          </a:p>
+          <a:p>
+            <a:endParaRPr lang="en-IN" dirty="0"/>
+          </a:p>
+          <a:p>
+            <a:endParaRPr lang="en-IN" dirty="0"/>
+          </a:p>
+          <a:p>
+            <a:endParaRPr lang="en-IN" dirty="0"/>
+          </a:p>
+          <a:p>
+            <a:endParaRPr lang="en-IN" dirty="0"/>
+          </a:p>
+          <a:p>
+            <a:r>
+              <a:rPr lang="en-IN" dirty="0"/>
+              <a:t>5</a:t>
+            </a:r>
+          </a:p>
+        </p:txBody>
+      </p:sp>
+      <p:sp>
+        <p:nvSpPr>
+          <p:cNvPr id="6" name="TextBox 5">
+            <a:extLst>
+              <a:ext uri="{FF2B5EF4-FFF2-40B4-BE49-F238E27FC236}">
+                <a16:creationId xmlns:a16="http://schemas.microsoft.com/office/drawing/2014/main" id="{30DDAB8C-14FE-BD4A-68C2-5468D94F0896}"/>
+              </a:ext>
+            </a:extLst>
+          </p:cNvPr>
+          <p:cNvSpPr txBox="1"/>
+          <p:nvPr/>
+        </p:nvSpPr>
+        <p:spPr>
+          <a:xfrm>
+            <a:off x="457201" y="4057624"/>
+            <a:ext cx="8229600" cy="2585323"/>
+          </a:xfrm>
+          <a:prstGeom prst="rect">
+            <a:avLst/>
+          </a:prstGeom>
+          <a:solidFill>
+            <a:schemeClr val="accent1">
+              <a:lumMod val="20000"/>
+              <a:lumOff val="80000"/>
+            </a:schemeClr>
+          </a:solidFill>
+        </p:spPr>
+        <p:txBody>
+          <a:bodyPr wrap="square" rtlCol="0">
+            <a:spAutoFit/>
+          </a:bodyPr>
+          <a:lstStyle/>
+          <a:p>
+            <a:endParaRPr lang="en-US" dirty="0"/>
+          </a:p>
+          <a:p>
+            <a:endParaRPr lang="en-IN" dirty="0"/>
+          </a:p>
+          <a:p>
+            <a:endParaRPr lang="en-IN" dirty="0"/>
+          </a:p>
+          <a:p>
+            <a:endParaRPr lang="en-IN" dirty="0"/>
+          </a:p>
+          <a:p>
+            <a:endParaRPr lang="en-IN" dirty="0"/>
+          </a:p>
+          <a:p>
+            <a:endParaRPr lang="en-IN" dirty="0"/>
+          </a:p>
+          <a:p>
+            <a:endParaRPr lang="en-IN" dirty="0"/>
+          </a:p>
+          <a:p>
+            <a:endParaRPr lang="en-IN" dirty="0"/>
+          </a:p>
+          <a:p>
+            <a:r>
+              <a:rPr lang="en-IN" dirty="0"/>
+              <a:t>2</a:t>
+            </a:r>
+          </a:p>
+        </p:txBody>
+      </p:sp>
+      <p:sp>
+        <p:nvSpPr>
+          <p:cNvPr id="8" name="TextBox 7">
+            <a:extLst>
+              <a:ext uri="{FF2B5EF4-FFF2-40B4-BE49-F238E27FC236}">
+                <a16:creationId xmlns:a16="http://schemas.microsoft.com/office/drawing/2014/main" id="{4F7A78C0-E37E-1C47-1110-62BE515A7686}"/>
+              </a:ext>
+            </a:extLst>
+          </p:cNvPr>
+          <p:cNvSpPr txBox="1"/>
+          <p:nvPr/>
+        </p:nvSpPr>
+        <p:spPr>
+          <a:xfrm>
+            <a:off x="3267001" y="1626964"/>
+            <a:ext cx="2610000" cy="2308324"/>
+          </a:xfrm>
+          <a:prstGeom prst="rect">
+            <a:avLst/>
+          </a:prstGeom>
+          <a:solidFill>
+            <a:schemeClr val="accent3">
+              <a:lumMod val="40000"/>
+              <a:lumOff val="60000"/>
+            </a:schemeClr>
+          </a:solidFill>
+        </p:spPr>
+        <p:txBody>
+          <a:bodyPr wrap="square" rtlCol="0">
+            <a:spAutoFit/>
+          </a:bodyPr>
+          <a:lstStyle/>
+          <a:p>
+            <a:endParaRPr lang="en-US" dirty="0"/>
+          </a:p>
+          <a:p>
+            <a:endParaRPr lang="en-IN" dirty="0"/>
+          </a:p>
+          <a:p>
+            <a:endParaRPr lang="en-IN" dirty="0"/>
+          </a:p>
+          <a:p>
+            <a:endParaRPr lang="en-IN" dirty="0"/>
+          </a:p>
+          <a:p>
+            <a:endParaRPr lang="en-IN" dirty="0"/>
+          </a:p>
+          <a:p>
+            <a:endParaRPr lang="en-IN" dirty="0"/>
+          </a:p>
+          <a:p>
+            <a:endParaRPr lang="en-IN" dirty="0"/>
+          </a:p>
+          <a:p>
+            <a:r>
+              <a:rPr lang="en-IN" dirty="0"/>
+              <a:t>5</a:t>
+            </a:r>
+          </a:p>
+        </p:txBody>
+      </p:sp>
+      <p:sp>
+        <p:nvSpPr>
+          <p:cNvPr id="9" name="TextBox 8">
+            <a:extLst>
+              <a:ext uri="{FF2B5EF4-FFF2-40B4-BE49-F238E27FC236}">
+                <a16:creationId xmlns:a16="http://schemas.microsoft.com/office/drawing/2014/main" id="{13EA3866-5434-87EC-B88B-AC642EDB05C0}"/>
+              </a:ext>
+            </a:extLst>
+          </p:cNvPr>
+          <p:cNvSpPr txBox="1"/>
+          <p:nvPr/>
+        </p:nvSpPr>
+        <p:spPr>
+          <a:xfrm>
+            <a:off x="6076801" y="1628586"/>
+            <a:ext cx="2610000" cy="2308324"/>
+          </a:xfrm>
+          <a:prstGeom prst="rect">
+            <a:avLst/>
+          </a:prstGeom>
+          <a:solidFill>
+            <a:schemeClr val="tx2">
+              <a:lumMod val="20000"/>
+              <a:lumOff val="80000"/>
+            </a:schemeClr>
+          </a:solidFill>
+        </p:spPr>
+        <p:txBody>
+          <a:bodyPr wrap="square" rtlCol="0">
+            <a:spAutoFit/>
+          </a:bodyPr>
+          <a:lstStyle/>
+          <a:p>
+            <a:endParaRPr lang="en-US" dirty="0"/>
+          </a:p>
+          <a:p>
+            <a:endParaRPr lang="en-IN" dirty="0"/>
+          </a:p>
+          <a:p>
+            <a:endParaRPr lang="en-IN" dirty="0"/>
+          </a:p>
+          <a:p>
+            <a:endParaRPr lang="en-IN" dirty="0"/>
+          </a:p>
+          <a:p>
+            <a:endParaRPr lang="en-IN" dirty="0"/>
+          </a:p>
+          <a:p>
+            <a:endParaRPr lang="en-IN" dirty="0"/>
+          </a:p>
+          <a:p>
+            <a:endParaRPr lang="en-IN" dirty="0"/>
+          </a:p>
+          <a:p>
+            <a:r>
+              <a:rPr lang="en-IN" dirty="0"/>
+              <a:t>5</a:t>
+            </a:r>
+          </a:p>
+        </p:txBody>
+      </p:sp>
+    </p:spTree>
+    <p:extLst>
+      <p:ext uri="{BB962C8B-B14F-4D97-AF65-F5344CB8AC3E}">
+        <p14:creationId xmlns:p14="http://schemas.microsoft.com/office/powerpoint/2010/main" val="628836965"/>
+      </p:ext>
+    </p:extLst>
+  </p:cSld>
+  <p:clrMapOvr>
+    <a:masterClrMapping/>
+  </p:clrMapOvr>
+</p:sld>
+</file>
+
 <file path=ppt/slides/slide2.xml><?xml version="1.0" encoding="utf-8"?>
 <p:sld xmlns:a="http://schemas.openxmlformats.org/drawingml/2006/main" xmlns:r="http://schemas.openxmlformats.org/officeDocument/2006/relationships" xmlns:p="http://schemas.openxmlformats.org/presentationml/2006/main">
   <p:cSld>
@@ -3227,7 +4181,7 @@
         <p:spPr>
           <a:xfrm>
             <a:off x="457201" y="1732547"/>
-            <a:ext cx="8229600" cy="4801314"/>
+            <a:ext cx="8229600" cy="4939814"/>
           </a:xfrm>
           <a:prstGeom prst="rect">
             <a:avLst/>
@@ -3263,7 +4217,15 @@
             <a:endParaRPr lang="en-IN" dirty="0"/>
           </a:p>
           <a:p>
-            <a:endParaRPr lang="en-IN" dirty="0"/>
+            <a:pPr algn="ctr">
+              <a:lnSpc>
+                <a:spcPct val="150000"/>
+              </a:lnSpc>
+            </a:pPr>
+            <a:r>
+              <a:rPr lang="en-IN" sz="2000" dirty="0"/>
+              <a:t>0</a:t>
+            </a:r>
           </a:p>
           <a:p>
             <a:endParaRPr lang="en-IN" dirty="0"/>
@@ -3311,187 +4273,6 @@
 </file>
 
 <file path=ppt/slides/slide3.xml><?xml version="1.0" encoding="utf-8"?>
-<p:sld xmlns:a="http://schemas.openxmlformats.org/drawingml/2006/main" xmlns:r="http://schemas.openxmlformats.org/officeDocument/2006/relationships" xmlns:p="http://schemas.openxmlformats.org/presentationml/2006/main">
-  <p:cSld>
-    <p:spTree>
-      <p:nvGrpSpPr>
-        <p:cNvPr id="1" name=""/>
-        <p:cNvGrpSpPr/>
-        <p:nvPr/>
-      </p:nvGrpSpPr>
-      <p:grpSpPr>
-        <a:xfrm>
-          <a:off x="0" y="0"/>
-          <a:ext cx="0" cy="0"/>
-          <a:chOff x="0" y="0"/>
-          <a:chExt cx="0" cy="0"/>
-        </a:xfrm>
-      </p:grpSpPr>
-      <p:sp>
-        <p:nvSpPr>
-          <p:cNvPr id="2" name="Title 1">
-            <a:extLst>
-              <a:ext uri="{FF2B5EF4-FFF2-40B4-BE49-F238E27FC236}">
-                <a16:creationId xmlns:a16="http://schemas.microsoft.com/office/drawing/2014/main" id="{ABEB8D98-7163-FAFB-BA5E-8F6CBE260951}"/>
-              </a:ext>
-            </a:extLst>
-          </p:cNvPr>
-          <p:cNvSpPr>
-            <a:spLocks noGrp="1"/>
-          </p:cNvSpPr>
-          <p:nvPr>
-            <p:ph type="title"/>
-          </p:nvPr>
-        </p:nvSpPr>
-        <p:spPr>
-          <a:xfrm>
-            <a:off x="457201" y="342197"/>
-            <a:ext cx="8229600" cy="1143000"/>
-          </a:xfrm>
-          <a:solidFill>
-            <a:schemeClr val="accent4">
-              <a:lumMod val="20000"/>
-              <a:lumOff val="80000"/>
-            </a:schemeClr>
-          </a:solidFill>
-        </p:spPr>
-        <p:txBody>
-          <a:bodyPr/>
-          <a:lstStyle/>
-          <a:p>
-            <a:endParaRPr lang="en-IN" dirty="0"/>
-          </a:p>
-        </p:txBody>
-      </p:sp>
-      <p:sp>
-        <p:nvSpPr>
-          <p:cNvPr id="4" name="TextBox 3">
-            <a:extLst>
-              <a:ext uri="{FF2B5EF4-FFF2-40B4-BE49-F238E27FC236}">
-                <a16:creationId xmlns:a16="http://schemas.microsoft.com/office/drawing/2014/main" id="{B869FF94-F7A0-8D34-041E-D754FE382626}"/>
-              </a:ext>
-            </a:extLst>
-          </p:cNvPr>
-          <p:cNvSpPr txBox="1"/>
-          <p:nvPr/>
-        </p:nvSpPr>
-        <p:spPr>
-          <a:xfrm>
-            <a:off x="457200" y="1773455"/>
-            <a:ext cx="8229601" cy="2308324"/>
-          </a:xfrm>
-          <a:prstGeom prst="rect">
-            <a:avLst/>
-          </a:prstGeom>
-          <a:solidFill>
-            <a:schemeClr val="bg2">
-              <a:lumMod val="90000"/>
-            </a:schemeClr>
-          </a:solidFill>
-        </p:spPr>
-        <p:txBody>
-          <a:bodyPr wrap="square" rtlCol="0">
-            <a:spAutoFit/>
-          </a:bodyPr>
-          <a:lstStyle/>
-          <a:p>
-            <a:endParaRPr lang="en-US" dirty="0"/>
-          </a:p>
-          <a:p>
-            <a:endParaRPr lang="en-IN" dirty="0"/>
-          </a:p>
-          <a:p>
-            <a:endParaRPr lang="en-IN" dirty="0"/>
-          </a:p>
-          <a:p>
-            <a:endParaRPr lang="en-IN" dirty="0"/>
-          </a:p>
-          <a:p>
-            <a:endParaRPr lang="en-IN" dirty="0"/>
-          </a:p>
-          <a:p>
-            <a:endParaRPr lang="en-IN" dirty="0"/>
-          </a:p>
-          <a:p>
-            <a:endParaRPr lang="en-IN" dirty="0"/>
-          </a:p>
-          <a:p>
-            <a:endParaRPr lang="en-IN" dirty="0"/>
-          </a:p>
-        </p:txBody>
-      </p:sp>
-      <p:sp>
-        <p:nvSpPr>
-          <p:cNvPr id="5" name="TextBox 4">
-            <a:extLst>
-              <a:ext uri="{FF2B5EF4-FFF2-40B4-BE49-F238E27FC236}">
-                <a16:creationId xmlns:a16="http://schemas.microsoft.com/office/drawing/2014/main" id="{D34946AC-0EDD-C248-7F92-2AB18CAD9331}"/>
-              </a:ext>
-            </a:extLst>
-          </p:cNvPr>
-          <p:cNvSpPr txBox="1"/>
-          <p:nvPr/>
-        </p:nvSpPr>
-        <p:spPr>
-          <a:xfrm>
-            <a:off x="457201" y="4370037"/>
-            <a:ext cx="8229600" cy="2308324"/>
-          </a:xfrm>
-          <a:prstGeom prst="rect">
-            <a:avLst/>
-          </a:prstGeom>
-          <a:solidFill>
-            <a:schemeClr val="accent3">
-              <a:lumMod val="40000"/>
-              <a:lumOff val="60000"/>
-            </a:schemeClr>
-          </a:solidFill>
-        </p:spPr>
-        <p:txBody>
-          <a:bodyPr wrap="square" rtlCol="0">
-            <a:spAutoFit/>
-          </a:bodyPr>
-          <a:lstStyle/>
-          <a:p>
-            <a:endParaRPr lang="en-US" dirty="0"/>
-          </a:p>
-          <a:p>
-            <a:endParaRPr lang="en-IN" dirty="0"/>
-          </a:p>
-          <a:p>
-            <a:endParaRPr lang="en-IN" dirty="0"/>
-          </a:p>
-          <a:p>
-            <a:endParaRPr lang="en-IN" dirty="0"/>
-          </a:p>
-          <a:p>
-            <a:endParaRPr lang="en-IN" dirty="0"/>
-          </a:p>
-          <a:p>
-            <a:endParaRPr lang="en-IN" dirty="0"/>
-          </a:p>
-          <a:p>
-            <a:endParaRPr lang="en-IN" dirty="0"/>
-          </a:p>
-          <a:p>
-            <a:endParaRPr lang="en-IN" dirty="0"/>
-          </a:p>
-        </p:txBody>
-      </p:sp>
-    </p:spTree>
-    <p:extLst>
-      <p:ext uri="{BB962C8B-B14F-4D97-AF65-F5344CB8AC3E}">
-        <p14:creationId xmlns:p14="http://schemas.microsoft.com/office/powerpoint/2010/main" val="3440722418"/>
-      </p:ext>
-    </p:extLst>
-  </p:cSld>
-  <p:clrMapOvr>
-    <a:masterClrMapping/>
-  </p:clrMapOvr>
-</p:sld>
-</file>
-
-<file path=ppt/slides/slide4.xml><?xml version="1.0" encoding="utf-8"?>
 <p:sld xmlns:a="http://schemas.openxmlformats.org/drawingml/2006/main" xmlns:r="http://schemas.openxmlformats.org/officeDocument/2006/relationships" xmlns:p="http://schemas.openxmlformats.org/presentationml/2006/main">
   <p:cSld>
     <p:spTree>
@@ -3577,69 +4358,89 @@
           </a:solidFill>
         </p:spPr>
         <p:txBody>
-          <a:bodyPr wrap="square" rtlCol="0">
+          <a:bodyPr wrap="square" rtlCol="0" anchor="ctr">
             <a:spAutoFit/>
           </a:bodyPr>
           <a:lstStyle/>
           <a:p>
-            <a:endParaRPr lang="en-US" dirty="0"/>
-          </a:p>
-          <a:p>
-            <a:endParaRPr lang="en-IN" dirty="0"/>
-          </a:p>
-          <a:p>
-            <a:endParaRPr lang="en-IN" dirty="0"/>
-          </a:p>
-          <a:p>
-            <a:endParaRPr lang="en-IN" dirty="0"/>
-          </a:p>
-          <a:p>
-            <a:endParaRPr lang="en-IN" dirty="0"/>
-          </a:p>
-          <a:p>
-            <a:endParaRPr lang="en-IN" dirty="0"/>
-          </a:p>
-          <a:p>
-            <a:endParaRPr lang="en-IN" dirty="0"/>
-          </a:p>
-          <a:p>
-            <a:endParaRPr lang="en-IN" dirty="0"/>
-          </a:p>
-          <a:p>
-            <a:endParaRPr lang="en-IN" dirty="0"/>
-          </a:p>
-          <a:p>
-            <a:endParaRPr lang="en-IN" dirty="0"/>
-          </a:p>
-          <a:p>
-            <a:endParaRPr lang="en-IN" dirty="0"/>
-          </a:p>
-          <a:p>
-            <a:endParaRPr lang="en-IN" dirty="0"/>
-          </a:p>
-          <a:p>
-            <a:endParaRPr lang="en-IN" dirty="0"/>
-          </a:p>
-          <a:p>
-            <a:endParaRPr lang="en-IN" dirty="0"/>
-          </a:p>
-          <a:p>
-            <a:endParaRPr lang="en-IN" dirty="0"/>
-          </a:p>
-          <a:p>
-            <a:endParaRPr lang="en-IN" dirty="0"/>
-          </a:p>
-          <a:p>
-            <a:endParaRPr lang="en-IN" dirty="0"/>
-          </a:p>
-        </p:txBody>
-      </p:sp>
-      <p:sp>
-        <p:nvSpPr>
-          <p:cNvPr id="5" name="TextBox 4">
+            <a:pPr algn="ctr"/>
+            <a:endParaRPr lang="en-IN" dirty="0"/>
+          </a:p>
+          <a:p>
+            <a:pPr algn="ctr"/>
+            <a:endParaRPr lang="en-IN" dirty="0"/>
+          </a:p>
+          <a:p>
+            <a:pPr algn="ctr"/>
+            <a:endParaRPr lang="en-IN" dirty="0"/>
+          </a:p>
+          <a:p>
+            <a:pPr algn="ctr"/>
+            <a:endParaRPr lang="en-IN" dirty="0"/>
+          </a:p>
+          <a:p>
+            <a:pPr algn="ctr"/>
+            <a:endParaRPr lang="en-IN" dirty="0"/>
+          </a:p>
+          <a:p>
+            <a:pPr algn="ctr"/>
+            <a:endParaRPr lang="en-IN" dirty="0"/>
+          </a:p>
+          <a:p>
+            <a:pPr algn="ctr"/>
+            <a:endParaRPr lang="en-IN" dirty="0"/>
+          </a:p>
+          <a:p>
+            <a:pPr algn="ctr"/>
+            <a:endParaRPr lang="en-IN" dirty="0"/>
+          </a:p>
+          <a:p>
+            <a:pPr algn="ctr"/>
+            <a:r>
+              <a:rPr lang="en-IN" dirty="0"/>
+              <a:t>1</a:t>
+            </a:r>
+          </a:p>
+          <a:p>
+            <a:pPr algn="ctr"/>
+            <a:endParaRPr lang="en-IN" dirty="0"/>
+          </a:p>
+          <a:p>
+            <a:pPr algn="ctr"/>
+            <a:endParaRPr lang="en-IN" dirty="0"/>
+          </a:p>
+          <a:p>
+            <a:pPr algn="ctr"/>
+            <a:endParaRPr lang="en-IN" dirty="0"/>
+          </a:p>
+          <a:p>
+            <a:pPr algn="ctr"/>
+            <a:endParaRPr lang="en-IN" dirty="0"/>
+          </a:p>
+          <a:p>
+            <a:pPr algn="ctr"/>
+            <a:endParaRPr lang="en-IN" dirty="0"/>
+          </a:p>
+          <a:p>
+            <a:pPr algn="ctr"/>
+            <a:endParaRPr lang="en-IN" dirty="0"/>
+          </a:p>
+          <a:p>
+            <a:pPr algn="ctr"/>
+            <a:endParaRPr lang="en-IN" dirty="0"/>
+          </a:p>
+          <a:p>
+            <a:pPr algn="ctr"/>
+            <a:endParaRPr lang="en-IN" dirty="0"/>
+          </a:p>
+        </p:txBody>
+      </p:sp>
+      <p:sp>
+        <p:nvSpPr>
+          <p:cNvPr id="3" name="TextBox 2">
             <a:extLst>
               <a:ext uri="{FF2B5EF4-FFF2-40B4-BE49-F238E27FC236}">
-                <a16:creationId xmlns:a16="http://schemas.microsoft.com/office/drawing/2014/main" id="{AE2466B2-B71B-EF8B-D48E-40FDC347AE10}"/>
+                <a16:creationId xmlns:a16="http://schemas.microsoft.com/office/drawing/2014/main" id="{F2962EF3-04D2-ABFB-1008-4235387366A8}"/>
               </a:ext>
             </a:extLst>
           </p:cNvPr>
@@ -3648,7 +4449,7 @@
         </p:nvSpPr>
         <p:spPr>
           <a:xfrm>
-            <a:off x="4705949" y="1773455"/>
+            <a:off x="4705947" y="1773455"/>
             <a:ext cx="3980852" cy="4801314"/>
           </a:xfrm>
           <a:prstGeom prst="rect">
@@ -3662,59 +4463,79 @@
           </a:solidFill>
         </p:spPr>
         <p:txBody>
-          <a:bodyPr wrap="square" rtlCol="0">
+          <a:bodyPr wrap="square" rtlCol="0" anchor="ctr">
             <a:spAutoFit/>
           </a:bodyPr>
           <a:lstStyle/>
           <a:p>
-            <a:endParaRPr lang="en-US" dirty="0"/>
-          </a:p>
-          <a:p>
-            <a:endParaRPr lang="en-IN" dirty="0"/>
-          </a:p>
-          <a:p>
-            <a:endParaRPr lang="en-IN" dirty="0"/>
-          </a:p>
-          <a:p>
-            <a:endParaRPr lang="en-IN" dirty="0"/>
-          </a:p>
-          <a:p>
-            <a:endParaRPr lang="en-IN" dirty="0"/>
-          </a:p>
-          <a:p>
-            <a:endParaRPr lang="en-IN" dirty="0"/>
-          </a:p>
-          <a:p>
-            <a:endParaRPr lang="en-IN" dirty="0"/>
-          </a:p>
-          <a:p>
-            <a:endParaRPr lang="en-IN" dirty="0"/>
-          </a:p>
-          <a:p>
-            <a:endParaRPr lang="en-IN" dirty="0"/>
-          </a:p>
-          <a:p>
-            <a:endParaRPr lang="en-IN" dirty="0"/>
-          </a:p>
-          <a:p>
-            <a:endParaRPr lang="en-IN" dirty="0"/>
-          </a:p>
-          <a:p>
-            <a:endParaRPr lang="en-IN" dirty="0"/>
-          </a:p>
-          <a:p>
-            <a:endParaRPr lang="en-IN" dirty="0"/>
-          </a:p>
-          <a:p>
-            <a:endParaRPr lang="en-IN" dirty="0"/>
-          </a:p>
-          <a:p>
-            <a:endParaRPr lang="en-IN" dirty="0"/>
-          </a:p>
-          <a:p>
-            <a:endParaRPr lang="en-IN" dirty="0"/>
-          </a:p>
-          <a:p>
+            <a:pPr algn="ctr"/>
+            <a:endParaRPr lang="en-IN" dirty="0"/>
+          </a:p>
+          <a:p>
+            <a:pPr algn="ctr"/>
+            <a:endParaRPr lang="en-IN" dirty="0"/>
+          </a:p>
+          <a:p>
+            <a:pPr algn="ctr"/>
+            <a:endParaRPr lang="en-IN" dirty="0"/>
+          </a:p>
+          <a:p>
+            <a:pPr algn="ctr"/>
+            <a:endParaRPr lang="en-IN" dirty="0"/>
+          </a:p>
+          <a:p>
+            <a:pPr algn="ctr"/>
+            <a:endParaRPr lang="en-IN" dirty="0"/>
+          </a:p>
+          <a:p>
+            <a:pPr algn="ctr"/>
+            <a:endParaRPr lang="en-IN" dirty="0"/>
+          </a:p>
+          <a:p>
+            <a:pPr algn="ctr"/>
+            <a:endParaRPr lang="en-IN" dirty="0"/>
+          </a:p>
+          <a:p>
+            <a:pPr algn="ctr"/>
+            <a:endParaRPr lang="en-IN" dirty="0"/>
+          </a:p>
+          <a:p>
+            <a:pPr algn="ctr"/>
+            <a:r>
+              <a:rPr lang="en-IN" dirty="0"/>
+              <a:t>1</a:t>
+            </a:r>
+          </a:p>
+          <a:p>
+            <a:pPr algn="ctr"/>
+            <a:endParaRPr lang="en-IN" dirty="0"/>
+          </a:p>
+          <a:p>
+            <a:pPr algn="ctr"/>
+            <a:endParaRPr lang="en-IN" dirty="0"/>
+          </a:p>
+          <a:p>
+            <a:pPr algn="ctr"/>
+            <a:endParaRPr lang="en-IN" dirty="0"/>
+          </a:p>
+          <a:p>
+            <a:pPr algn="ctr"/>
+            <a:endParaRPr lang="en-IN" dirty="0"/>
+          </a:p>
+          <a:p>
+            <a:pPr algn="ctr"/>
+            <a:endParaRPr lang="en-IN" dirty="0"/>
+          </a:p>
+          <a:p>
+            <a:pPr algn="ctr"/>
+            <a:endParaRPr lang="en-IN" dirty="0"/>
+          </a:p>
+          <a:p>
+            <a:pPr algn="ctr"/>
+            <a:endParaRPr lang="en-IN" dirty="0"/>
+          </a:p>
+          <a:p>
+            <a:pPr algn="ctr"/>
             <a:endParaRPr lang="en-IN" dirty="0"/>
           </a:p>
         </p:txBody>
@@ -3723,6 +4544,195 @@
     <p:extLst>
       <p:ext uri="{BB962C8B-B14F-4D97-AF65-F5344CB8AC3E}">
         <p14:creationId xmlns:p14="http://schemas.microsoft.com/office/powerpoint/2010/main" val="3961879891"/>
+      </p:ext>
+    </p:extLst>
+  </p:cSld>
+  <p:clrMapOvr>
+    <a:masterClrMapping/>
+  </p:clrMapOvr>
+</p:sld>
+</file>
+
+<file path=ppt/slides/slide4.xml><?xml version="1.0" encoding="utf-8"?>
+<p:sld xmlns:a="http://schemas.openxmlformats.org/drawingml/2006/main" xmlns:r="http://schemas.openxmlformats.org/officeDocument/2006/relationships" xmlns:p="http://schemas.openxmlformats.org/presentationml/2006/main">
+  <p:cSld>
+    <p:spTree>
+      <p:nvGrpSpPr>
+        <p:cNvPr id="1" name=""/>
+        <p:cNvGrpSpPr/>
+        <p:nvPr/>
+      </p:nvGrpSpPr>
+      <p:grpSpPr>
+        <a:xfrm>
+          <a:off x="0" y="0"/>
+          <a:ext cx="0" cy="0"/>
+          <a:chOff x="0" y="0"/>
+          <a:chExt cx="0" cy="0"/>
+        </a:xfrm>
+      </p:grpSpPr>
+      <p:sp>
+        <p:nvSpPr>
+          <p:cNvPr id="2" name="Title 1">
+            <a:extLst>
+              <a:ext uri="{FF2B5EF4-FFF2-40B4-BE49-F238E27FC236}">
+                <a16:creationId xmlns:a16="http://schemas.microsoft.com/office/drawing/2014/main" id="{ABEB8D98-7163-FAFB-BA5E-8F6CBE260951}"/>
+              </a:ext>
+            </a:extLst>
+          </p:cNvPr>
+          <p:cNvSpPr>
+            <a:spLocks noGrp="1"/>
+          </p:cNvSpPr>
+          <p:nvPr>
+            <p:ph type="title"/>
+          </p:nvPr>
+        </p:nvSpPr>
+        <p:spPr>
+          <a:xfrm>
+            <a:off x="457201" y="342197"/>
+            <a:ext cx="8229600" cy="1143000"/>
+          </a:xfrm>
+          <a:solidFill>
+            <a:schemeClr val="accent4">
+              <a:lumMod val="20000"/>
+              <a:lumOff val="80000"/>
+            </a:schemeClr>
+          </a:solidFill>
+        </p:spPr>
+        <p:txBody>
+          <a:bodyPr/>
+          <a:lstStyle/>
+          <a:p>
+            <a:endParaRPr lang="en-IN" dirty="0"/>
+          </a:p>
+        </p:txBody>
+      </p:sp>
+      <p:sp>
+        <p:nvSpPr>
+          <p:cNvPr id="4" name="TextBox 3">
+            <a:extLst>
+              <a:ext uri="{FF2B5EF4-FFF2-40B4-BE49-F238E27FC236}">
+                <a16:creationId xmlns:a16="http://schemas.microsoft.com/office/drawing/2014/main" id="{B869FF94-F7A0-8D34-041E-D754FE382626}"/>
+              </a:ext>
+            </a:extLst>
+          </p:cNvPr>
+          <p:cNvSpPr txBox="1"/>
+          <p:nvPr/>
+        </p:nvSpPr>
+        <p:spPr>
+          <a:xfrm>
+            <a:off x="457200" y="1773455"/>
+            <a:ext cx="8229601" cy="2308324"/>
+          </a:xfrm>
+          <a:prstGeom prst="rect">
+            <a:avLst/>
+          </a:prstGeom>
+          <a:solidFill>
+            <a:schemeClr val="bg2">
+              <a:lumMod val="90000"/>
+            </a:schemeClr>
+          </a:solidFill>
+        </p:spPr>
+        <p:txBody>
+          <a:bodyPr wrap="square" rtlCol="0">
+            <a:spAutoFit/>
+          </a:bodyPr>
+          <a:lstStyle/>
+          <a:p>
+            <a:endParaRPr lang="en-US" dirty="0"/>
+          </a:p>
+          <a:p>
+            <a:endParaRPr lang="en-IN" dirty="0"/>
+          </a:p>
+          <a:p>
+            <a:endParaRPr lang="en-IN" dirty="0"/>
+          </a:p>
+          <a:p>
+            <a:pPr algn="ctr"/>
+            <a:r>
+              <a:rPr lang="en-IN" dirty="0"/>
+              <a:t>2</a:t>
+            </a:r>
+          </a:p>
+          <a:p>
+            <a:endParaRPr lang="en-IN" dirty="0"/>
+          </a:p>
+          <a:p>
+            <a:endParaRPr lang="en-IN" dirty="0"/>
+          </a:p>
+          <a:p>
+            <a:endParaRPr lang="en-IN" dirty="0"/>
+          </a:p>
+          <a:p>
+            <a:endParaRPr lang="en-IN" dirty="0"/>
+          </a:p>
+        </p:txBody>
+      </p:sp>
+      <p:sp>
+        <p:nvSpPr>
+          <p:cNvPr id="5" name="TextBox 4">
+            <a:extLst>
+              <a:ext uri="{FF2B5EF4-FFF2-40B4-BE49-F238E27FC236}">
+                <a16:creationId xmlns:a16="http://schemas.microsoft.com/office/drawing/2014/main" id="{D34946AC-0EDD-C248-7F92-2AB18CAD9331}"/>
+              </a:ext>
+            </a:extLst>
+          </p:cNvPr>
+          <p:cNvSpPr txBox="1"/>
+          <p:nvPr/>
+        </p:nvSpPr>
+        <p:spPr>
+          <a:xfrm>
+            <a:off x="457201" y="4370037"/>
+            <a:ext cx="8229600" cy="2308324"/>
+          </a:xfrm>
+          <a:prstGeom prst="rect">
+            <a:avLst/>
+          </a:prstGeom>
+          <a:solidFill>
+            <a:schemeClr val="accent3">
+              <a:lumMod val="40000"/>
+              <a:lumOff val="60000"/>
+            </a:schemeClr>
+          </a:solidFill>
+        </p:spPr>
+        <p:txBody>
+          <a:bodyPr wrap="square" rtlCol="0">
+            <a:spAutoFit/>
+          </a:bodyPr>
+          <a:lstStyle/>
+          <a:p>
+            <a:endParaRPr lang="en-US" dirty="0"/>
+          </a:p>
+          <a:p>
+            <a:endParaRPr lang="en-IN" dirty="0"/>
+          </a:p>
+          <a:p>
+            <a:endParaRPr lang="en-IN" dirty="0"/>
+          </a:p>
+          <a:p>
+            <a:endParaRPr lang="en-IN" dirty="0"/>
+          </a:p>
+          <a:p>
+            <a:pPr algn="ctr"/>
+            <a:r>
+              <a:rPr lang="en-IN" dirty="0"/>
+              <a:t>2</a:t>
+            </a:r>
+          </a:p>
+          <a:p>
+            <a:endParaRPr lang="en-IN" dirty="0"/>
+          </a:p>
+          <a:p>
+            <a:endParaRPr lang="en-IN" dirty="0"/>
+          </a:p>
+          <a:p>
+            <a:endParaRPr lang="en-IN" dirty="0"/>
+          </a:p>
+        </p:txBody>
+      </p:sp>
+    </p:spTree>
+    <p:extLst>
+      <p:ext uri="{BB962C8B-B14F-4D97-AF65-F5344CB8AC3E}">
+        <p14:creationId xmlns:p14="http://schemas.microsoft.com/office/powerpoint/2010/main" val="3440722418"/>
       </p:ext>
     </p:extLst>
   </p:cSld>
@@ -3844,7 +4854,11 @@
             <a:endParaRPr lang="en-IN" dirty="0"/>
           </a:p>
           <a:p>
-            <a:endParaRPr lang="en-IN" dirty="0"/>
+            <a:pPr algn="ctr"/>
+            <a:r>
+              <a:rPr lang="en-IN" dirty="0"/>
+              <a:t>3</a:t>
+            </a:r>
           </a:p>
           <a:p>
             <a:endParaRPr lang="en-IN" dirty="0"/>
@@ -3929,33 +4943,46 @@
             <a:endParaRPr lang="en-IN" dirty="0"/>
           </a:p>
           <a:p>
-            <a:endParaRPr lang="en-IN" dirty="0"/>
-          </a:p>
-          <a:p>
-            <a:endParaRPr lang="en-IN" dirty="0"/>
-          </a:p>
-          <a:p>
-            <a:endParaRPr lang="en-IN" dirty="0"/>
-          </a:p>
-          <a:p>
-            <a:endParaRPr lang="en-IN" dirty="0"/>
-          </a:p>
-          <a:p>
-            <a:endParaRPr lang="en-IN" dirty="0"/>
-          </a:p>
-          <a:p>
-            <a:endParaRPr lang="en-IN" dirty="0"/>
-          </a:p>
-          <a:p>
-            <a:endParaRPr lang="en-IN" dirty="0"/>
-          </a:p>
-          <a:p>
-            <a:endParaRPr lang="en-IN" dirty="0"/>
-          </a:p>
-          <a:p>
-            <a:endParaRPr lang="en-IN" dirty="0"/>
-          </a:p>
-          <a:p>
+            <a:pPr algn="ctr"/>
+            <a:r>
+              <a:rPr lang="en-IN" dirty="0"/>
+              <a:t>3</a:t>
+            </a:r>
+          </a:p>
+          <a:p>
+            <a:pPr algn="ctr"/>
+            <a:endParaRPr lang="en-IN" dirty="0"/>
+          </a:p>
+          <a:p>
+            <a:pPr algn="ctr"/>
+            <a:endParaRPr lang="en-IN" dirty="0"/>
+          </a:p>
+          <a:p>
+            <a:pPr algn="ctr"/>
+            <a:endParaRPr lang="en-IN" dirty="0"/>
+          </a:p>
+          <a:p>
+            <a:pPr algn="ctr"/>
+            <a:endParaRPr lang="en-IN" dirty="0"/>
+          </a:p>
+          <a:p>
+            <a:pPr algn="ctr"/>
+            <a:endParaRPr lang="en-IN" dirty="0"/>
+          </a:p>
+          <a:p>
+            <a:pPr algn="ctr"/>
+            <a:endParaRPr lang="en-IN" dirty="0"/>
+          </a:p>
+          <a:p>
+            <a:pPr algn="ctr"/>
+            <a:endParaRPr lang="en-IN" dirty="0"/>
+          </a:p>
+          <a:p>
+            <a:pPr algn="ctr"/>
+            <a:endParaRPr lang="en-IN" dirty="0"/>
+          </a:p>
+          <a:p>
+            <a:pPr algn="ctr"/>
             <a:endParaRPr lang="en-IN" dirty="0"/>
           </a:p>
         </p:txBody>
@@ -4014,9 +5041,14 @@
             <a:endParaRPr lang="en-IN" dirty="0"/>
           </a:p>
           <a:p>
-            <a:endParaRPr lang="en-IN" dirty="0"/>
-          </a:p>
-          <a:p>
+            <a:pPr algn="ctr"/>
+            <a:r>
+              <a:rPr lang="en-IN" dirty="0"/>
+              <a:t>3</a:t>
+            </a:r>
+          </a:p>
+          <a:p>
+            <a:pPr algn="ctr"/>
             <a:endParaRPr lang="en-IN" dirty="0"/>
           </a:p>
           <a:p>
@@ -4059,6 +5091,600 @@
 </file>
 
 <file path=ppt/slides/slide6.xml><?xml version="1.0" encoding="utf-8"?>
+<p:sld xmlns:a="http://schemas.openxmlformats.org/drawingml/2006/main" xmlns:r="http://schemas.openxmlformats.org/officeDocument/2006/relationships" xmlns:p="http://schemas.openxmlformats.org/presentationml/2006/main">
+  <p:cSld>
+    <p:spTree>
+      <p:nvGrpSpPr>
+        <p:cNvPr id="1" name="">
+          <a:extLst>
+            <a:ext uri="{FF2B5EF4-FFF2-40B4-BE49-F238E27FC236}">
+              <a16:creationId xmlns:a16="http://schemas.microsoft.com/office/drawing/2014/main" id="{04E1EE28-6ABC-7A05-017D-00173CFBE784}"/>
+            </a:ext>
+          </a:extLst>
+        </p:cNvPr>
+        <p:cNvGrpSpPr/>
+        <p:nvPr/>
+      </p:nvGrpSpPr>
+      <p:grpSpPr>
+        <a:xfrm>
+          <a:off x="0" y="0"/>
+          <a:ext cx="0" cy="0"/>
+          <a:chOff x="0" y="0"/>
+          <a:chExt cx="0" cy="0"/>
+        </a:xfrm>
+      </p:grpSpPr>
+      <p:sp>
+        <p:nvSpPr>
+          <p:cNvPr id="2" name="Title 1">
+            <a:extLst>
+              <a:ext uri="{FF2B5EF4-FFF2-40B4-BE49-F238E27FC236}">
+                <a16:creationId xmlns:a16="http://schemas.microsoft.com/office/drawing/2014/main" id="{F509857C-7F82-7818-D538-2417C306A735}"/>
+              </a:ext>
+            </a:extLst>
+          </p:cNvPr>
+          <p:cNvSpPr>
+            <a:spLocks noGrp="1"/>
+          </p:cNvSpPr>
+          <p:nvPr>
+            <p:ph type="title"/>
+          </p:nvPr>
+        </p:nvSpPr>
+        <p:spPr>
+          <a:xfrm>
+            <a:off x="457201" y="342197"/>
+            <a:ext cx="8229600" cy="1143000"/>
+          </a:xfrm>
+          <a:solidFill>
+            <a:schemeClr val="accent4">
+              <a:lumMod val="20000"/>
+              <a:lumOff val="80000"/>
+            </a:schemeClr>
+          </a:solidFill>
+        </p:spPr>
+        <p:txBody>
+          <a:bodyPr/>
+          <a:lstStyle/>
+          <a:p>
+            <a:endParaRPr lang="en-IN" dirty="0"/>
+          </a:p>
+        </p:txBody>
+      </p:sp>
+      <p:sp>
+        <p:nvSpPr>
+          <p:cNvPr id="9" name="TextBox 8">
+            <a:extLst>
+              <a:ext uri="{FF2B5EF4-FFF2-40B4-BE49-F238E27FC236}">
+                <a16:creationId xmlns:a16="http://schemas.microsoft.com/office/drawing/2014/main" id="{13EA3866-5434-87EC-B88B-AC642EDB05C0}"/>
+              </a:ext>
+            </a:extLst>
+          </p:cNvPr>
+          <p:cNvSpPr txBox="1"/>
+          <p:nvPr/>
+        </p:nvSpPr>
+        <p:spPr>
+          <a:xfrm>
+            <a:off x="4652454" y="4266445"/>
+            <a:ext cx="4114801" cy="2308324"/>
+          </a:xfrm>
+          <a:prstGeom prst="rect">
+            <a:avLst/>
+          </a:prstGeom>
+          <a:solidFill>
+            <a:schemeClr val="accent3">
+              <a:lumMod val="40000"/>
+              <a:lumOff val="60000"/>
+            </a:schemeClr>
+          </a:solidFill>
+        </p:spPr>
+        <p:txBody>
+          <a:bodyPr wrap="square" rtlCol="0">
+            <a:spAutoFit/>
+          </a:bodyPr>
+          <a:lstStyle/>
+          <a:p>
+            <a:endParaRPr lang="en-US" dirty="0"/>
+          </a:p>
+          <a:p>
+            <a:endParaRPr lang="en-IN" dirty="0"/>
+          </a:p>
+          <a:p>
+            <a:endParaRPr lang="en-IN" dirty="0"/>
+          </a:p>
+          <a:p>
+            <a:endParaRPr lang="en-IN" dirty="0"/>
+          </a:p>
+          <a:p>
+            <a:endParaRPr lang="en-IN" dirty="0"/>
+          </a:p>
+          <a:p>
+            <a:endParaRPr lang="en-IN" dirty="0"/>
+          </a:p>
+          <a:p>
+            <a:endParaRPr lang="en-IN" dirty="0"/>
+          </a:p>
+          <a:p>
+            <a:r>
+              <a:rPr lang="en-IN" dirty="0"/>
+              <a:t>4</a:t>
+            </a:r>
+          </a:p>
+        </p:txBody>
+      </p:sp>
+      <p:sp>
+        <p:nvSpPr>
+          <p:cNvPr id="3" name="TextBox 2">
+            <a:extLst>
+              <a:ext uri="{FF2B5EF4-FFF2-40B4-BE49-F238E27FC236}">
+                <a16:creationId xmlns:a16="http://schemas.microsoft.com/office/drawing/2014/main" id="{576618D2-E8AF-15F9-8329-6AB75FEEFB83}"/>
+              </a:ext>
+            </a:extLst>
+          </p:cNvPr>
+          <p:cNvSpPr txBox="1"/>
+          <p:nvPr/>
+        </p:nvSpPr>
+        <p:spPr>
+          <a:xfrm>
+            <a:off x="4652454" y="1773455"/>
+            <a:ext cx="4114801" cy="2308324"/>
+          </a:xfrm>
+          <a:prstGeom prst="rect">
+            <a:avLst/>
+          </a:prstGeom>
+          <a:solidFill>
+            <a:schemeClr val="tx2">
+              <a:lumMod val="20000"/>
+              <a:lumOff val="80000"/>
+            </a:schemeClr>
+          </a:solidFill>
+        </p:spPr>
+        <p:txBody>
+          <a:bodyPr wrap="square" rtlCol="0">
+            <a:spAutoFit/>
+          </a:bodyPr>
+          <a:lstStyle/>
+          <a:p>
+            <a:endParaRPr lang="en-US" dirty="0"/>
+          </a:p>
+          <a:p>
+            <a:endParaRPr lang="en-IN" dirty="0"/>
+          </a:p>
+          <a:p>
+            <a:endParaRPr lang="en-IN" dirty="0"/>
+          </a:p>
+          <a:p>
+            <a:endParaRPr lang="en-IN" dirty="0"/>
+          </a:p>
+          <a:p>
+            <a:endParaRPr lang="en-IN" dirty="0"/>
+          </a:p>
+          <a:p>
+            <a:endParaRPr lang="en-IN" dirty="0"/>
+          </a:p>
+          <a:p>
+            <a:endParaRPr lang="en-IN" dirty="0"/>
+          </a:p>
+          <a:p>
+            <a:r>
+              <a:rPr lang="en-IN" dirty="0"/>
+              <a:t>4</a:t>
+            </a:r>
+          </a:p>
+        </p:txBody>
+      </p:sp>
+      <p:sp>
+        <p:nvSpPr>
+          <p:cNvPr id="5" name="TextBox 4">
+            <a:extLst>
+              <a:ext uri="{FF2B5EF4-FFF2-40B4-BE49-F238E27FC236}">
+                <a16:creationId xmlns:a16="http://schemas.microsoft.com/office/drawing/2014/main" id="{FED3EF3B-DF3F-F3CC-E63E-8FADFF5ED014}"/>
+              </a:ext>
+            </a:extLst>
+          </p:cNvPr>
+          <p:cNvSpPr txBox="1"/>
+          <p:nvPr/>
+        </p:nvSpPr>
+        <p:spPr>
+          <a:xfrm>
+            <a:off x="457201" y="1773455"/>
+            <a:ext cx="3980852" cy="4801314"/>
+          </a:xfrm>
+          <a:prstGeom prst="rect">
+            <a:avLst/>
+          </a:prstGeom>
+          <a:solidFill>
+            <a:schemeClr val="bg2">
+              <a:lumMod val="90000"/>
+            </a:schemeClr>
+          </a:solidFill>
+        </p:spPr>
+        <p:txBody>
+          <a:bodyPr wrap="square" rtlCol="0" anchor="ctr">
+            <a:spAutoFit/>
+          </a:bodyPr>
+          <a:lstStyle/>
+          <a:p>
+            <a:pPr algn="ctr"/>
+            <a:endParaRPr lang="en-IN" dirty="0"/>
+          </a:p>
+          <a:p>
+            <a:pPr algn="ctr"/>
+            <a:endParaRPr lang="en-IN" dirty="0"/>
+          </a:p>
+          <a:p>
+            <a:pPr algn="ctr"/>
+            <a:endParaRPr lang="en-IN" dirty="0"/>
+          </a:p>
+          <a:p>
+            <a:pPr algn="ctr"/>
+            <a:endParaRPr lang="en-IN" dirty="0"/>
+          </a:p>
+          <a:p>
+            <a:pPr algn="ctr"/>
+            <a:endParaRPr lang="en-IN" dirty="0"/>
+          </a:p>
+          <a:p>
+            <a:pPr algn="ctr"/>
+            <a:endParaRPr lang="en-IN" dirty="0"/>
+          </a:p>
+          <a:p>
+            <a:pPr algn="ctr"/>
+            <a:endParaRPr lang="en-IN" dirty="0"/>
+          </a:p>
+          <a:p>
+            <a:pPr algn="ctr"/>
+            <a:endParaRPr lang="en-IN" dirty="0"/>
+          </a:p>
+          <a:p>
+            <a:pPr algn="ctr"/>
+            <a:endParaRPr lang="en-IN" dirty="0"/>
+          </a:p>
+          <a:p>
+            <a:pPr algn="ctr"/>
+            <a:endParaRPr lang="en-IN" dirty="0"/>
+          </a:p>
+          <a:p>
+            <a:pPr algn="ctr"/>
+            <a:endParaRPr lang="en-IN" dirty="0"/>
+          </a:p>
+          <a:p>
+            <a:pPr algn="ctr"/>
+            <a:endParaRPr lang="en-IN" dirty="0"/>
+          </a:p>
+          <a:p>
+            <a:pPr algn="ctr"/>
+            <a:endParaRPr lang="en-IN" dirty="0"/>
+          </a:p>
+          <a:p>
+            <a:pPr algn="ctr"/>
+            <a:endParaRPr lang="en-IN" dirty="0"/>
+          </a:p>
+          <a:p>
+            <a:pPr algn="ctr"/>
+            <a:endParaRPr lang="en-IN" dirty="0"/>
+          </a:p>
+          <a:p>
+            <a:pPr algn="ctr"/>
+            <a:endParaRPr lang="en-IN" dirty="0"/>
+          </a:p>
+          <a:p>
+            <a:r>
+              <a:rPr lang="en-IN" dirty="0"/>
+              <a:t>1</a:t>
+            </a:r>
+          </a:p>
+        </p:txBody>
+      </p:sp>
+    </p:spTree>
+    <p:extLst>
+      <p:ext uri="{BB962C8B-B14F-4D97-AF65-F5344CB8AC3E}">
+        <p14:creationId xmlns:p14="http://schemas.microsoft.com/office/powerpoint/2010/main" val="1153460373"/>
+      </p:ext>
+    </p:extLst>
+  </p:cSld>
+  <p:clrMapOvr>
+    <a:masterClrMapping/>
+  </p:clrMapOvr>
+</p:sld>
+</file>
+
+<file path=ppt/slides/slide7.xml><?xml version="1.0" encoding="utf-8"?>
+<p:sld xmlns:a="http://schemas.openxmlformats.org/drawingml/2006/main" xmlns:r="http://schemas.openxmlformats.org/officeDocument/2006/relationships" xmlns:p="http://schemas.openxmlformats.org/presentationml/2006/main">
+  <p:cSld>
+    <p:spTree>
+      <p:nvGrpSpPr>
+        <p:cNvPr id="1" name="">
+          <a:extLst>
+            <a:ext uri="{FF2B5EF4-FFF2-40B4-BE49-F238E27FC236}">
+              <a16:creationId xmlns:a16="http://schemas.microsoft.com/office/drawing/2014/main" id="{04E1EE28-6ABC-7A05-017D-00173CFBE784}"/>
+            </a:ext>
+          </a:extLst>
+        </p:cNvPr>
+        <p:cNvGrpSpPr/>
+        <p:nvPr/>
+      </p:nvGrpSpPr>
+      <p:grpSpPr>
+        <a:xfrm>
+          <a:off x="0" y="0"/>
+          <a:ext cx="0" cy="0"/>
+          <a:chOff x="0" y="0"/>
+          <a:chExt cx="0" cy="0"/>
+        </a:xfrm>
+      </p:grpSpPr>
+      <p:sp>
+        <p:nvSpPr>
+          <p:cNvPr id="2" name="Title 1">
+            <a:extLst>
+              <a:ext uri="{FF2B5EF4-FFF2-40B4-BE49-F238E27FC236}">
+                <a16:creationId xmlns:a16="http://schemas.microsoft.com/office/drawing/2014/main" id="{F509857C-7F82-7818-D538-2417C306A735}"/>
+              </a:ext>
+            </a:extLst>
+          </p:cNvPr>
+          <p:cNvSpPr>
+            <a:spLocks noGrp="1"/>
+          </p:cNvSpPr>
+          <p:nvPr>
+            <p:ph type="title"/>
+          </p:nvPr>
+        </p:nvSpPr>
+        <p:spPr>
+          <a:xfrm>
+            <a:off x="457201" y="342197"/>
+            <a:ext cx="8229600" cy="1143000"/>
+          </a:xfrm>
+          <a:solidFill>
+            <a:schemeClr val="accent4">
+              <a:lumMod val="20000"/>
+              <a:lumOff val="80000"/>
+            </a:schemeClr>
+          </a:solidFill>
+        </p:spPr>
+        <p:txBody>
+          <a:bodyPr/>
+          <a:lstStyle/>
+          <a:p>
+            <a:endParaRPr lang="en-IN" dirty="0"/>
+          </a:p>
+        </p:txBody>
+      </p:sp>
+      <p:sp>
+        <p:nvSpPr>
+          <p:cNvPr id="9" name="TextBox 8">
+            <a:extLst>
+              <a:ext uri="{FF2B5EF4-FFF2-40B4-BE49-F238E27FC236}">
+                <a16:creationId xmlns:a16="http://schemas.microsoft.com/office/drawing/2014/main" id="{13EA3866-5434-87EC-B88B-AC642EDB05C0}"/>
+              </a:ext>
+            </a:extLst>
+          </p:cNvPr>
+          <p:cNvSpPr txBox="1"/>
+          <p:nvPr/>
+        </p:nvSpPr>
+        <p:spPr>
+          <a:xfrm>
+            <a:off x="461818" y="4358778"/>
+            <a:ext cx="4114801" cy="2308324"/>
+          </a:xfrm>
+          <a:prstGeom prst="rect">
+            <a:avLst/>
+          </a:prstGeom>
+          <a:solidFill>
+            <a:schemeClr val="accent3">
+              <a:lumMod val="40000"/>
+              <a:lumOff val="60000"/>
+            </a:schemeClr>
+          </a:solidFill>
+        </p:spPr>
+        <p:txBody>
+          <a:bodyPr wrap="square" rtlCol="0">
+            <a:spAutoFit/>
+          </a:bodyPr>
+          <a:lstStyle/>
+          <a:p>
+            <a:endParaRPr lang="en-US" dirty="0"/>
+          </a:p>
+          <a:p>
+            <a:endParaRPr lang="en-IN" dirty="0"/>
+          </a:p>
+          <a:p>
+            <a:endParaRPr lang="en-IN" dirty="0"/>
+          </a:p>
+          <a:p>
+            <a:endParaRPr lang="en-IN" dirty="0"/>
+          </a:p>
+          <a:p>
+            <a:endParaRPr lang="en-IN" dirty="0"/>
+          </a:p>
+          <a:p>
+            <a:endParaRPr lang="en-IN" dirty="0"/>
+          </a:p>
+          <a:p>
+            <a:endParaRPr lang="en-IN" dirty="0"/>
+          </a:p>
+          <a:p>
+            <a:r>
+              <a:rPr lang="en-IN" dirty="0"/>
+              <a:t>4</a:t>
+            </a:r>
+          </a:p>
+        </p:txBody>
+      </p:sp>
+      <p:sp>
+        <p:nvSpPr>
+          <p:cNvPr id="3" name="TextBox 2">
+            <a:extLst>
+              <a:ext uri="{FF2B5EF4-FFF2-40B4-BE49-F238E27FC236}">
+                <a16:creationId xmlns:a16="http://schemas.microsoft.com/office/drawing/2014/main" id="{576618D2-E8AF-15F9-8329-6AB75FEEFB83}"/>
+              </a:ext>
+            </a:extLst>
+          </p:cNvPr>
+          <p:cNvSpPr txBox="1"/>
+          <p:nvPr/>
+        </p:nvSpPr>
+        <p:spPr>
+          <a:xfrm>
+            <a:off x="457199" y="1865788"/>
+            <a:ext cx="4114801" cy="2308324"/>
+          </a:xfrm>
+          <a:prstGeom prst="rect">
+            <a:avLst/>
+          </a:prstGeom>
+          <a:solidFill>
+            <a:schemeClr val="tx2">
+              <a:lumMod val="20000"/>
+              <a:lumOff val="80000"/>
+            </a:schemeClr>
+          </a:solidFill>
+        </p:spPr>
+        <p:txBody>
+          <a:bodyPr wrap="square" rtlCol="0">
+            <a:spAutoFit/>
+          </a:bodyPr>
+          <a:lstStyle/>
+          <a:p>
+            <a:endParaRPr lang="en-US" dirty="0"/>
+          </a:p>
+          <a:p>
+            <a:endParaRPr lang="en-IN" dirty="0"/>
+          </a:p>
+          <a:p>
+            <a:endParaRPr lang="en-IN" dirty="0"/>
+          </a:p>
+          <a:p>
+            <a:endParaRPr lang="en-IN" dirty="0"/>
+          </a:p>
+          <a:p>
+            <a:endParaRPr lang="en-IN" dirty="0"/>
+          </a:p>
+          <a:p>
+            <a:endParaRPr lang="en-IN" dirty="0"/>
+          </a:p>
+          <a:p>
+            <a:endParaRPr lang="en-IN" dirty="0"/>
+          </a:p>
+          <a:p>
+            <a:r>
+              <a:rPr lang="en-IN" dirty="0"/>
+              <a:t>4</a:t>
+            </a:r>
+          </a:p>
+        </p:txBody>
+      </p:sp>
+      <p:sp>
+        <p:nvSpPr>
+          <p:cNvPr id="5" name="TextBox 4">
+            <a:extLst>
+              <a:ext uri="{FF2B5EF4-FFF2-40B4-BE49-F238E27FC236}">
+                <a16:creationId xmlns:a16="http://schemas.microsoft.com/office/drawing/2014/main" id="{FED3EF3B-DF3F-F3CC-E63E-8FADFF5ED014}"/>
+              </a:ext>
+            </a:extLst>
+          </p:cNvPr>
+          <p:cNvSpPr txBox="1"/>
+          <p:nvPr/>
+        </p:nvSpPr>
+        <p:spPr>
+          <a:xfrm>
+            <a:off x="4701330" y="1865788"/>
+            <a:ext cx="3980852" cy="4801314"/>
+          </a:xfrm>
+          <a:prstGeom prst="rect">
+            <a:avLst/>
+          </a:prstGeom>
+          <a:solidFill>
+            <a:schemeClr val="bg2">
+              <a:lumMod val="90000"/>
+            </a:schemeClr>
+          </a:solidFill>
+        </p:spPr>
+        <p:txBody>
+          <a:bodyPr wrap="square" rtlCol="0" anchor="ctr">
+            <a:spAutoFit/>
+          </a:bodyPr>
+          <a:lstStyle/>
+          <a:p>
+            <a:pPr algn="ctr"/>
+            <a:endParaRPr lang="en-IN" dirty="0"/>
+          </a:p>
+          <a:p>
+            <a:pPr algn="ctr"/>
+            <a:endParaRPr lang="en-IN" dirty="0"/>
+          </a:p>
+          <a:p>
+            <a:pPr algn="ctr"/>
+            <a:endParaRPr lang="en-IN" dirty="0"/>
+          </a:p>
+          <a:p>
+            <a:pPr algn="ctr"/>
+            <a:endParaRPr lang="en-IN" dirty="0"/>
+          </a:p>
+          <a:p>
+            <a:pPr algn="ctr"/>
+            <a:endParaRPr lang="en-IN" dirty="0"/>
+          </a:p>
+          <a:p>
+            <a:pPr algn="ctr"/>
+            <a:endParaRPr lang="en-IN" dirty="0"/>
+          </a:p>
+          <a:p>
+            <a:pPr algn="ctr"/>
+            <a:endParaRPr lang="en-IN" dirty="0"/>
+          </a:p>
+          <a:p>
+            <a:pPr algn="ctr"/>
+            <a:endParaRPr lang="en-IN" dirty="0"/>
+          </a:p>
+          <a:p>
+            <a:pPr algn="ctr"/>
+            <a:endParaRPr lang="en-IN" dirty="0"/>
+          </a:p>
+          <a:p>
+            <a:pPr algn="ctr"/>
+            <a:endParaRPr lang="en-IN" dirty="0"/>
+          </a:p>
+          <a:p>
+            <a:pPr algn="ctr"/>
+            <a:endParaRPr lang="en-IN" dirty="0"/>
+          </a:p>
+          <a:p>
+            <a:pPr algn="ctr"/>
+            <a:endParaRPr lang="en-IN" dirty="0"/>
+          </a:p>
+          <a:p>
+            <a:pPr algn="ctr"/>
+            <a:endParaRPr lang="en-IN" dirty="0"/>
+          </a:p>
+          <a:p>
+            <a:pPr algn="ctr"/>
+            <a:endParaRPr lang="en-IN" dirty="0"/>
+          </a:p>
+          <a:p>
+            <a:pPr algn="ctr"/>
+            <a:endParaRPr lang="en-IN" dirty="0"/>
+          </a:p>
+          <a:p>
+            <a:pPr algn="ctr"/>
+            <a:endParaRPr lang="en-IN" dirty="0"/>
+          </a:p>
+          <a:p>
+            <a:r>
+              <a:rPr lang="en-IN" dirty="0"/>
+              <a:t>1</a:t>
+            </a:r>
+          </a:p>
+        </p:txBody>
+      </p:sp>
+    </p:spTree>
+    <p:extLst>
+      <p:ext uri="{BB962C8B-B14F-4D97-AF65-F5344CB8AC3E}">
+        <p14:creationId xmlns:p14="http://schemas.microsoft.com/office/powerpoint/2010/main" val="1949459062"/>
+      </p:ext>
+    </p:extLst>
+  </p:cSld>
+  <p:clrMapOvr>
+    <a:masterClrMapping/>
+  </p:clrMapOvr>
+</p:sld>
+</file>
+
+<file path=ppt/slides/slide8.xml><?xml version="1.0" encoding="utf-8"?>
 <p:sld xmlns:a="http://schemas.openxmlformats.org/drawingml/2006/main" xmlns:r="http://schemas.openxmlformats.org/officeDocument/2006/relationships" xmlns:p="http://schemas.openxmlformats.org/presentationml/2006/main">
   <p:cSld>
     <p:spTree>
@@ -4161,18 +5787,26 @@
             <a:endParaRPr lang="en-IN" dirty="0"/>
           </a:p>
           <a:p>
-            <a:endParaRPr lang="en-IN" dirty="0"/>
-          </a:p>
-          <a:p>
-            <a:endParaRPr lang="en-IN" dirty="0"/>
-          </a:p>
-          <a:p>
-            <a:endParaRPr lang="en-IN" dirty="0"/>
-          </a:p>
-          <a:p>
-            <a:endParaRPr lang="en-IN" dirty="0"/>
-          </a:p>
-          <a:p>
+            <a:pPr algn="ctr"/>
+            <a:r>
+              <a:rPr lang="en-IN" dirty="0"/>
+              <a:t>4</a:t>
+            </a:r>
+          </a:p>
+          <a:p>
+            <a:pPr algn="ctr"/>
+            <a:endParaRPr lang="en-IN" dirty="0"/>
+          </a:p>
+          <a:p>
+            <a:pPr algn="ctr"/>
+            <a:endParaRPr lang="en-IN" dirty="0"/>
+          </a:p>
+          <a:p>
+            <a:pPr algn="ctr"/>
+            <a:endParaRPr lang="en-IN" dirty="0"/>
+          </a:p>
+          <a:p>
+            <a:pPr algn="ctr"/>
             <a:endParaRPr lang="en-IN" dirty="0"/>
           </a:p>
         </p:txBody>
@@ -4222,18 +5856,26 @@
             <a:endParaRPr lang="en-IN" dirty="0"/>
           </a:p>
           <a:p>
-            <a:endParaRPr lang="en-IN" dirty="0"/>
-          </a:p>
-          <a:p>
-            <a:endParaRPr lang="en-IN" dirty="0"/>
-          </a:p>
-          <a:p>
-            <a:endParaRPr lang="en-IN" dirty="0"/>
-          </a:p>
-          <a:p>
-            <a:endParaRPr lang="en-IN" dirty="0"/>
-          </a:p>
-          <a:p>
+            <a:pPr algn="ctr"/>
+            <a:r>
+              <a:rPr lang="en-IN" dirty="0"/>
+              <a:t>4</a:t>
+            </a:r>
+          </a:p>
+          <a:p>
+            <a:pPr algn="ctr"/>
+            <a:endParaRPr lang="en-IN" dirty="0"/>
+          </a:p>
+          <a:p>
+            <a:pPr algn="ctr"/>
+            <a:endParaRPr lang="en-IN" dirty="0"/>
+          </a:p>
+          <a:p>
+            <a:pPr algn="ctr"/>
+            <a:endParaRPr lang="en-IN" dirty="0"/>
+          </a:p>
+          <a:p>
+            <a:pPr algn="ctr"/>
             <a:endParaRPr lang="en-IN" dirty="0"/>
           </a:p>
         </p:txBody>
@@ -4280,15 +5922,22 @@
             <a:endParaRPr lang="en-IN" dirty="0"/>
           </a:p>
           <a:p>
-            <a:endParaRPr lang="en-IN" dirty="0"/>
-          </a:p>
-          <a:p>
-            <a:endParaRPr lang="en-IN" dirty="0"/>
-          </a:p>
-          <a:p>
-            <a:endParaRPr lang="en-IN" dirty="0"/>
-          </a:p>
-          <a:p>
+            <a:pPr algn="ctr"/>
+            <a:r>
+              <a:rPr lang="en-IN" dirty="0"/>
+              <a:t>2</a:t>
+            </a:r>
+          </a:p>
+          <a:p>
+            <a:pPr algn="ctr"/>
+            <a:endParaRPr lang="en-IN" dirty="0"/>
+          </a:p>
+          <a:p>
+            <a:pPr algn="ctr"/>
+            <a:endParaRPr lang="en-IN" dirty="0"/>
+          </a:p>
+          <a:p>
+            <a:pPr algn="ctr"/>
             <a:endParaRPr lang="en-IN" dirty="0"/>
           </a:p>
         </p:txBody>
@@ -4306,7 +5955,7 @@
 </p:sld>
 </file>
 
-<file path=ppt/slides/slide7.xml><?xml version="1.0" encoding="utf-8"?>
+<file path=ppt/slides/slide9.xml><?xml version="1.0" encoding="utf-8"?>
 <p:sld xmlns:a="http://schemas.openxmlformats.org/drawingml/2006/main" xmlns:r="http://schemas.openxmlformats.org/officeDocument/2006/relationships" xmlns:p="http://schemas.openxmlformats.org/presentationml/2006/main">
   <p:cSld>
     <p:spTree>
@@ -4421,7 +6070,10 @@
             <a:endParaRPr lang="en-IN" dirty="0"/>
           </a:p>
           <a:p>
-            <a:endParaRPr lang="en-IN" dirty="0"/>
+            <a:r>
+              <a:rPr lang="en-IN" dirty="0"/>
+              <a:t>4</a:t>
+            </a:r>
           </a:p>
         </p:txBody>
       </p:sp>
@@ -4482,7 +6134,10 @@
             <a:endParaRPr lang="en-IN" dirty="0"/>
           </a:p>
           <a:p>
-            <a:endParaRPr lang="en-IN" dirty="0"/>
+            <a:r>
+              <a:rPr lang="en-IN" dirty="0"/>
+              <a:t>4</a:t>
+            </a:r>
           </a:p>
         </p:txBody>
       </p:sp>
@@ -4537,7 +6192,10 @@
             <a:endParaRPr lang="en-IN" dirty="0"/>
           </a:p>
           <a:p>
-            <a:endParaRPr lang="en-IN" dirty="0"/>
+            <a:r>
+              <a:rPr lang="en-IN" dirty="0"/>
+              <a:t>2</a:t>
+            </a:r>
           </a:p>
         </p:txBody>
       </p:sp>
@@ -4545,624 +6203,6 @@
     <p:extLst>
       <p:ext uri="{BB962C8B-B14F-4D97-AF65-F5344CB8AC3E}">
         <p14:creationId xmlns:p14="http://schemas.microsoft.com/office/powerpoint/2010/main" val="3541454463"/>
-      </p:ext>
-    </p:extLst>
-  </p:cSld>
-  <p:clrMapOvr>
-    <a:masterClrMapping/>
-  </p:clrMapOvr>
-</p:sld>
-</file>
-
-<file path=ppt/slides/slide8.xml><?xml version="1.0" encoding="utf-8"?>
-<p:sld xmlns:a="http://schemas.openxmlformats.org/drawingml/2006/main" xmlns:r="http://schemas.openxmlformats.org/officeDocument/2006/relationships" xmlns:p="http://schemas.openxmlformats.org/presentationml/2006/main">
-  <p:cSld>
-    <p:spTree>
-      <p:nvGrpSpPr>
-        <p:cNvPr id="1" name="">
-          <a:extLst>
-            <a:ext uri="{FF2B5EF4-FFF2-40B4-BE49-F238E27FC236}">
-              <a16:creationId xmlns:a16="http://schemas.microsoft.com/office/drawing/2014/main" id="{FD8A78F3-D0D0-5C8D-68F4-44127AC56C0C}"/>
-            </a:ext>
-          </a:extLst>
-        </p:cNvPr>
-        <p:cNvGrpSpPr/>
-        <p:nvPr/>
-      </p:nvGrpSpPr>
-      <p:grpSpPr>
-        <a:xfrm>
-          <a:off x="0" y="0"/>
-          <a:ext cx="0" cy="0"/>
-          <a:chOff x="0" y="0"/>
-          <a:chExt cx="0" cy="0"/>
-        </a:xfrm>
-      </p:grpSpPr>
-      <p:sp>
-        <p:nvSpPr>
-          <p:cNvPr id="2" name="Title 1">
-            <a:extLst>
-              <a:ext uri="{FF2B5EF4-FFF2-40B4-BE49-F238E27FC236}">
-                <a16:creationId xmlns:a16="http://schemas.microsoft.com/office/drawing/2014/main" id="{787B718D-9204-CCFF-BEC3-4BF9E55E542B}"/>
-              </a:ext>
-            </a:extLst>
-          </p:cNvPr>
-          <p:cNvSpPr>
-            <a:spLocks noGrp="1"/>
-          </p:cNvSpPr>
-          <p:nvPr>
-            <p:ph type="title"/>
-          </p:nvPr>
-        </p:nvSpPr>
-        <p:spPr>
-          <a:xfrm>
-            <a:off x="457201" y="342197"/>
-            <a:ext cx="8229600" cy="1143000"/>
-          </a:xfrm>
-          <a:solidFill>
-            <a:schemeClr val="accent4">
-              <a:lumMod val="20000"/>
-              <a:lumOff val="80000"/>
-            </a:schemeClr>
-          </a:solidFill>
-        </p:spPr>
-        <p:txBody>
-          <a:bodyPr/>
-          <a:lstStyle/>
-          <a:p>
-            <a:endParaRPr lang="en-IN" dirty="0"/>
-          </a:p>
-        </p:txBody>
-      </p:sp>
-      <p:sp>
-        <p:nvSpPr>
-          <p:cNvPr id="4" name="TextBox 3">
-            <a:extLst>
-              <a:ext uri="{FF2B5EF4-FFF2-40B4-BE49-F238E27FC236}">
-                <a16:creationId xmlns:a16="http://schemas.microsoft.com/office/drawing/2014/main" id="{B6CCBFFB-EBFF-CBDB-2D01-CE3B04836125}"/>
-              </a:ext>
-            </a:extLst>
-          </p:cNvPr>
-          <p:cNvSpPr txBox="1"/>
-          <p:nvPr/>
-        </p:nvSpPr>
-        <p:spPr>
-          <a:xfrm>
-            <a:off x="457199" y="4318484"/>
-            <a:ext cx="4018548" cy="2430000"/>
-          </a:xfrm>
-          <a:prstGeom prst="rect">
-            <a:avLst/>
-          </a:prstGeom>
-          <a:solidFill>
-            <a:schemeClr val="bg2">
-              <a:lumMod val="90000"/>
-            </a:schemeClr>
-          </a:solidFill>
-        </p:spPr>
-        <p:txBody>
-          <a:bodyPr wrap="square" rtlCol="0">
-            <a:spAutoFit/>
-          </a:bodyPr>
-          <a:lstStyle/>
-          <a:p>
-            <a:endParaRPr lang="en-US" dirty="0"/>
-          </a:p>
-          <a:p>
-            <a:endParaRPr lang="en-IN" dirty="0"/>
-          </a:p>
-          <a:p>
-            <a:endParaRPr lang="en-IN" dirty="0"/>
-          </a:p>
-          <a:p>
-            <a:endParaRPr lang="en-IN" dirty="0"/>
-          </a:p>
-          <a:p>
-            <a:endParaRPr lang="en-IN" dirty="0"/>
-          </a:p>
-          <a:p>
-            <a:endParaRPr lang="en-IN" dirty="0"/>
-          </a:p>
-          <a:p>
-            <a:endParaRPr lang="en-IN" dirty="0"/>
-          </a:p>
-          <a:p>
-            <a:endParaRPr lang="en-IN" dirty="0"/>
-          </a:p>
-          <a:p>
-            <a:endParaRPr lang="en-IN" dirty="0"/>
-          </a:p>
-        </p:txBody>
-      </p:sp>
-      <p:sp>
-        <p:nvSpPr>
-          <p:cNvPr id="6" name="TextBox 5">
-            <a:extLst>
-              <a:ext uri="{FF2B5EF4-FFF2-40B4-BE49-F238E27FC236}">
-                <a16:creationId xmlns:a16="http://schemas.microsoft.com/office/drawing/2014/main" id="{B8FC0409-2633-A65E-D5B6-0568F20DC12D}"/>
-              </a:ext>
-            </a:extLst>
-          </p:cNvPr>
-          <p:cNvSpPr txBox="1"/>
-          <p:nvPr/>
-        </p:nvSpPr>
-        <p:spPr>
-          <a:xfrm>
-            <a:off x="457201" y="1692174"/>
-            <a:ext cx="4018546" cy="2430000"/>
-          </a:xfrm>
-          <a:prstGeom prst="rect">
-            <a:avLst/>
-          </a:prstGeom>
-          <a:solidFill>
-            <a:schemeClr val="accent1">
-              <a:lumMod val="20000"/>
-              <a:lumOff val="80000"/>
-            </a:schemeClr>
-          </a:solidFill>
-        </p:spPr>
-        <p:txBody>
-          <a:bodyPr wrap="square" rtlCol="0">
-            <a:spAutoFit/>
-          </a:bodyPr>
-          <a:lstStyle/>
-          <a:p>
-            <a:endParaRPr lang="en-US" dirty="0"/>
-          </a:p>
-          <a:p>
-            <a:endParaRPr lang="en-IN" dirty="0"/>
-          </a:p>
-          <a:p>
-            <a:endParaRPr lang="en-IN" dirty="0"/>
-          </a:p>
-          <a:p>
-            <a:endParaRPr lang="en-IN" dirty="0"/>
-          </a:p>
-          <a:p>
-            <a:endParaRPr lang="en-IN" dirty="0"/>
-          </a:p>
-          <a:p>
-            <a:endParaRPr lang="en-IN" dirty="0"/>
-          </a:p>
-          <a:p>
-            <a:endParaRPr lang="en-IN" dirty="0"/>
-          </a:p>
-        </p:txBody>
-      </p:sp>
-      <p:sp>
-        <p:nvSpPr>
-          <p:cNvPr id="3" name="TextBox 2">
-            <a:extLst>
-              <a:ext uri="{FF2B5EF4-FFF2-40B4-BE49-F238E27FC236}">
-                <a16:creationId xmlns:a16="http://schemas.microsoft.com/office/drawing/2014/main" id="{0893CD41-C665-7211-BA83-10859F140BF9}"/>
-              </a:ext>
-            </a:extLst>
-          </p:cNvPr>
-          <p:cNvSpPr txBox="1"/>
-          <p:nvPr/>
-        </p:nvSpPr>
-        <p:spPr>
-          <a:xfrm>
-            <a:off x="4668253" y="1692174"/>
-            <a:ext cx="4018546" cy="2430000"/>
-          </a:xfrm>
-          <a:prstGeom prst="rect">
-            <a:avLst/>
-          </a:prstGeom>
-          <a:solidFill>
-            <a:schemeClr val="accent3">
-              <a:lumMod val="40000"/>
-              <a:lumOff val="60000"/>
-            </a:schemeClr>
-          </a:solidFill>
-        </p:spPr>
-        <p:txBody>
-          <a:bodyPr wrap="square" rtlCol="0">
-            <a:spAutoFit/>
-          </a:bodyPr>
-          <a:lstStyle/>
-          <a:p>
-            <a:endParaRPr lang="en-US" dirty="0"/>
-          </a:p>
-          <a:p>
-            <a:endParaRPr lang="en-IN" dirty="0"/>
-          </a:p>
-          <a:p>
-            <a:endParaRPr lang="en-IN" dirty="0"/>
-          </a:p>
-          <a:p>
-            <a:endParaRPr lang="en-IN" dirty="0"/>
-          </a:p>
-          <a:p>
-            <a:endParaRPr lang="en-IN" dirty="0"/>
-          </a:p>
-          <a:p>
-            <a:endParaRPr lang="en-IN" dirty="0"/>
-          </a:p>
-          <a:p>
-            <a:endParaRPr lang="en-IN" dirty="0"/>
-          </a:p>
-        </p:txBody>
-      </p:sp>
-      <p:sp>
-        <p:nvSpPr>
-          <p:cNvPr id="7" name="TextBox 6">
-            <a:extLst>
-              <a:ext uri="{FF2B5EF4-FFF2-40B4-BE49-F238E27FC236}">
-                <a16:creationId xmlns:a16="http://schemas.microsoft.com/office/drawing/2014/main" id="{23A99C75-D42A-F902-FE17-9A2ADA643591}"/>
-              </a:ext>
-            </a:extLst>
-          </p:cNvPr>
-          <p:cNvSpPr txBox="1"/>
-          <p:nvPr/>
-        </p:nvSpPr>
-        <p:spPr>
-          <a:xfrm>
-            <a:off x="4668253" y="4318484"/>
-            <a:ext cx="4018548" cy="2430000"/>
-          </a:xfrm>
-          <a:prstGeom prst="rect">
-            <a:avLst/>
-          </a:prstGeom>
-          <a:solidFill>
-            <a:schemeClr val="accent5">
-              <a:lumMod val="20000"/>
-              <a:lumOff val="80000"/>
-            </a:schemeClr>
-          </a:solidFill>
-        </p:spPr>
-        <p:txBody>
-          <a:bodyPr wrap="square" rtlCol="0">
-            <a:spAutoFit/>
-          </a:bodyPr>
-          <a:lstStyle/>
-          <a:p>
-            <a:endParaRPr lang="en-US" dirty="0"/>
-          </a:p>
-          <a:p>
-            <a:endParaRPr lang="en-IN" dirty="0"/>
-          </a:p>
-          <a:p>
-            <a:endParaRPr lang="en-IN" dirty="0"/>
-          </a:p>
-          <a:p>
-            <a:endParaRPr lang="en-IN" dirty="0"/>
-          </a:p>
-          <a:p>
-            <a:endParaRPr lang="en-IN" dirty="0"/>
-          </a:p>
-          <a:p>
-            <a:endParaRPr lang="en-IN" dirty="0"/>
-          </a:p>
-          <a:p>
-            <a:endParaRPr lang="en-IN" dirty="0"/>
-          </a:p>
-          <a:p>
-            <a:endParaRPr lang="en-IN" dirty="0"/>
-          </a:p>
-          <a:p>
-            <a:endParaRPr lang="en-IN" dirty="0"/>
-          </a:p>
-        </p:txBody>
-      </p:sp>
-    </p:spTree>
-    <p:extLst>
-      <p:ext uri="{BB962C8B-B14F-4D97-AF65-F5344CB8AC3E}">
-        <p14:creationId xmlns:p14="http://schemas.microsoft.com/office/powerpoint/2010/main" val="2923260744"/>
-      </p:ext>
-    </p:extLst>
-  </p:cSld>
-  <p:clrMapOvr>
-    <a:masterClrMapping/>
-  </p:clrMapOvr>
-</p:sld>
-</file>
-
-<file path=ppt/slides/slide9.xml><?xml version="1.0" encoding="utf-8"?>
-<p:sld xmlns:a="http://schemas.openxmlformats.org/drawingml/2006/main" xmlns:r="http://schemas.openxmlformats.org/officeDocument/2006/relationships" xmlns:p="http://schemas.openxmlformats.org/presentationml/2006/main">
-  <p:cSld>
-    <p:spTree>
-      <p:nvGrpSpPr>
-        <p:cNvPr id="1" name="">
-          <a:extLst>
-            <a:ext uri="{FF2B5EF4-FFF2-40B4-BE49-F238E27FC236}">
-              <a16:creationId xmlns:a16="http://schemas.microsoft.com/office/drawing/2014/main" id="{04E1EE28-6ABC-7A05-017D-00173CFBE784}"/>
-            </a:ext>
-          </a:extLst>
-        </p:cNvPr>
-        <p:cNvGrpSpPr/>
-        <p:nvPr/>
-      </p:nvGrpSpPr>
-      <p:grpSpPr>
-        <a:xfrm>
-          <a:off x="0" y="0"/>
-          <a:ext cx="0" cy="0"/>
-          <a:chOff x="0" y="0"/>
-          <a:chExt cx="0" cy="0"/>
-        </a:xfrm>
-      </p:grpSpPr>
-      <p:sp>
-        <p:nvSpPr>
-          <p:cNvPr id="2" name="Title 1">
-            <a:extLst>
-              <a:ext uri="{FF2B5EF4-FFF2-40B4-BE49-F238E27FC236}">
-                <a16:creationId xmlns:a16="http://schemas.microsoft.com/office/drawing/2014/main" id="{F509857C-7F82-7818-D538-2417C306A735}"/>
-              </a:ext>
-            </a:extLst>
-          </p:cNvPr>
-          <p:cNvSpPr>
-            <a:spLocks noGrp="1"/>
-          </p:cNvSpPr>
-          <p:nvPr>
-            <p:ph type="title"/>
-          </p:nvPr>
-        </p:nvSpPr>
-        <p:spPr>
-          <a:xfrm>
-            <a:off x="457201" y="342197"/>
-            <a:ext cx="8229600" cy="1143000"/>
-          </a:xfrm>
-          <a:solidFill>
-            <a:schemeClr val="accent4">
-              <a:lumMod val="20000"/>
-              <a:lumOff val="80000"/>
-            </a:schemeClr>
-          </a:solidFill>
-        </p:spPr>
-        <p:txBody>
-          <a:bodyPr/>
-          <a:lstStyle/>
-          <a:p>
-            <a:endParaRPr lang="en-IN" dirty="0"/>
-          </a:p>
-        </p:txBody>
-      </p:sp>
-      <p:sp>
-        <p:nvSpPr>
-          <p:cNvPr id="4" name="TextBox 3">
-            <a:extLst>
-              <a:ext uri="{FF2B5EF4-FFF2-40B4-BE49-F238E27FC236}">
-                <a16:creationId xmlns:a16="http://schemas.microsoft.com/office/drawing/2014/main" id="{7D5CF9BA-B724-D7FE-AE14-4FC2F9017754}"/>
-              </a:ext>
-            </a:extLst>
-          </p:cNvPr>
-          <p:cNvSpPr txBox="1"/>
-          <p:nvPr/>
-        </p:nvSpPr>
-        <p:spPr>
-          <a:xfrm>
-            <a:off x="457199" y="4318484"/>
-            <a:ext cx="2610000" cy="2430000"/>
-          </a:xfrm>
-          <a:prstGeom prst="rect">
-            <a:avLst/>
-          </a:prstGeom>
-          <a:solidFill>
-            <a:schemeClr val="bg2">
-              <a:lumMod val="90000"/>
-            </a:schemeClr>
-          </a:solidFill>
-        </p:spPr>
-        <p:txBody>
-          <a:bodyPr wrap="square" rtlCol="0">
-            <a:spAutoFit/>
-          </a:bodyPr>
-          <a:lstStyle/>
-          <a:p>
-            <a:endParaRPr lang="en-US" dirty="0"/>
-          </a:p>
-          <a:p>
-            <a:endParaRPr lang="en-IN" dirty="0"/>
-          </a:p>
-          <a:p>
-            <a:endParaRPr lang="en-IN" dirty="0"/>
-          </a:p>
-          <a:p>
-            <a:endParaRPr lang="en-IN" dirty="0"/>
-          </a:p>
-          <a:p>
-            <a:endParaRPr lang="en-IN" dirty="0"/>
-          </a:p>
-          <a:p>
-            <a:endParaRPr lang="en-IN" dirty="0"/>
-          </a:p>
-          <a:p>
-            <a:endParaRPr lang="en-IN" dirty="0"/>
-          </a:p>
-          <a:p>
-            <a:endParaRPr lang="en-IN" dirty="0"/>
-          </a:p>
-          <a:p>
-            <a:endParaRPr lang="en-IN" dirty="0"/>
-          </a:p>
-        </p:txBody>
-      </p:sp>
-      <p:sp>
-        <p:nvSpPr>
-          <p:cNvPr id="6" name="TextBox 5">
-            <a:extLst>
-              <a:ext uri="{FF2B5EF4-FFF2-40B4-BE49-F238E27FC236}">
-                <a16:creationId xmlns:a16="http://schemas.microsoft.com/office/drawing/2014/main" id="{30DDAB8C-14FE-BD4A-68C2-5468D94F0896}"/>
-              </a:ext>
-            </a:extLst>
-          </p:cNvPr>
-          <p:cNvSpPr txBox="1"/>
-          <p:nvPr/>
-        </p:nvSpPr>
-        <p:spPr>
-          <a:xfrm>
-            <a:off x="457199" y="1609179"/>
-            <a:ext cx="8229600" cy="2585323"/>
-          </a:xfrm>
-          <a:prstGeom prst="rect">
-            <a:avLst/>
-          </a:prstGeom>
-          <a:solidFill>
-            <a:schemeClr val="accent1">
-              <a:lumMod val="20000"/>
-              <a:lumOff val="80000"/>
-            </a:schemeClr>
-          </a:solidFill>
-        </p:spPr>
-        <p:txBody>
-          <a:bodyPr wrap="square" rtlCol="0">
-            <a:spAutoFit/>
-          </a:bodyPr>
-          <a:lstStyle/>
-          <a:p>
-            <a:endParaRPr lang="en-US" dirty="0"/>
-          </a:p>
-          <a:p>
-            <a:endParaRPr lang="en-IN" dirty="0"/>
-          </a:p>
-          <a:p>
-            <a:endParaRPr lang="en-IN" dirty="0"/>
-          </a:p>
-          <a:p>
-            <a:endParaRPr lang="en-IN" dirty="0"/>
-          </a:p>
-          <a:p>
-            <a:endParaRPr lang="en-IN" dirty="0"/>
-          </a:p>
-          <a:p>
-            <a:endParaRPr lang="en-IN" dirty="0"/>
-          </a:p>
-          <a:p>
-            <a:endParaRPr lang="en-IN" dirty="0"/>
-          </a:p>
-          <a:p>
-            <a:endParaRPr lang="en-IN" dirty="0"/>
-          </a:p>
-          <a:p>
-            <a:endParaRPr lang="en-IN" dirty="0"/>
-          </a:p>
-        </p:txBody>
-      </p:sp>
-      <p:sp>
-        <p:nvSpPr>
-          <p:cNvPr id="8" name="TextBox 7">
-            <a:extLst>
-              <a:ext uri="{FF2B5EF4-FFF2-40B4-BE49-F238E27FC236}">
-                <a16:creationId xmlns:a16="http://schemas.microsoft.com/office/drawing/2014/main" id="{4F7A78C0-E37E-1C47-1110-62BE515A7686}"/>
-              </a:ext>
-            </a:extLst>
-          </p:cNvPr>
-          <p:cNvSpPr txBox="1"/>
-          <p:nvPr/>
-        </p:nvSpPr>
-        <p:spPr>
-          <a:xfrm>
-            <a:off x="3267000" y="4318484"/>
-            <a:ext cx="2610000" cy="2430000"/>
-          </a:xfrm>
-          <a:prstGeom prst="rect">
-            <a:avLst/>
-          </a:prstGeom>
-          <a:solidFill>
-            <a:schemeClr val="accent3">
-              <a:lumMod val="40000"/>
-              <a:lumOff val="60000"/>
-            </a:schemeClr>
-          </a:solidFill>
-        </p:spPr>
-        <p:txBody>
-          <a:bodyPr wrap="square" rtlCol="0">
-            <a:spAutoFit/>
-          </a:bodyPr>
-          <a:lstStyle/>
-          <a:p>
-            <a:endParaRPr lang="en-US" dirty="0"/>
-          </a:p>
-          <a:p>
-            <a:endParaRPr lang="en-IN" dirty="0"/>
-          </a:p>
-          <a:p>
-            <a:endParaRPr lang="en-IN" dirty="0"/>
-          </a:p>
-          <a:p>
-            <a:endParaRPr lang="en-IN" dirty="0"/>
-          </a:p>
-          <a:p>
-            <a:endParaRPr lang="en-IN" dirty="0"/>
-          </a:p>
-          <a:p>
-            <a:endParaRPr lang="en-IN" dirty="0"/>
-          </a:p>
-          <a:p>
-            <a:endParaRPr lang="en-IN" dirty="0"/>
-          </a:p>
-          <a:p>
-            <a:endParaRPr lang="en-IN" dirty="0"/>
-          </a:p>
-          <a:p>
-            <a:endParaRPr lang="en-IN" dirty="0"/>
-          </a:p>
-        </p:txBody>
-      </p:sp>
-      <p:sp>
-        <p:nvSpPr>
-          <p:cNvPr id="9" name="TextBox 8">
-            <a:extLst>
-              <a:ext uri="{FF2B5EF4-FFF2-40B4-BE49-F238E27FC236}">
-                <a16:creationId xmlns:a16="http://schemas.microsoft.com/office/drawing/2014/main" id="{13EA3866-5434-87EC-B88B-AC642EDB05C0}"/>
-              </a:ext>
-            </a:extLst>
-          </p:cNvPr>
-          <p:cNvSpPr txBox="1"/>
-          <p:nvPr/>
-        </p:nvSpPr>
-        <p:spPr>
-          <a:xfrm>
-            <a:off x="6076799" y="4318484"/>
-            <a:ext cx="2610000" cy="2430000"/>
-          </a:xfrm>
-          <a:prstGeom prst="rect">
-            <a:avLst/>
-          </a:prstGeom>
-          <a:solidFill>
-            <a:schemeClr val="tx2">
-              <a:lumMod val="20000"/>
-              <a:lumOff val="80000"/>
-            </a:schemeClr>
-          </a:solidFill>
-        </p:spPr>
-        <p:txBody>
-          <a:bodyPr wrap="square" rtlCol="0">
-            <a:spAutoFit/>
-          </a:bodyPr>
-          <a:lstStyle/>
-          <a:p>
-            <a:endParaRPr lang="en-US" dirty="0"/>
-          </a:p>
-          <a:p>
-            <a:endParaRPr lang="en-IN" dirty="0"/>
-          </a:p>
-          <a:p>
-            <a:endParaRPr lang="en-IN" dirty="0"/>
-          </a:p>
-          <a:p>
-            <a:endParaRPr lang="en-IN" dirty="0"/>
-          </a:p>
-          <a:p>
-            <a:endParaRPr lang="en-IN" dirty="0"/>
-          </a:p>
-          <a:p>
-            <a:endParaRPr lang="en-IN" dirty="0"/>
-          </a:p>
-          <a:p>
-            <a:endParaRPr lang="en-IN" dirty="0"/>
-          </a:p>
-          <a:p>
-            <a:endParaRPr lang="en-IN" dirty="0"/>
-          </a:p>
-          <a:p>
-            <a:endParaRPr lang="en-IN" dirty="0"/>
-          </a:p>
-        </p:txBody>
-      </p:sp>
-    </p:spTree>
-    <p:extLst>
-      <p:ext uri="{BB962C8B-B14F-4D97-AF65-F5344CB8AC3E}">
-        <p14:creationId xmlns:p14="http://schemas.microsoft.com/office/powerpoint/2010/main" val="456530527"/>
       </p:ext>
     </p:extLst>
   </p:cSld>

</xml_diff>

<commit_message>
integrated 3 footer elements in the pipeline
</commit_message>
<xml_diff>
--- a/code/assets/layouts/layouts.pptx
+++ b/code/assets/layouts/layouts.pptx
@@ -10,13 +10,15 @@
     <p:sldId id="259" r:id="rId4"/>
     <p:sldId id="256" r:id="rId5"/>
     <p:sldId id="260" r:id="rId6"/>
-    <p:sldId id="266" r:id="rId7"/>
-    <p:sldId id="267" r:id="rId8"/>
-    <p:sldId id="261" r:id="rId9"/>
-    <p:sldId id="262" r:id="rId10"/>
-    <p:sldId id="263" r:id="rId11"/>
-    <p:sldId id="264" r:id="rId12"/>
-    <p:sldId id="268" r:id="rId13"/>
+    <p:sldId id="269" r:id="rId7"/>
+    <p:sldId id="270" r:id="rId8"/>
+    <p:sldId id="266" r:id="rId9"/>
+    <p:sldId id="267" r:id="rId10"/>
+    <p:sldId id="261" r:id="rId11"/>
+    <p:sldId id="262" r:id="rId12"/>
+    <p:sldId id="263" r:id="rId13"/>
+    <p:sldId id="264" r:id="rId14"/>
+    <p:sldId id="268" r:id="rId15"/>
   </p:sldIdLst>
   <p:sldSz cx="9144000" cy="6858000" type="screen4x3"/>
   <p:notesSz cx="6858000" cy="9144000"/>
@@ -118,12 +120,12 @@
   <p:extLst>
     <p:ext uri="{EFAFB233-063F-42B5-8137-9DF3F51BA10A}">
       <p15:sldGuideLst xmlns:p15="http://schemas.microsoft.com/office/powerpoint/2012/main">
-        <p15:guide id="1" orient="horz" pos="2160">
+        <p15:guide id="1" orient="horz" pos="2160" userDrawn="1">
           <p15:clr>
             <a:srgbClr val="A4A3A4"/>
           </p15:clr>
         </p15:guide>
-        <p15:guide id="2" pos="2880">
+        <p15:guide id="2" pos="2880" userDrawn="1">
           <p15:clr>
             <a:srgbClr val="A4A3A4"/>
           </p15:clr>
@@ -163,7 +165,7 @@
         </p:nvSpPr>
         <p:spPr>
           <a:xfrm>
-            <a:off x="685800" y="2130425"/>
+            <a:off x="685800" y="2130429"/>
             <a:ext cx="7772400" cy="1470025"/>
           </a:xfrm>
         </p:spPr>
@@ -207,7 +209,7 @@
                 </a:solidFill>
               </a:defRPr>
             </a:lvl1pPr>
-            <a:lvl2pPr marL="457200" indent="0" algn="ctr">
+            <a:lvl2pPr marL="457189" indent="0" algn="ctr">
               <a:buNone/>
               <a:defRPr>
                 <a:solidFill>
@@ -217,7 +219,7 @@
                 </a:solidFill>
               </a:defRPr>
             </a:lvl2pPr>
-            <a:lvl3pPr marL="914400" indent="0" algn="ctr">
+            <a:lvl3pPr marL="914377" indent="0" algn="ctr">
               <a:buNone/>
               <a:defRPr>
                 <a:solidFill>
@@ -227,7 +229,7 @@
                 </a:solidFill>
               </a:defRPr>
             </a:lvl3pPr>
-            <a:lvl4pPr marL="1371600" indent="0" algn="ctr">
+            <a:lvl4pPr marL="1371566" indent="0" algn="ctr">
               <a:buNone/>
               <a:defRPr>
                 <a:solidFill>
@@ -237,7 +239,7 @@
                 </a:solidFill>
               </a:defRPr>
             </a:lvl4pPr>
-            <a:lvl5pPr marL="1828800" indent="0" algn="ctr">
+            <a:lvl5pPr marL="1828754" indent="0" algn="ctr">
               <a:buNone/>
               <a:defRPr>
                 <a:solidFill>
@@ -247,7 +249,7 @@
                 </a:solidFill>
               </a:defRPr>
             </a:lvl5pPr>
-            <a:lvl6pPr marL="2286000" indent="0" algn="ctr">
+            <a:lvl6pPr marL="2285943" indent="0" algn="ctr">
               <a:buNone/>
               <a:defRPr>
                 <a:solidFill>
@@ -257,7 +259,7 @@
                 </a:solidFill>
               </a:defRPr>
             </a:lvl6pPr>
-            <a:lvl7pPr marL="2743200" indent="0" algn="ctr">
+            <a:lvl7pPr marL="2743131" indent="0" algn="ctr">
               <a:buNone/>
               <a:defRPr>
                 <a:solidFill>
@@ -267,7 +269,7 @@
                 </a:solidFill>
               </a:defRPr>
             </a:lvl7pPr>
-            <a:lvl8pPr marL="3200400" indent="0" algn="ctr">
+            <a:lvl8pPr marL="3200320" indent="0" algn="ctr">
               <a:buNone/>
               <a:defRPr>
                 <a:solidFill>
@@ -277,7 +279,7 @@
                 </a:solidFill>
               </a:defRPr>
             </a:lvl8pPr>
-            <a:lvl9pPr marL="3657600" indent="0" algn="ctr">
+            <a:lvl9pPr marL="3657509" indent="0" algn="ctr">
               <a:buNone/>
               <a:defRPr>
                 <a:solidFill>
@@ -313,7 +315,7 @@
           <a:p>
             <a:fld id="{5BCAD085-E8A6-8845-BD4E-CB4CCA059FC4}" type="datetimeFigureOut">
               <a:rPr lang="en-US" smtClean="0"/>
-              <a:t>3/13/2024</a:t>
+              <a:t>4/12/2024</a:t>
             </a:fld>
             <a:endParaRPr lang="en-US"/>
           </a:p>
@@ -481,7 +483,7 @@
           <a:p>
             <a:fld id="{5BCAD085-E8A6-8845-BD4E-CB4CCA059FC4}" type="datetimeFigureOut">
               <a:rPr lang="en-US" smtClean="0"/>
-              <a:t>3/13/2024</a:t>
+              <a:t>4/12/2024</a:t>
             </a:fld>
             <a:endParaRPr lang="en-US"/>
           </a:p>
@@ -571,7 +573,7 @@
         </p:nvSpPr>
         <p:spPr>
           <a:xfrm>
-            <a:off x="6629400" y="274638"/>
+            <a:off x="6629400" y="274642"/>
             <a:ext cx="2057400" cy="5851525"/>
           </a:xfrm>
         </p:spPr>
@@ -598,7 +600,7 @@
         </p:nvSpPr>
         <p:spPr>
           <a:xfrm>
-            <a:off x="457200" y="274638"/>
+            <a:off x="457200" y="274642"/>
             <a:ext cx="6019800" cy="5851525"/>
           </a:xfrm>
         </p:spPr>
@@ -659,7 +661,7 @@
           <a:p>
             <a:fld id="{5BCAD085-E8A6-8845-BD4E-CB4CCA059FC4}" type="datetimeFigureOut">
               <a:rPr lang="en-US" smtClean="0"/>
-              <a:t>3/13/2024</a:t>
+              <a:t>4/12/2024</a:t>
             </a:fld>
             <a:endParaRPr lang="en-US"/>
           </a:p>
@@ -827,7 +829,7 @@
           <a:p>
             <a:fld id="{5BCAD085-E8A6-8845-BD4E-CB4CCA059FC4}" type="datetimeFigureOut">
               <a:rPr lang="en-US" smtClean="0"/>
-              <a:t>3/13/2024</a:t>
+              <a:t>4/12/2024</a:t>
             </a:fld>
             <a:endParaRPr lang="en-US"/>
           </a:p>
@@ -917,7 +919,7 @@
         </p:nvSpPr>
         <p:spPr>
           <a:xfrm>
-            <a:off x="722313" y="4406900"/>
+            <a:off x="722313" y="4406904"/>
             <a:ext cx="7772400" cy="1362075"/>
           </a:xfrm>
         </p:spPr>
@@ -965,7 +967,7 @@
                 </a:solidFill>
               </a:defRPr>
             </a:lvl1pPr>
-            <a:lvl2pPr marL="457200" indent="0">
+            <a:lvl2pPr marL="457189" indent="0">
               <a:buNone/>
               <a:defRPr sz="1800">
                 <a:solidFill>
@@ -975,7 +977,7 @@
                 </a:solidFill>
               </a:defRPr>
             </a:lvl2pPr>
-            <a:lvl3pPr marL="914400" indent="0">
+            <a:lvl3pPr marL="914377" indent="0">
               <a:buNone/>
               <a:defRPr sz="1600">
                 <a:solidFill>
@@ -985,7 +987,7 @@
                 </a:solidFill>
               </a:defRPr>
             </a:lvl3pPr>
-            <a:lvl4pPr marL="1371600" indent="0">
+            <a:lvl4pPr marL="1371566" indent="0">
               <a:buNone/>
               <a:defRPr sz="1400">
                 <a:solidFill>
@@ -995,7 +997,7 @@
                 </a:solidFill>
               </a:defRPr>
             </a:lvl4pPr>
-            <a:lvl5pPr marL="1828800" indent="0">
+            <a:lvl5pPr marL="1828754" indent="0">
               <a:buNone/>
               <a:defRPr sz="1400">
                 <a:solidFill>
@@ -1005,7 +1007,7 @@
                 </a:solidFill>
               </a:defRPr>
             </a:lvl5pPr>
-            <a:lvl6pPr marL="2286000" indent="0">
+            <a:lvl6pPr marL="2285943" indent="0">
               <a:buNone/>
               <a:defRPr sz="1400">
                 <a:solidFill>
@@ -1015,7 +1017,7 @@
                 </a:solidFill>
               </a:defRPr>
             </a:lvl6pPr>
-            <a:lvl7pPr marL="2743200" indent="0">
+            <a:lvl7pPr marL="2743131" indent="0">
               <a:buNone/>
               <a:defRPr sz="1400">
                 <a:solidFill>
@@ -1025,7 +1027,7 @@
                 </a:solidFill>
               </a:defRPr>
             </a:lvl7pPr>
-            <a:lvl8pPr marL="3200400" indent="0">
+            <a:lvl8pPr marL="3200320" indent="0">
               <a:buNone/>
               <a:defRPr sz="1400">
                 <a:solidFill>
@@ -1035,7 +1037,7 @@
                 </a:solidFill>
               </a:defRPr>
             </a:lvl8pPr>
-            <a:lvl9pPr marL="3657600" indent="0">
+            <a:lvl9pPr marL="3657509" indent="0">
               <a:buNone/>
               <a:defRPr sz="1400">
                 <a:solidFill>
@@ -1072,7 +1074,7 @@
           <a:p>
             <a:fld id="{5BCAD085-E8A6-8845-BD4E-CB4CCA059FC4}" type="datetimeFigureOut">
               <a:rPr lang="en-US" smtClean="0"/>
-              <a:t>3/13/2024</a:t>
+              <a:t>4/12/2024</a:t>
             </a:fld>
             <a:endParaRPr lang="en-US"/>
           </a:p>
@@ -1184,7 +1186,7 @@
         </p:nvSpPr>
         <p:spPr>
           <a:xfrm>
-            <a:off x="457200" y="1600200"/>
+            <a:off x="457200" y="1600204"/>
             <a:ext cx="4038600" cy="4525963"/>
           </a:xfrm>
         </p:spPr>
@@ -1268,7 +1270,7 @@
         </p:nvSpPr>
         <p:spPr>
           <a:xfrm>
-            <a:off x="4648200" y="1600200"/>
+            <a:off x="4648200" y="1600204"/>
             <a:ext cx="4038600" cy="4525963"/>
           </a:xfrm>
         </p:spPr>
@@ -1357,7 +1359,7 @@
           <a:p>
             <a:fld id="{5BCAD085-E8A6-8845-BD4E-CB4CCA059FC4}" type="datetimeFigureOut">
               <a:rPr lang="en-US" smtClean="0"/>
-              <a:t>3/13/2024</a:t>
+              <a:t>4/12/2024</a:t>
             </a:fld>
             <a:endParaRPr lang="en-US"/>
           </a:p>
@@ -1484,35 +1486,35 @@
               <a:buNone/>
               <a:defRPr sz="2400" b="1"/>
             </a:lvl1pPr>
-            <a:lvl2pPr marL="457200" indent="0">
+            <a:lvl2pPr marL="457189" indent="0">
               <a:buNone/>
               <a:defRPr sz="2000" b="1"/>
             </a:lvl2pPr>
-            <a:lvl3pPr marL="914400" indent="0">
+            <a:lvl3pPr marL="914377" indent="0">
               <a:buNone/>
               <a:defRPr sz="1800" b="1"/>
             </a:lvl3pPr>
-            <a:lvl4pPr marL="1371600" indent="0">
+            <a:lvl4pPr marL="1371566" indent="0">
               <a:buNone/>
               <a:defRPr sz="1600" b="1"/>
             </a:lvl4pPr>
-            <a:lvl5pPr marL="1828800" indent="0">
+            <a:lvl5pPr marL="1828754" indent="0">
               <a:buNone/>
               <a:defRPr sz="1600" b="1"/>
             </a:lvl5pPr>
-            <a:lvl6pPr marL="2286000" indent="0">
+            <a:lvl6pPr marL="2285943" indent="0">
               <a:buNone/>
               <a:defRPr sz="1600" b="1"/>
             </a:lvl6pPr>
-            <a:lvl7pPr marL="2743200" indent="0">
+            <a:lvl7pPr marL="2743131" indent="0">
               <a:buNone/>
               <a:defRPr sz="1600" b="1"/>
             </a:lvl7pPr>
-            <a:lvl8pPr marL="3200400" indent="0">
+            <a:lvl8pPr marL="3200320" indent="0">
               <a:buNone/>
               <a:defRPr sz="1600" b="1"/>
             </a:lvl8pPr>
-            <a:lvl9pPr marL="3657600" indent="0">
+            <a:lvl9pPr marL="3657509" indent="0">
               <a:buNone/>
               <a:defRPr sz="1600" b="1"/>
             </a:lvl9pPr>
@@ -1622,7 +1624,7 @@
         </p:nvSpPr>
         <p:spPr>
           <a:xfrm>
-            <a:off x="4645025" y="1535113"/>
+            <a:off x="4645027" y="1535113"/>
             <a:ext cx="4041775" cy="639762"/>
           </a:xfrm>
         </p:spPr>
@@ -1633,35 +1635,35 @@
               <a:buNone/>
               <a:defRPr sz="2400" b="1"/>
             </a:lvl1pPr>
-            <a:lvl2pPr marL="457200" indent="0">
+            <a:lvl2pPr marL="457189" indent="0">
               <a:buNone/>
               <a:defRPr sz="2000" b="1"/>
             </a:lvl2pPr>
-            <a:lvl3pPr marL="914400" indent="0">
+            <a:lvl3pPr marL="914377" indent="0">
               <a:buNone/>
               <a:defRPr sz="1800" b="1"/>
             </a:lvl3pPr>
-            <a:lvl4pPr marL="1371600" indent="0">
+            <a:lvl4pPr marL="1371566" indent="0">
               <a:buNone/>
               <a:defRPr sz="1600" b="1"/>
             </a:lvl4pPr>
-            <a:lvl5pPr marL="1828800" indent="0">
+            <a:lvl5pPr marL="1828754" indent="0">
               <a:buNone/>
               <a:defRPr sz="1600" b="1"/>
             </a:lvl5pPr>
-            <a:lvl6pPr marL="2286000" indent="0">
+            <a:lvl6pPr marL="2285943" indent="0">
               <a:buNone/>
               <a:defRPr sz="1600" b="1"/>
             </a:lvl6pPr>
-            <a:lvl7pPr marL="2743200" indent="0">
+            <a:lvl7pPr marL="2743131" indent="0">
               <a:buNone/>
               <a:defRPr sz="1600" b="1"/>
             </a:lvl7pPr>
-            <a:lvl8pPr marL="3200400" indent="0">
+            <a:lvl8pPr marL="3200320" indent="0">
               <a:buNone/>
               <a:defRPr sz="1600" b="1"/>
             </a:lvl8pPr>
-            <a:lvl9pPr marL="3657600" indent="0">
+            <a:lvl9pPr marL="3657509" indent="0">
               <a:buNone/>
               <a:defRPr sz="1600" b="1"/>
             </a:lvl9pPr>
@@ -1687,7 +1689,7 @@
         </p:nvSpPr>
         <p:spPr>
           <a:xfrm>
-            <a:off x="4645025" y="2174875"/>
+            <a:off x="4645027" y="2174875"/>
             <a:ext cx="4041775" cy="3951288"/>
           </a:xfrm>
         </p:spPr>
@@ -1776,7 +1778,7 @@
           <a:p>
             <a:fld id="{5BCAD085-E8A6-8845-BD4E-CB4CCA059FC4}" type="datetimeFigureOut">
               <a:rPr lang="en-US" smtClean="0"/>
-              <a:t>3/13/2024</a:t>
+              <a:t>4/12/2024</a:t>
             </a:fld>
             <a:endParaRPr lang="en-US"/>
           </a:p>
@@ -1893,7 +1895,7 @@
           <a:p>
             <a:fld id="{5BCAD085-E8A6-8845-BD4E-CB4CCA059FC4}" type="datetimeFigureOut">
               <a:rPr lang="en-US" smtClean="0"/>
-              <a:t>3/13/2024</a:t>
+              <a:t>4/12/2024</a:t>
             </a:fld>
             <a:endParaRPr lang="en-US"/>
           </a:p>
@@ -1988,7 +1990,7 @@
           <a:p>
             <a:fld id="{5BCAD085-E8A6-8845-BD4E-CB4CCA059FC4}" type="datetimeFigureOut">
               <a:rPr lang="en-US" smtClean="0"/>
-              <a:t>3/13/2024</a:t>
+              <a:t>4/12/2024</a:t>
             </a:fld>
             <a:endParaRPr lang="en-US"/>
           </a:p>
@@ -2078,7 +2080,7 @@
         </p:nvSpPr>
         <p:spPr>
           <a:xfrm>
-            <a:off x="457200" y="273050"/>
+            <a:off x="457202" y="273050"/>
             <a:ext cx="3008313" cy="1162050"/>
           </a:xfrm>
         </p:spPr>
@@ -2109,7 +2111,7 @@
         </p:nvSpPr>
         <p:spPr>
           <a:xfrm>
-            <a:off x="3575050" y="273050"/>
+            <a:off x="3575050" y="273054"/>
             <a:ext cx="5111750" cy="5853113"/>
           </a:xfrm>
         </p:spPr>
@@ -2193,7 +2195,7 @@
         </p:nvSpPr>
         <p:spPr>
           <a:xfrm>
-            <a:off x="457200" y="1435100"/>
+            <a:off x="457202" y="1435103"/>
             <a:ext cx="3008313" cy="4691063"/>
           </a:xfrm>
         </p:spPr>
@@ -2204,35 +2206,35 @@
               <a:buNone/>
               <a:defRPr sz="1400"/>
             </a:lvl1pPr>
-            <a:lvl2pPr marL="457200" indent="0">
+            <a:lvl2pPr marL="457189" indent="0">
               <a:buNone/>
               <a:defRPr sz="1200"/>
             </a:lvl2pPr>
-            <a:lvl3pPr marL="914400" indent="0">
+            <a:lvl3pPr marL="914377" indent="0">
               <a:buNone/>
               <a:defRPr sz="1000"/>
             </a:lvl3pPr>
-            <a:lvl4pPr marL="1371600" indent="0">
+            <a:lvl4pPr marL="1371566" indent="0">
               <a:buNone/>
               <a:defRPr sz="900"/>
             </a:lvl4pPr>
-            <a:lvl5pPr marL="1828800" indent="0">
+            <a:lvl5pPr marL="1828754" indent="0">
               <a:buNone/>
               <a:defRPr sz="900"/>
             </a:lvl5pPr>
-            <a:lvl6pPr marL="2286000" indent="0">
+            <a:lvl6pPr marL="2285943" indent="0">
               <a:buNone/>
               <a:defRPr sz="900"/>
             </a:lvl6pPr>
-            <a:lvl7pPr marL="2743200" indent="0">
+            <a:lvl7pPr marL="2743131" indent="0">
               <a:buNone/>
               <a:defRPr sz="900"/>
             </a:lvl7pPr>
-            <a:lvl8pPr marL="3200400" indent="0">
+            <a:lvl8pPr marL="3200320" indent="0">
               <a:buNone/>
               <a:defRPr sz="900"/>
             </a:lvl8pPr>
-            <a:lvl9pPr marL="3657600" indent="0">
+            <a:lvl9pPr marL="3657509" indent="0">
               <a:buNone/>
               <a:defRPr sz="900"/>
             </a:lvl9pPr>
@@ -2263,7 +2265,7 @@
           <a:p>
             <a:fld id="{5BCAD085-E8A6-8845-BD4E-CB4CCA059FC4}" type="datetimeFigureOut">
               <a:rPr lang="en-US" smtClean="0"/>
-              <a:t>3/13/2024</a:t>
+              <a:t>4/12/2024</a:t>
             </a:fld>
             <a:endParaRPr lang="en-US"/>
           </a:p>
@@ -2395,35 +2397,35 @@
               <a:buNone/>
               <a:defRPr sz="3200"/>
             </a:lvl1pPr>
-            <a:lvl2pPr marL="457200" indent="0">
+            <a:lvl2pPr marL="457189" indent="0">
               <a:buNone/>
               <a:defRPr sz="2800"/>
             </a:lvl2pPr>
-            <a:lvl3pPr marL="914400" indent="0">
+            <a:lvl3pPr marL="914377" indent="0">
               <a:buNone/>
               <a:defRPr sz="2400"/>
             </a:lvl3pPr>
-            <a:lvl4pPr marL="1371600" indent="0">
+            <a:lvl4pPr marL="1371566" indent="0">
               <a:buNone/>
               <a:defRPr sz="2000"/>
             </a:lvl4pPr>
-            <a:lvl5pPr marL="1828800" indent="0">
+            <a:lvl5pPr marL="1828754" indent="0">
               <a:buNone/>
               <a:defRPr sz="2000"/>
             </a:lvl5pPr>
-            <a:lvl6pPr marL="2286000" indent="0">
+            <a:lvl6pPr marL="2285943" indent="0">
               <a:buNone/>
               <a:defRPr sz="2000"/>
             </a:lvl6pPr>
-            <a:lvl7pPr marL="2743200" indent="0">
+            <a:lvl7pPr marL="2743131" indent="0">
               <a:buNone/>
               <a:defRPr sz="2000"/>
             </a:lvl7pPr>
-            <a:lvl8pPr marL="3200400" indent="0">
+            <a:lvl8pPr marL="3200320" indent="0">
               <a:buNone/>
               <a:defRPr sz="2000"/>
             </a:lvl8pPr>
-            <a:lvl9pPr marL="3657600" indent="0">
+            <a:lvl9pPr marL="3657509" indent="0">
               <a:buNone/>
               <a:defRPr sz="2000"/>
             </a:lvl9pPr>
@@ -2456,35 +2458,35 @@
               <a:buNone/>
               <a:defRPr sz="1400"/>
             </a:lvl1pPr>
-            <a:lvl2pPr marL="457200" indent="0">
+            <a:lvl2pPr marL="457189" indent="0">
               <a:buNone/>
               <a:defRPr sz="1200"/>
             </a:lvl2pPr>
-            <a:lvl3pPr marL="914400" indent="0">
+            <a:lvl3pPr marL="914377" indent="0">
               <a:buNone/>
               <a:defRPr sz="1000"/>
             </a:lvl3pPr>
-            <a:lvl4pPr marL="1371600" indent="0">
+            <a:lvl4pPr marL="1371566" indent="0">
               <a:buNone/>
               <a:defRPr sz="900"/>
             </a:lvl4pPr>
-            <a:lvl5pPr marL="1828800" indent="0">
+            <a:lvl5pPr marL="1828754" indent="0">
               <a:buNone/>
               <a:defRPr sz="900"/>
             </a:lvl5pPr>
-            <a:lvl6pPr marL="2286000" indent="0">
+            <a:lvl6pPr marL="2285943" indent="0">
               <a:buNone/>
               <a:defRPr sz="900"/>
             </a:lvl6pPr>
-            <a:lvl7pPr marL="2743200" indent="0">
+            <a:lvl7pPr marL="2743131" indent="0">
               <a:buNone/>
               <a:defRPr sz="900"/>
             </a:lvl7pPr>
-            <a:lvl8pPr marL="3200400" indent="0">
+            <a:lvl8pPr marL="3200320" indent="0">
               <a:buNone/>
               <a:defRPr sz="900"/>
             </a:lvl8pPr>
-            <a:lvl9pPr marL="3657600" indent="0">
+            <a:lvl9pPr marL="3657509" indent="0">
               <a:buNone/>
               <a:defRPr sz="900"/>
             </a:lvl9pPr>
@@ -2515,7 +2517,7 @@
           <a:p>
             <a:fld id="{5BCAD085-E8A6-8845-BD4E-CB4CCA059FC4}" type="datetimeFigureOut">
               <a:rPr lang="en-US" smtClean="0"/>
-              <a:t>3/13/2024</a:t>
+              <a:t>4/12/2024</a:t>
             </a:fld>
             <a:endParaRPr lang="en-US"/>
           </a:p>
@@ -2642,7 +2644,7 @@
         </p:nvSpPr>
         <p:spPr>
           <a:xfrm>
-            <a:off x="457200" y="1600200"/>
+            <a:off x="457200" y="1600204"/>
             <a:ext cx="8229600" cy="4525963"/>
           </a:xfrm>
           <a:prstGeom prst="rect">
@@ -2703,7 +2705,7 @@
         </p:nvSpPr>
         <p:spPr>
           <a:xfrm>
-            <a:off x="457200" y="6356350"/>
+            <a:off x="457200" y="6356354"/>
             <a:ext cx="2133600" cy="365125"/>
           </a:xfrm>
           <a:prstGeom prst="rect">
@@ -2726,7 +2728,7 @@
           <a:p>
             <a:fld id="{5BCAD085-E8A6-8845-BD4E-CB4CCA059FC4}" type="datetimeFigureOut">
               <a:rPr lang="en-US" smtClean="0"/>
-              <a:t>3/13/2024</a:t>
+              <a:t>4/12/2024</a:t>
             </a:fld>
             <a:endParaRPr lang="en-US"/>
           </a:p>
@@ -2744,7 +2746,7 @@
         </p:nvSpPr>
         <p:spPr>
           <a:xfrm>
-            <a:off x="3124200" y="6356350"/>
+            <a:off x="3124200" y="6356354"/>
             <a:ext cx="2895600" cy="365125"/>
           </a:xfrm>
           <a:prstGeom prst="rect">
@@ -2781,7 +2783,7 @@
         </p:nvSpPr>
         <p:spPr>
           <a:xfrm>
-            <a:off x="6553200" y="6356350"/>
+            <a:off x="6553200" y="6356354"/>
             <a:ext cx="2133600" cy="365125"/>
           </a:xfrm>
           <a:prstGeom prst="rect">
@@ -2833,7 +2835,7 @@
   </p:sldLayoutIdLst>
   <p:txStyles>
     <p:titleStyle>
-      <a:lvl1pPr algn="ctr" defTabSz="457200" rtl="0" eaLnBrk="1" latinLnBrk="0" hangingPunct="1">
+      <a:lvl1pPr algn="ctr" defTabSz="457189" rtl="0" eaLnBrk="1" latinLnBrk="0" hangingPunct="1">
         <a:spcBef>
           <a:spcPct val="0"/>
         </a:spcBef>
@@ -2849,7 +2851,7 @@
       </a:lvl1pPr>
     </p:titleStyle>
     <p:bodyStyle>
-      <a:lvl1pPr marL="342900" indent="-342900" algn="l" defTabSz="457200" rtl="0" eaLnBrk="1" latinLnBrk="0" hangingPunct="1">
+      <a:lvl1pPr marL="342891" indent="-342891" algn="l" defTabSz="457189" rtl="0" eaLnBrk="1" latinLnBrk="0" hangingPunct="1">
         <a:spcBef>
           <a:spcPct val="20000"/>
         </a:spcBef>
@@ -2864,7 +2866,7 @@
           <a:cs typeface="+mn-cs"/>
         </a:defRPr>
       </a:lvl1pPr>
-      <a:lvl2pPr marL="742950" indent="-285750" algn="l" defTabSz="457200" rtl="0" eaLnBrk="1" latinLnBrk="0" hangingPunct="1">
+      <a:lvl2pPr marL="742932" indent="-285744" algn="l" defTabSz="457189" rtl="0" eaLnBrk="1" latinLnBrk="0" hangingPunct="1">
         <a:spcBef>
           <a:spcPct val="20000"/>
         </a:spcBef>
@@ -2879,7 +2881,7 @@
           <a:cs typeface="+mn-cs"/>
         </a:defRPr>
       </a:lvl2pPr>
-      <a:lvl3pPr marL="1143000" indent="-228600" algn="l" defTabSz="457200" rtl="0" eaLnBrk="1" latinLnBrk="0" hangingPunct="1">
+      <a:lvl3pPr marL="1142971" indent="-228594" algn="l" defTabSz="457189" rtl="0" eaLnBrk="1" latinLnBrk="0" hangingPunct="1">
         <a:spcBef>
           <a:spcPct val="20000"/>
         </a:spcBef>
@@ -2894,7 +2896,7 @@
           <a:cs typeface="+mn-cs"/>
         </a:defRPr>
       </a:lvl3pPr>
-      <a:lvl4pPr marL="1600200" indent="-228600" algn="l" defTabSz="457200" rtl="0" eaLnBrk="1" latinLnBrk="0" hangingPunct="1">
+      <a:lvl4pPr marL="1600160" indent="-228594" algn="l" defTabSz="457189" rtl="0" eaLnBrk="1" latinLnBrk="0" hangingPunct="1">
         <a:spcBef>
           <a:spcPct val="20000"/>
         </a:spcBef>
@@ -2909,7 +2911,7 @@
           <a:cs typeface="+mn-cs"/>
         </a:defRPr>
       </a:lvl4pPr>
-      <a:lvl5pPr marL="2057400" indent="-228600" algn="l" defTabSz="457200" rtl="0" eaLnBrk="1" latinLnBrk="0" hangingPunct="1">
+      <a:lvl5pPr marL="2057349" indent="-228594" algn="l" defTabSz="457189" rtl="0" eaLnBrk="1" latinLnBrk="0" hangingPunct="1">
         <a:spcBef>
           <a:spcPct val="20000"/>
         </a:spcBef>
@@ -2924,7 +2926,7 @@
           <a:cs typeface="+mn-cs"/>
         </a:defRPr>
       </a:lvl5pPr>
-      <a:lvl6pPr marL="2514600" indent="-228600" algn="l" defTabSz="457200" rtl="0" eaLnBrk="1" latinLnBrk="0" hangingPunct="1">
+      <a:lvl6pPr marL="2514537" indent="-228594" algn="l" defTabSz="457189" rtl="0" eaLnBrk="1" latinLnBrk="0" hangingPunct="1">
         <a:spcBef>
           <a:spcPct val="20000"/>
         </a:spcBef>
@@ -2939,7 +2941,7 @@
           <a:cs typeface="+mn-cs"/>
         </a:defRPr>
       </a:lvl6pPr>
-      <a:lvl7pPr marL="2971800" indent="-228600" algn="l" defTabSz="457200" rtl="0" eaLnBrk="1" latinLnBrk="0" hangingPunct="1">
+      <a:lvl7pPr marL="2971726" indent="-228594" algn="l" defTabSz="457189" rtl="0" eaLnBrk="1" latinLnBrk="0" hangingPunct="1">
         <a:spcBef>
           <a:spcPct val="20000"/>
         </a:spcBef>
@@ -2954,7 +2956,7 @@
           <a:cs typeface="+mn-cs"/>
         </a:defRPr>
       </a:lvl7pPr>
-      <a:lvl8pPr marL="3429000" indent="-228600" algn="l" defTabSz="457200" rtl="0" eaLnBrk="1" latinLnBrk="0" hangingPunct="1">
+      <a:lvl8pPr marL="3428914" indent="-228594" algn="l" defTabSz="457189" rtl="0" eaLnBrk="1" latinLnBrk="0" hangingPunct="1">
         <a:spcBef>
           <a:spcPct val="20000"/>
         </a:spcBef>
@@ -2969,7 +2971,7 @@
           <a:cs typeface="+mn-cs"/>
         </a:defRPr>
       </a:lvl8pPr>
-      <a:lvl9pPr marL="3886200" indent="-228600" algn="l" defTabSz="457200" rtl="0" eaLnBrk="1" latinLnBrk="0" hangingPunct="1">
+      <a:lvl9pPr marL="3886103" indent="-228594" algn="l" defTabSz="457189" rtl="0" eaLnBrk="1" latinLnBrk="0" hangingPunct="1">
         <a:spcBef>
           <a:spcPct val="20000"/>
         </a:spcBef>
@@ -2989,7 +2991,7 @@
       <a:defPPr>
         <a:defRPr lang="en-US"/>
       </a:defPPr>
-      <a:lvl1pPr marL="0" algn="l" defTabSz="457200" rtl="0" eaLnBrk="1" latinLnBrk="0" hangingPunct="1">
+      <a:lvl1pPr marL="0" algn="l" defTabSz="457189" rtl="0" eaLnBrk="1" latinLnBrk="0" hangingPunct="1">
         <a:defRPr sz="1800" kern="1200">
           <a:solidFill>
             <a:schemeClr val="tx1"/>
@@ -2999,7 +3001,7 @@
           <a:cs typeface="+mn-cs"/>
         </a:defRPr>
       </a:lvl1pPr>
-      <a:lvl2pPr marL="457200" algn="l" defTabSz="457200" rtl="0" eaLnBrk="1" latinLnBrk="0" hangingPunct="1">
+      <a:lvl2pPr marL="457189" algn="l" defTabSz="457189" rtl="0" eaLnBrk="1" latinLnBrk="0" hangingPunct="1">
         <a:defRPr sz="1800" kern="1200">
           <a:solidFill>
             <a:schemeClr val="tx1"/>
@@ -3009,7 +3011,7 @@
           <a:cs typeface="+mn-cs"/>
         </a:defRPr>
       </a:lvl2pPr>
-      <a:lvl3pPr marL="914400" algn="l" defTabSz="457200" rtl="0" eaLnBrk="1" latinLnBrk="0" hangingPunct="1">
+      <a:lvl3pPr marL="914377" algn="l" defTabSz="457189" rtl="0" eaLnBrk="1" latinLnBrk="0" hangingPunct="1">
         <a:defRPr sz="1800" kern="1200">
           <a:solidFill>
             <a:schemeClr val="tx1"/>
@@ -3019,7 +3021,7 @@
           <a:cs typeface="+mn-cs"/>
         </a:defRPr>
       </a:lvl3pPr>
-      <a:lvl4pPr marL="1371600" algn="l" defTabSz="457200" rtl="0" eaLnBrk="1" latinLnBrk="0" hangingPunct="1">
+      <a:lvl4pPr marL="1371566" algn="l" defTabSz="457189" rtl="0" eaLnBrk="1" latinLnBrk="0" hangingPunct="1">
         <a:defRPr sz="1800" kern="1200">
           <a:solidFill>
             <a:schemeClr val="tx1"/>
@@ -3029,7 +3031,7 @@
           <a:cs typeface="+mn-cs"/>
         </a:defRPr>
       </a:lvl4pPr>
-      <a:lvl5pPr marL="1828800" algn="l" defTabSz="457200" rtl="0" eaLnBrk="1" latinLnBrk="0" hangingPunct="1">
+      <a:lvl5pPr marL="1828754" algn="l" defTabSz="457189" rtl="0" eaLnBrk="1" latinLnBrk="0" hangingPunct="1">
         <a:defRPr sz="1800" kern="1200">
           <a:solidFill>
             <a:schemeClr val="tx1"/>
@@ -3039,7 +3041,7 @@
           <a:cs typeface="+mn-cs"/>
         </a:defRPr>
       </a:lvl5pPr>
-      <a:lvl6pPr marL="2286000" algn="l" defTabSz="457200" rtl="0" eaLnBrk="1" latinLnBrk="0" hangingPunct="1">
+      <a:lvl6pPr marL="2285943" algn="l" defTabSz="457189" rtl="0" eaLnBrk="1" latinLnBrk="0" hangingPunct="1">
         <a:defRPr sz="1800" kern="1200">
           <a:solidFill>
             <a:schemeClr val="tx1"/>
@@ -3049,7 +3051,7 @@
           <a:cs typeface="+mn-cs"/>
         </a:defRPr>
       </a:lvl6pPr>
-      <a:lvl7pPr marL="2743200" algn="l" defTabSz="457200" rtl="0" eaLnBrk="1" latinLnBrk="0" hangingPunct="1">
+      <a:lvl7pPr marL="2743131" algn="l" defTabSz="457189" rtl="0" eaLnBrk="1" latinLnBrk="0" hangingPunct="1">
         <a:defRPr sz="1800" kern="1200">
           <a:solidFill>
             <a:schemeClr val="tx1"/>
@@ -3059,7 +3061,7 @@
           <a:cs typeface="+mn-cs"/>
         </a:defRPr>
       </a:lvl7pPr>
-      <a:lvl8pPr marL="3200400" algn="l" defTabSz="457200" rtl="0" eaLnBrk="1" latinLnBrk="0" hangingPunct="1">
+      <a:lvl8pPr marL="3200320" algn="l" defTabSz="457189" rtl="0" eaLnBrk="1" latinLnBrk="0" hangingPunct="1">
         <a:defRPr sz="1800" kern="1200">
           <a:solidFill>
             <a:schemeClr val="tx1"/>
@@ -3069,7 +3071,7 @@
           <a:cs typeface="+mn-cs"/>
         </a:defRPr>
       </a:lvl8pPr>
-      <a:lvl9pPr marL="3657600" algn="l" defTabSz="457200" rtl="0" eaLnBrk="1" latinLnBrk="0" hangingPunct="1">
+      <a:lvl9pPr marL="3657509" algn="l" defTabSz="457189" rtl="0" eaLnBrk="1" latinLnBrk="0" hangingPunct="1">
         <a:defRPr sz="1800" kern="1200">
           <a:solidFill>
             <a:schemeClr val="tx1"/>
@@ -3164,6 +3166,534 @@
         <p:cNvPr id="1" name="">
           <a:extLst>
             <a:ext uri="{FF2B5EF4-FFF2-40B4-BE49-F238E27FC236}">
+              <a16:creationId xmlns:a16="http://schemas.microsoft.com/office/drawing/2014/main" id="{FFDFDF42-C6CE-BF01-7B47-123D549E6D89}"/>
+            </a:ext>
+          </a:extLst>
+        </p:cNvPr>
+        <p:cNvGrpSpPr/>
+        <p:nvPr/>
+      </p:nvGrpSpPr>
+      <p:grpSpPr>
+        <a:xfrm>
+          <a:off x="0" y="0"/>
+          <a:ext cx="0" cy="0"/>
+          <a:chOff x="0" y="0"/>
+          <a:chExt cx="0" cy="0"/>
+        </a:xfrm>
+      </p:grpSpPr>
+      <p:sp>
+        <p:nvSpPr>
+          <p:cNvPr id="2" name="Title 1">
+            <a:extLst>
+              <a:ext uri="{FF2B5EF4-FFF2-40B4-BE49-F238E27FC236}">
+                <a16:creationId xmlns:a16="http://schemas.microsoft.com/office/drawing/2014/main" id="{B592266B-7FD4-3EDF-BD94-A682E8BEF37C}"/>
+              </a:ext>
+            </a:extLst>
+          </p:cNvPr>
+          <p:cNvSpPr>
+            <a:spLocks noGrp="1"/>
+          </p:cNvSpPr>
+          <p:nvPr>
+            <p:ph type="title"/>
+          </p:nvPr>
+        </p:nvSpPr>
+        <p:spPr>
+          <a:xfrm>
+            <a:off x="457201" y="342197"/>
+            <a:ext cx="8229600" cy="1143000"/>
+          </a:xfrm>
+          <a:solidFill>
+            <a:schemeClr val="accent4">
+              <a:lumMod val="20000"/>
+              <a:lumOff val="80000"/>
+            </a:schemeClr>
+          </a:solidFill>
+        </p:spPr>
+        <p:txBody>
+          <a:bodyPr/>
+          <a:lstStyle/>
+          <a:p>
+            <a:endParaRPr lang="en-IN" dirty="0"/>
+          </a:p>
+        </p:txBody>
+      </p:sp>
+      <p:sp>
+        <p:nvSpPr>
+          <p:cNvPr id="4" name="TextBox 3">
+            <a:extLst>
+              <a:ext uri="{FF2B5EF4-FFF2-40B4-BE49-F238E27FC236}">
+                <a16:creationId xmlns:a16="http://schemas.microsoft.com/office/drawing/2014/main" id="{F3B5F22B-19A1-91DC-1CE4-8E69B09A141C}"/>
+              </a:ext>
+            </a:extLst>
+          </p:cNvPr>
+          <p:cNvSpPr txBox="1"/>
+          <p:nvPr/>
+        </p:nvSpPr>
+        <p:spPr>
+          <a:xfrm>
+            <a:off x="457202" y="1773458"/>
+            <a:ext cx="4018548" cy="2585323"/>
+          </a:xfrm>
+          <a:prstGeom prst="rect">
+            <a:avLst/>
+          </a:prstGeom>
+          <a:solidFill>
+            <a:schemeClr val="bg2">
+              <a:lumMod val="90000"/>
+            </a:schemeClr>
+          </a:solidFill>
+        </p:spPr>
+        <p:txBody>
+          <a:bodyPr wrap="square" rtlCol="0">
+            <a:spAutoFit/>
+          </a:bodyPr>
+          <a:lstStyle/>
+          <a:p>
+            <a:endParaRPr lang="en-US" dirty="0"/>
+          </a:p>
+          <a:p>
+            <a:endParaRPr lang="en-IN" dirty="0"/>
+          </a:p>
+          <a:p>
+            <a:endParaRPr lang="en-IN" dirty="0"/>
+          </a:p>
+          <a:p>
+            <a:endParaRPr lang="en-IN" dirty="0"/>
+          </a:p>
+          <a:p>
+            <a:pPr algn="ctr"/>
+            <a:r>
+              <a:rPr lang="en-IN" dirty="0"/>
+              <a:t>4</a:t>
+            </a:r>
+          </a:p>
+          <a:p>
+            <a:pPr algn="ctr"/>
+            <a:endParaRPr lang="en-IN" dirty="0"/>
+          </a:p>
+          <a:p>
+            <a:pPr algn="ctr"/>
+            <a:endParaRPr lang="en-IN" dirty="0"/>
+          </a:p>
+          <a:p>
+            <a:pPr algn="ctr"/>
+            <a:endParaRPr lang="en-IN" dirty="0"/>
+          </a:p>
+          <a:p>
+            <a:pPr algn="ctr"/>
+            <a:endParaRPr lang="en-IN" dirty="0"/>
+          </a:p>
+        </p:txBody>
+      </p:sp>
+      <p:sp>
+        <p:nvSpPr>
+          <p:cNvPr id="5" name="TextBox 4">
+            <a:extLst>
+              <a:ext uri="{FF2B5EF4-FFF2-40B4-BE49-F238E27FC236}">
+                <a16:creationId xmlns:a16="http://schemas.microsoft.com/office/drawing/2014/main" id="{32E22864-B8B4-8540-9C62-B470F732F775}"/>
+              </a:ext>
+            </a:extLst>
+          </p:cNvPr>
+          <p:cNvSpPr txBox="1"/>
+          <p:nvPr/>
+        </p:nvSpPr>
+        <p:spPr>
+          <a:xfrm>
+            <a:off x="4668254" y="1773458"/>
+            <a:ext cx="4018548" cy="2585323"/>
+          </a:xfrm>
+          <a:prstGeom prst="rect">
+            <a:avLst/>
+          </a:prstGeom>
+          <a:solidFill>
+            <a:schemeClr val="accent3">
+              <a:lumMod val="40000"/>
+              <a:lumOff val="60000"/>
+            </a:schemeClr>
+          </a:solidFill>
+        </p:spPr>
+        <p:txBody>
+          <a:bodyPr wrap="square" rtlCol="0">
+            <a:spAutoFit/>
+          </a:bodyPr>
+          <a:lstStyle/>
+          <a:p>
+            <a:endParaRPr lang="en-US" dirty="0"/>
+          </a:p>
+          <a:p>
+            <a:endParaRPr lang="en-IN" dirty="0"/>
+          </a:p>
+          <a:p>
+            <a:endParaRPr lang="en-IN" dirty="0"/>
+          </a:p>
+          <a:p>
+            <a:endParaRPr lang="en-IN" dirty="0"/>
+          </a:p>
+          <a:p>
+            <a:pPr algn="ctr"/>
+            <a:r>
+              <a:rPr lang="en-IN" dirty="0"/>
+              <a:t>4</a:t>
+            </a:r>
+          </a:p>
+          <a:p>
+            <a:pPr algn="ctr"/>
+            <a:endParaRPr lang="en-IN" dirty="0"/>
+          </a:p>
+          <a:p>
+            <a:pPr algn="ctr"/>
+            <a:endParaRPr lang="en-IN" dirty="0"/>
+          </a:p>
+          <a:p>
+            <a:pPr algn="ctr"/>
+            <a:endParaRPr lang="en-IN" dirty="0"/>
+          </a:p>
+          <a:p>
+            <a:pPr algn="ctr"/>
+            <a:endParaRPr lang="en-IN" dirty="0"/>
+          </a:p>
+        </p:txBody>
+      </p:sp>
+      <p:sp>
+        <p:nvSpPr>
+          <p:cNvPr id="6" name="TextBox 5">
+            <a:extLst>
+              <a:ext uri="{FF2B5EF4-FFF2-40B4-BE49-F238E27FC236}">
+                <a16:creationId xmlns:a16="http://schemas.microsoft.com/office/drawing/2014/main" id="{5CA7B43E-1916-766A-5812-E07D940397D9}"/>
+              </a:ext>
+            </a:extLst>
+          </p:cNvPr>
+          <p:cNvSpPr txBox="1"/>
+          <p:nvPr/>
+        </p:nvSpPr>
+        <p:spPr>
+          <a:xfrm>
+            <a:off x="457201" y="4560579"/>
+            <a:ext cx="8229600" cy="2031325"/>
+          </a:xfrm>
+          <a:prstGeom prst="rect">
+            <a:avLst/>
+          </a:prstGeom>
+          <a:solidFill>
+            <a:schemeClr val="accent1">
+              <a:lumMod val="20000"/>
+              <a:lumOff val="80000"/>
+            </a:schemeClr>
+          </a:solidFill>
+        </p:spPr>
+        <p:txBody>
+          <a:bodyPr wrap="square" rtlCol="0">
+            <a:spAutoFit/>
+          </a:bodyPr>
+          <a:lstStyle/>
+          <a:p>
+            <a:endParaRPr lang="en-US" dirty="0"/>
+          </a:p>
+          <a:p>
+            <a:endParaRPr lang="en-IN" dirty="0"/>
+          </a:p>
+          <a:p>
+            <a:endParaRPr lang="en-IN" dirty="0"/>
+          </a:p>
+          <a:p>
+            <a:pPr algn="ctr"/>
+            <a:r>
+              <a:rPr lang="en-IN" dirty="0"/>
+              <a:t>2</a:t>
+            </a:r>
+          </a:p>
+          <a:p>
+            <a:pPr algn="ctr"/>
+            <a:endParaRPr lang="en-IN" dirty="0"/>
+          </a:p>
+          <a:p>
+            <a:pPr algn="ctr"/>
+            <a:endParaRPr lang="en-IN" dirty="0"/>
+          </a:p>
+          <a:p>
+            <a:pPr algn="ctr"/>
+            <a:endParaRPr lang="en-IN" dirty="0"/>
+          </a:p>
+        </p:txBody>
+      </p:sp>
+    </p:spTree>
+    <p:extLst>
+      <p:ext uri="{BB962C8B-B14F-4D97-AF65-F5344CB8AC3E}">
+        <p14:creationId xmlns:p14="http://schemas.microsoft.com/office/powerpoint/2010/main" val="1510992311"/>
+      </p:ext>
+    </p:extLst>
+  </p:cSld>
+  <p:clrMapOvr>
+    <a:masterClrMapping/>
+  </p:clrMapOvr>
+</p:sld>
+</file>
+
+<file path=ppt/slides/slide11.xml><?xml version="1.0" encoding="utf-8"?>
+<p:sld xmlns:a="http://schemas.openxmlformats.org/drawingml/2006/main" xmlns:r="http://schemas.openxmlformats.org/officeDocument/2006/relationships" xmlns:p="http://schemas.openxmlformats.org/presentationml/2006/main">
+  <p:cSld>
+    <p:spTree>
+      <p:nvGrpSpPr>
+        <p:cNvPr id="1" name="">
+          <a:extLst>
+            <a:ext uri="{FF2B5EF4-FFF2-40B4-BE49-F238E27FC236}">
+              <a16:creationId xmlns:a16="http://schemas.microsoft.com/office/drawing/2014/main" id="{BBEEFF21-0D5F-E202-31AD-F104DDD23124}"/>
+            </a:ext>
+          </a:extLst>
+        </p:cNvPr>
+        <p:cNvGrpSpPr/>
+        <p:nvPr/>
+      </p:nvGrpSpPr>
+      <p:grpSpPr>
+        <a:xfrm>
+          <a:off x="0" y="0"/>
+          <a:ext cx="0" cy="0"/>
+          <a:chOff x="0" y="0"/>
+          <a:chExt cx="0" cy="0"/>
+        </a:xfrm>
+      </p:grpSpPr>
+      <p:sp>
+        <p:nvSpPr>
+          <p:cNvPr id="2" name="Title 1">
+            <a:extLst>
+              <a:ext uri="{FF2B5EF4-FFF2-40B4-BE49-F238E27FC236}">
+                <a16:creationId xmlns:a16="http://schemas.microsoft.com/office/drawing/2014/main" id="{1C9B8325-94FC-D64E-5049-E2359FE8CF8B}"/>
+              </a:ext>
+            </a:extLst>
+          </p:cNvPr>
+          <p:cNvSpPr>
+            <a:spLocks noGrp="1"/>
+          </p:cNvSpPr>
+          <p:nvPr>
+            <p:ph type="title"/>
+          </p:nvPr>
+        </p:nvSpPr>
+        <p:spPr>
+          <a:xfrm>
+            <a:off x="457201" y="342197"/>
+            <a:ext cx="8229600" cy="1143000"/>
+          </a:xfrm>
+          <a:solidFill>
+            <a:schemeClr val="accent4">
+              <a:lumMod val="20000"/>
+              <a:lumOff val="80000"/>
+            </a:schemeClr>
+          </a:solidFill>
+        </p:spPr>
+        <p:txBody>
+          <a:bodyPr/>
+          <a:lstStyle/>
+          <a:p>
+            <a:endParaRPr lang="en-IN" dirty="0"/>
+          </a:p>
+        </p:txBody>
+      </p:sp>
+      <p:sp>
+        <p:nvSpPr>
+          <p:cNvPr id="4" name="TextBox 3">
+            <a:extLst>
+              <a:ext uri="{FF2B5EF4-FFF2-40B4-BE49-F238E27FC236}">
+                <a16:creationId xmlns:a16="http://schemas.microsoft.com/office/drawing/2014/main" id="{8704BC89-9F00-31E8-0011-D0B964AA0E9E}"/>
+              </a:ext>
+            </a:extLst>
+          </p:cNvPr>
+          <p:cNvSpPr txBox="1"/>
+          <p:nvPr/>
+        </p:nvSpPr>
+        <p:spPr>
+          <a:xfrm>
+            <a:off x="457199" y="3930483"/>
+            <a:ext cx="4018548" cy="2585323"/>
+          </a:xfrm>
+          <a:prstGeom prst="rect">
+            <a:avLst/>
+          </a:prstGeom>
+          <a:solidFill>
+            <a:schemeClr val="bg2">
+              <a:lumMod val="90000"/>
+            </a:schemeClr>
+          </a:solidFill>
+        </p:spPr>
+        <p:txBody>
+          <a:bodyPr wrap="square" rtlCol="0">
+            <a:spAutoFit/>
+          </a:bodyPr>
+          <a:lstStyle/>
+          <a:p>
+            <a:endParaRPr lang="en-US" dirty="0"/>
+          </a:p>
+          <a:p>
+            <a:endParaRPr lang="en-IN" dirty="0"/>
+          </a:p>
+          <a:p>
+            <a:endParaRPr lang="en-IN" dirty="0"/>
+          </a:p>
+          <a:p>
+            <a:endParaRPr lang="en-IN" dirty="0"/>
+          </a:p>
+          <a:p>
+            <a:endParaRPr lang="en-IN" dirty="0"/>
+          </a:p>
+          <a:p>
+            <a:endParaRPr lang="en-IN" dirty="0"/>
+          </a:p>
+          <a:p>
+            <a:endParaRPr lang="en-IN" dirty="0"/>
+          </a:p>
+          <a:p>
+            <a:endParaRPr lang="en-IN" dirty="0"/>
+          </a:p>
+          <a:p>
+            <a:r>
+              <a:rPr lang="en-IN" dirty="0"/>
+              <a:t>4</a:t>
+            </a:r>
+          </a:p>
+        </p:txBody>
+      </p:sp>
+      <p:sp>
+        <p:nvSpPr>
+          <p:cNvPr id="5" name="TextBox 4">
+            <a:extLst>
+              <a:ext uri="{FF2B5EF4-FFF2-40B4-BE49-F238E27FC236}">
+                <a16:creationId xmlns:a16="http://schemas.microsoft.com/office/drawing/2014/main" id="{4979A15B-410F-B454-3CDD-D285ED4A0A2F}"/>
+              </a:ext>
+            </a:extLst>
+          </p:cNvPr>
+          <p:cNvSpPr txBox="1"/>
+          <p:nvPr/>
+        </p:nvSpPr>
+        <p:spPr>
+          <a:xfrm>
+            <a:off x="4668254" y="3930482"/>
+            <a:ext cx="4018548" cy="2585323"/>
+          </a:xfrm>
+          <a:prstGeom prst="rect">
+            <a:avLst/>
+          </a:prstGeom>
+          <a:solidFill>
+            <a:schemeClr val="accent3">
+              <a:lumMod val="40000"/>
+              <a:lumOff val="60000"/>
+            </a:schemeClr>
+          </a:solidFill>
+        </p:spPr>
+        <p:txBody>
+          <a:bodyPr wrap="square" rtlCol="0">
+            <a:spAutoFit/>
+          </a:bodyPr>
+          <a:lstStyle/>
+          <a:p>
+            <a:endParaRPr lang="en-US" dirty="0"/>
+          </a:p>
+          <a:p>
+            <a:endParaRPr lang="en-IN" dirty="0"/>
+          </a:p>
+          <a:p>
+            <a:endParaRPr lang="en-IN" dirty="0"/>
+          </a:p>
+          <a:p>
+            <a:endParaRPr lang="en-IN" dirty="0"/>
+          </a:p>
+          <a:p>
+            <a:endParaRPr lang="en-IN" dirty="0"/>
+          </a:p>
+          <a:p>
+            <a:endParaRPr lang="en-IN" dirty="0"/>
+          </a:p>
+          <a:p>
+            <a:endParaRPr lang="en-IN" dirty="0"/>
+          </a:p>
+          <a:p>
+            <a:endParaRPr lang="en-IN" dirty="0"/>
+          </a:p>
+          <a:p>
+            <a:r>
+              <a:rPr lang="en-IN" dirty="0"/>
+              <a:t>4</a:t>
+            </a:r>
+          </a:p>
+        </p:txBody>
+      </p:sp>
+      <p:sp>
+        <p:nvSpPr>
+          <p:cNvPr id="6" name="TextBox 5">
+            <a:extLst>
+              <a:ext uri="{FF2B5EF4-FFF2-40B4-BE49-F238E27FC236}">
+                <a16:creationId xmlns:a16="http://schemas.microsoft.com/office/drawing/2014/main" id="{B1FE7197-7B6F-5962-7371-1686FB6F2CBA}"/>
+              </a:ext>
+            </a:extLst>
+          </p:cNvPr>
+          <p:cNvSpPr txBox="1"/>
+          <p:nvPr/>
+        </p:nvSpPr>
+        <p:spPr>
+          <a:xfrm>
+            <a:off x="457201" y="1692178"/>
+            <a:ext cx="8229600" cy="2031325"/>
+          </a:xfrm>
+          <a:prstGeom prst="rect">
+            <a:avLst/>
+          </a:prstGeom>
+          <a:solidFill>
+            <a:schemeClr val="accent1">
+              <a:lumMod val="20000"/>
+              <a:lumOff val="80000"/>
+            </a:schemeClr>
+          </a:solidFill>
+        </p:spPr>
+        <p:txBody>
+          <a:bodyPr wrap="square" rtlCol="0">
+            <a:spAutoFit/>
+          </a:bodyPr>
+          <a:lstStyle/>
+          <a:p>
+            <a:endParaRPr lang="en-US" dirty="0"/>
+          </a:p>
+          <a:p>
+            <a:endParaRPr lang="en-IN" dirty="0"/>
+          </a:p>
+          <a:p>
+            <a:endParaRPr lang="en-IN" dirty="0"/>
+          </a:p>
+          <a:p>
+            <a:endParaRPr lang="en-IN" dirty="0"/>
+          </a:p>
+          <a:p>
+            <a:endParaRPr lang="en-IN" dirty="0"/>
+          </a:p>
+          <a:p>
+            <a:endParaRPr lang="en-IN" dirty="0"/>
+          </a:p>
+          <a:p>
+            <a:r>
+              <a:rPr lang="en-IN" dirty="0"/>
+              <a:t>2</a:t>
+            </a:r>
+          </a:p>
+        </p:txBody>
+      </p:sp>
+    </p:spTree>
+    <p:extLst>
+      <p:ext uri="{BB962C8B-B14F-4D97-AF65-F5344CB8AC3E}">
+        <p14:creationId xmlns:p14="http://schemas.microsoft.com/office/powerpoint/2010/main" val="3541454463"/>
+      </p:ext>
+    </p:extLst>
+  </p:cSld>
+  <p:clrMapOvr>
+    <a:masterClrMapping/>
+  </p:clrMapOvr>
+</p:sld>
+</file>
+
+<file path=ppt/slides/slide12.xml><?xml version="1.0" encoding="utf-8"?>
+<p:sld xmlns:a="http://schemas.openxmlformats.org/drawingml/2006/main" xmlns:r="http://schemas.openxmlformats.org/officeDocument/2006/relationships" xmlns:p="http://schemas.openxmlformats.org/presentationml/2006/main">
+  <p:cSld>
+    <p:spTree>
+      <p:nvGrpSpPr>
+        <p:cNvPr id="1" name="">
+          <a:extLst>
+            <a:ext uri="{FF2B5EF4-FFF2-40B4-BE49-F238E27FC236}">
               <a16:creationId xmlns:a16="http://schemas.microsoft.com/office/drawing/2014/main" id="{FD8A78F3-D0D0-5C8D-68F4-44127AC56C0C}"/>
             </a:ext>
           </a:extLst>
@@ -3289,8 +3819,8 @@
         </p:nvSpPr>
         <p:spPr>
           <a:xfrm>
-            <a:off x="457201" y="1692174"/>
-            <a:ext cx="4018546" cy="2308324"/>
+            <a:off x="457202" y="1692174"/>
+            <a:ext cx="4018547" cy="2308324"/>
           </a:xfrm>
           <a:prstGeom prst="rect">
             <a:avLst/>
@@ -3350,8 +3880,8 @@
         </p:nvSpPr>
         <p:spPr>
           <a:xfrm>
-            <a:off x="4668253" y="1692174"/>
-            <a:ext cx="4018546" cy="2308324"/>
+            <a:off x="4668254" y="1692174"/>
+            <a:ext cx="4018547" cy="2308324"/>
           </a:xfrm>
           <a:prstGeom prst="rect">
             <a:avLst/>
@@ -3411,7 +3941,7 @@
         </p:nvSpPr>
         <p:spPr>
           <a:xfrm>
-            <a:off x="4668253" y="4318484"/>
+            <a:off x="4668254" y="4318484"/>
             <a:ext cx="4018548" cy="2308324"/>
           </a:xfrm>
           <a:prstGeom prst="rect">
@@ -3471,7 +4001,7 @@
 </p:sld>
 </file>
 
-<file path=ppt/slides/slide11.xml><?xml version="1.0" encoding="utf-8"?>
+<file path=ppt/slides/slide13.xml><?xml version="1.0" encoding="utf-8"?>
 <p:sld xmlns:a="http://schemas.openxmlformats.org/drawingml/2006/main" xmlns:r="http://schemas.openxmlformats.org/officeDocument/2006/relationships" xmlns:p="http://schemas.openxmlformats.org/presentationml/2006/main">
   <p:cSld>
     <p:spTree>
@@ -3604,7 +4134,7 @@
         </p:nvSpPr>
         <p:spPr>
           <a:xfrm>
-            <a:off x="457199" y="1609179"/>
+            <a:off x="457199" y="1609182"/>
             <a:ext cx="8229600" cy="2585323"/>
           </a:xfrm>
           <a:prstGeom prst="rect">
@@ -3789,7 +4319,7 @@
 </p:sld>
 </file>
 
-<file path=ppt/slides/slide12.xml><?xml version="1.0" encoding="utf-8"?>
+<file path=ppt/slides/slide14.xml><?xml version="1.0" encoding="utf-8"?>
 <p:sld xmlns:a="http://schemas.openxmlformats.org/drawingml/2006/main" xmlns:r="http://schemas.openxmlformats.org/officeDocument/2006/relationships" xmlns:p="http://schemas.openxmlformats.org/presentationml/2006/main">
   <p:cSld>
     <p:spTree>
@@ -3922,7 +4452,7 @@
         </p:nvSpPr>
         <p:spPr>
           <a:xfrm>
-            <a:off x="457201" y="4057624"/>
+            <a:off x="457201" y="4057627"/>
             <a:ext cx="8229600" cy="2585323"/>
           </a:xfrm>
           <a:prstGeom prst="rect">
@@ -4181,7 +4711,7 @@
         <p:spPr>
           <a:xfrm>
             <a:off x="457201" y="1732547"/>
-            <a:ext cx="8229600" cy="4939814"/>
+            <a:ext cx="8229600" cy="4985980"/>
           </a:xfrm>
           <a:prstGeom prst="rect">
             <a:avLst/>
@@ -4345,7 +4875,7 @@
         </p:nvSpPr>
         <p:spPr>
           <a:xfrm>
-            <a:off x="457201" y="1773455"/>
+            <a:off x="457202" y="1773456"/>
             <a:ext cx="3980852" cy="4801314"/>
           </a:xfrm>
           <a:prstGeom prst="rect">
@@ -4449,7 +4979,7 @@
         </p:nvSpPr>
         <p:spPr>
           <a:xfrm>
-            <a:off x="4705947" y="1773455"/>
+            <a:off x="4705947" y="1773456"/>
             <a:ext cx="3980852" cy="4801314"/>
           </a:xfrm>
           <a:prstGeom prst="rect">
@@ -4620,7 +5150,7 @@
         </p:nvSpPr>
         <p:spPr>
           <a:xfrm>
-            <a:off x="457200" y="1773455"/>
+            <a:off x="457203" y="1773455"/>
             <a:ext cx="8229601" cy="2308324"/>
           </a:xfrm>
           <a:prstGeom prst="rect">
@@ -4681,7 +5211,7 @@
         </p:nvSpPr>
         <p:spPr>
           <a:xfrm>
-            <a:off x="457201" y="4370037"/>
+            <a:off x="457201" y="4370038"/>
             <a:ext cx="8229600" cy="2308324"/>
           </a:xfrm>
           <a:prstGeom prst="rect">
@@ -4783,8 +5313,8 @@
         </p:nvSpPr>
         <p:spPr>
           <a:xfrm>
-            <a:off x="457201" y="342197"/>
-            <a:ext cx="8229600" cy="1143000"/>
+            <a:off x="975364" y="342197"/>
+            <a:ext cx="7711439" cy="1143000"/>
           </a:xfrm>
           <a:solidFill>
             <a:schemeClr val="accent4">
@@ -4815,8 +5345,8 @@
         </p:nvSpPr>
         <p:spPr>
           <a:xfrm>
-            <a:off x="457201" y="1773455"/>
-            <a:ext cx="2709511" cy="4801314"/>
+            <a:off x="457204" y="1773456"/>
+            <a:ext cx="2709511" cy="3970318"/>
           </a:xfrm>
           <a:prstGeom prst="rect">
             <a:avLst/>
@@ -4859,15 +5389,6 @@
               <a:rPr lang="en-IN" dirty="0"/>
               <a:t>3</a:t>
             </a:r>
-          </a:p>
-          <a:p>
-            <a:endParaRPr lang="en-IN" dirty="0"/>
-          </a:p>
-          <a:p>
-            <a:endParaRPr lang="en-IN" dirty="0"/>
-          </a:p>
-          <a:p>
-            <a:endParaRPr lang="en-IN" dirty="0"/>
           </a:p>
           <a:p>
             <a:endParaRPr lang="en-IN" dirty="0"/>
@@ -4903,8 +5424,8 @@
         </p:nvSpPr>
         <p:spPr>
           <a:xfrm>
-            <a:off x="3310688" y="1773455"/>
-            <a:ext cx="2522624" cy="4801314"/>
+            <a:off x="3310688" y="1773456"/>
+            <a:ext cx="2522624" cy="3970318"/>
           </a:xfrm>
           <a:prstGeom prst="rect">
             <a:avLst/>
@@ -4973,18 +5494,6 @@
             <a:pPr algn="ctr"/>
             <a:endParaRPr lang="en-IN" dirty="0"/>
           </a:p>
-          <a:p>
-            <a:pPr algn="ctr"/>
-            <a:endParaRPr lang="en-IN" dirty="0"/>
-          </a:p>
-          <a:p>
-            <a:pPr algn="ctr"/>
-            <a:endParaRPr lang="en-IN" dirty="0"/>
-          </a:p>
-          <a:p>
-            <a:pPr algn="ctr"/>
-            <a:endParaRPr lang="en-IN" dirty="0"/>
-          </a:p>
         </p:txBody>
       </p:sp>
       <p:sp>
@@ -5001,8 +5510,8 @@
         </p:nvSpPr>
         <p:spPr>
           <a:xfrm>
-            <a:off x="5977290" y="1773455"/>
-            <a:ext cx="2709511" cy="4801314"/>
+            <a:off x="5977294" y="1773456"/>
+            <a:ext cx="2709511" cy="3970318"/>
           </a:xfrm>
           <a:prstGeom prst="rect">
             <a:avLst/>
@@ -5066,14 +5575,181 @@
           <a:p>
             <a:endParaRPr lang="en-IN" dirty="0"/>
           </a:p>
-          <a:p>
-            <a:endParaRPr lang="en-IN" dirty="0"/>
-          </a:p>
-          <a:p>
-            <a:endParaRPr lang="en-IN" dirty="0"/>
-          </a:p>
-          <a:p>
-            <a:endParaRPr lang="en-IN" dirty="0"/>
+        </p:txBody>
+      </p:sp>
+      <p:sp>
+        <p:nvSpPr>
+          <p:cNvPr id="6" name="Rectangle 5">
+            <a:extLst>
+              <a:ext uri="{FF2B5EF4-FFF2-40B4-BE49-F238E27FC236}">
+                <a16:creationId xmlns:a16="http://schemas.microsoft.com/office/drawing/2014/main" id="{CC928587-575F-A1B1-2614-BE8BDD630278}"/>
+              </a:ext>
+            </a:extLst>
+          </p:cNvPr>
+          <p:cNvSpPr/>
+          <p:nvPr/>
+        </p:nvSpPr>
+        <p:spPr>
+          <a:xfrm>
+            <a:off x="457204" y="5943603"/>
+            <a:ext cx="1026159" cy="724273"/>
+          </a:xfrm>
+          <a:prstGeom prst="rect">
+            <a:avLst/>
+          </a:prstGeom>
+        </p:spPr>
+        <p:style>
+          <a:lnRef idx="1">
+            <a:schemeClr val="accent1"/>
+          </a:lnRef>
+          <a:fillRef idx="3">
+            <a:schemeClr val="accent1"/>
+          </a:fillRef>
+          <a:effectRef idx="2">
+            <a:schemeClr val="accent1"/>
+          </a:effectRef>
+          <a:fontRef idx="minor">
+            <a:schemeClr val="lt1"/>
+          </a:fontRef>
+        </p:style>
+        <p:txBody>
+          <a:bodyPr rtlCol="0" anchor="ctr"/>
+          <a:lstStyle/>
+          <a:p>
+            <a:pPr algn="ctr"/>
+            <a:endParaRPr lang="en-IN"/>
+          </a:p>
+        </p:txBody>
+      </p:sp>
+      <p:sp>
+        <p:nvSpPr>
+          <p:cNvPr id="10" name="Rectangle 9">
+            <a:extLst>
+              <a:ext uri="{FF2B5EF4-FFF2-40B4-BE49-F238E27FC236}">
+                <a16:creationId xmlns:a16="http://schemas.microsoft.com/office/drawing/2014/main" id="{07849951-6ED5-38E2-A5CC-8644E8366148}"/>
+              </a:ext>
+            </a:extLst>
+          </p:cNvPr>
+          <p:cNvSpPr/>
+          <p:nvPr/>
+        </p:nvSpPr>
+        <p:spPr>
+          <a:xfrm>
+            <a:off x="1564643" y="5943602"/>
+            <a:ext cx="6177279" cy="724273"/>
+          </a:xfrm>
+          <a:prstGeom prst="rect">
+            <a:avLst/>
+          </a:prstGeom>
+        </p:spPr>
+        <p:style>
+          <a:lnRef idx="1">
+            <a:schemeClr val="accent1"/>
+          </a:lnRef>
+          <a:fillRef idx="3">
+            <a:schemeClr val="accent1"/>
+          </a:fillRef>
+          <a:effectRef idx="2">
+            <a:schemeClr val="accent1"/>
+          </a:effectRef>
+          <a:fontRef idx="minor">
+            <a:schemeClr val="lt1"/>
+          </a:fontRef>
+        </p:style>
+        <p:txBody>
+          <a:bodyPr rtlCol="0" anchor="ctr"/>
+          <a:lstStyle/>
+          <a:p>
+            <a:pPr algn="ctr"/>
+            <a:endParaRPr lang="en-IN"/>
+          </a:p>
+        </p:txBody>
+      </p:sp>
+      <p:sp>
+        <p:nvSpPr>
+          <p:cNvPr id="11" name="Rectangle 10">
+            <a:extLst>
+              <a:ext uri="{FF2B5EF4-FFF2-40B4-BE49-F238E27FC236}">
+                <a16:creationId xmlns:a16="http://schemas.microsoft.com/office/drawing/2014/main" id="{00857C9E-351A-0614-7337-2254968C4BF3}"/>
+              </a:ext>
+            </a:extLst>
+          </p:cNvPr>
+          <p:cNvSpPr/>
+          <p:nvPr/>
+        </p:nvSpPr>
+        <p:spPr>
+          <a:xfrm>
+            <a:off x="7854214" y="5943601"/>
+            <a:ext cx="832588" cy="724273"/>
+          </a:xfrm>
+          <a:prstGeom prst="rect">
+            <a:avLst/>
+          </a:prstGeom>
+        </p:spPr>
+        <p:style>
+          <a:lnRef idx="1">
+            <a:schemeClr val="accent1"/>
+          </a:lnRef>
+          <a:fillRef idx="3">
+            <a:schemeClr val="accent1"/>
+          </a:fillRef>
+          <a:effectRef idx="2">
+            <a:schemeClr val="accent1"/>
+          </a:effectRef>
+          <a:fontRef idx="minor">
+            <a:schemeClr val="lt1"/>
+          </a:fontRef>
+        </p:style>
+        <p:txBody>
+          <a:bodyPr rtlCol="0" anchor="ctr"/>
+          <a:lstStyle/>
+          <a:p>
+            <a:pPr algn="ctr"/>
+            <a:endParaRPr lang="en-IN"/>
+          </a:p>
+        </p:txBody>
+      </p:sp>
+      <p:sp>
+        <p:nvSpPr>
+          <p:cNvPr id="12" name="Rectangle 11">
+            <a:extLst>
+              <a:ext uri="{FF2B5EF4-FFF2-40B4-BE49-F238E27FC236}">
+                <a16:creationId xmlns:a16="http://schemas.microsoft.com/office/drawing/2014/main" id="{84FBB502-97FD-BDAE-6AD4-0D1C06366F29}"/>
+              </a:ext>
+            </a:extLst>
+          </p:cNvPr>
+          <p:cNvSpPr/>
+          <p:nvPr/>
+        </p:nvSpPr>
+        <p:spPr>
+          <a:xfrm>
+            <a:off x="457201" y="342200"/>
+            <a:ext cx="518160" cy="653483"/>
+          </a:xfrm>
+          <a:prstGeom prst="rect">
+            <a:avLst/>
+          </a:prstGeom>
+        </p:spPr>
+        <p:style>
+          <a:lnRef idx="1">
+            <a:schemeClr val="accent1"/>
+          </a:lnRef>
+          <a:fillRef idx="3">
+            <a:schemeClr val="accent1"/>
+          </a:fillRef>
+          <a:effectRef idx="2">
+            <a:schemeClr val="accent1"/>
+          </a:effectRef>
+          <a:fontRef idx="minor">
+            <a:schemeClr val="lt1"/>
+          </a:fontRef>
+        </p:style>
+        <p:txBody>
+          <a:bodyPr rtlCol="0" anchor="ctr"/>
+          <a:lstStyle/>
+          <a:p>
+            <a:pPr algn="ctr"/>
+            <a:endParaRPr lang="en-IN"/>
           </a:p>
         </p:txBody>
       </p:sp>
@@ -5091,6 +5767,950 @@
 </file>
 
 <file path=ppt/slides/slide6.xml><?xml version="1.0" encoding="utf-8"?>
+<p:sld xmlns:a="http://schemas.openxmlformats.org/drawingml/2006/main" xmlns:r="http://schemas.openxmlformats.org/officeDocument/2006/relationships" xmlns:p="http://schemas.openxmlformats.org/presentationml/2006/main">
+  <p:cSld>
+    <p:spTree>
+      <p:nvGrpSpPr>
+        <p:cNvPr id="1" name="">
+          <a:extLst>
+            <a:ext uri="{FF2B5EF4-FFF2-40B4-BE49-F238E27FC236}">
+              <a16:creationId xmlns:a16="http://schemas.microsoft.com/office/drawing/2014/main" id="{D0F6BBEE-0AE2-B46C-89AD-3658BE925E11}"/>
+            </a:ext>
+          </a:extLst>
+        </p:cNvPr>
+        <p:cNvGrpSpPr/>
+        <p:nvPr/>
+      </p:nvGrpSpPr>
+      <p:grpSpPr>
+        <a:xfrm>
+          <a:off x="0" y="0"/>
+          <a:ext cx="0" cy="0"/>
+          <a:chOff x="0" y="0"/>
+          <a:chExt cx="0" cy="0"/>
+        </a:xfrm>
+      </p:grpSpPr>
+      <p:sp>
+        <p:nvSpPr>
+          <p:cNvPr id="2" name="Title 1">
+            <a:extLst>
+              <a:ext uri="{FF2B5EF4-FFF2-40B4-BE49-F238E27FC236}">
+                <a16:creationId xmlns:a16="http://schemas.microsoft.com/office/drawing/2014/main" id="{F1705452-5EB5-CC07-2F33-587D19DAAA4B}"/>
+              </a:ext>
+            </a:extLst>
+          </p:cNvPr>
+          <p:cNvSpPr>
+            <a:spLocks noGrp="1"/>
+          </p:cNvSpPr>
+          <p:nvPr>
+            <p:ph type="title"/>
+          </p:nvPr>
+        </p:nvSpPr>
+        <p:spPr>
+          <a:xfrm>
+            <a:off x="457202" y="342197"/>
+            <a:ext cx="7701281" cy="1143000"/>
+          </a:xfrm>
+          <a:solidFill>
+            <a:schemeClr val="accent4">
+              <a:lumMod val="20000"/>
+              <a:lumOff val="80000"/>
+            </a:schemeClr>
+          </a:solidFill>
+        </p:spPr>
+        <p:txBody>
+          <a:bodyPr/>
+          <a:lstStyle/>
+          <a:p>
+            <a:endParaRPr lang="en-IN" dirty="0"/>
+          </a:p>
+        </p:txBody>
+      </p:sp>
+      <p:sp>
+        <p:nvSpPr>
+          <p:cNvPr id="4" name="TextBox 3">
+            <a:extLst>
+              <a:ext uri="{FF2B5EF4-FFF2-40B4-BE49-F238E27FC236}">
+                <a16:creationId xmlns:a16="http://schemas.microsoft.com/office/drawing/2014/main" id="{CEC44CCA-A261-DDC4-C19F-E35B883F6D7A}"/>
+              </a:ext>
+            </a:extLst>
+          </p:cNvPr>
+          <p:cNvSpPr txBox="1"/>
+          <p:nvPr/>
+        </p:nvSpPr>
+        <p:spPr>
+          <a:xfrm>
+            <a:off x="457204" y="1773456"/>
+            <a:ext cx="2709511" cy="3970318"/>
+          </a:xfrm>
+          <a:prstGeom prst="rect">
+            <a:avLst/>
+          </a:prstGeom>
+          <a:solidFill>
+            <a:schemeClr val="bg2">
+              <a:lumMod val="90000"/>
+            </a:schemeClr>
+          </a:solidFill>
+        </p:spPr>
+        <p:txBody>
+          <a:bodyPr wrap="square" rtlCol="0">
+            <a:spAutoFit/>
+          </a:bodyPr>
+          <a:lstStyle/>
+          <a:p>
+            <a:endParaRPr lang="en-US" dirty="0"/>
+          </a:p>
+          <a:p>
+            <a:endParaRPr lang="en-IN" dirty="0"/>
+          </a:p>
+          <a:p>
+            <a:endParaRPr lang="en-IN" dirty="0"/>
+          </a:p>
+          <a:p>
+            <a:endParaRPr lang="en-IN" dirty="0"/>
+          </a:p>
+          <a:p>
+            <a:endParaRPr lang="en-IN" dirty="0"/>
+          </a:p>
+          <a:p>
+            <a:endParaRPr lang="en-IN" dirty="0"/>
+          </a:p>
+          <a:p>
+            <a:endParaRPr lang="en-IN" dirty="0"/>
+          </a:p>
+          <a:p>
+            <a:pPr algn="ctr"/>
+            <a:r>
+              <a:rPr lang="en-IN" dirty="0"/>
+              <a:t>3</a:t>
+            </a:r>
+          </a:p>
+          <a:p>
+            <a:endParaRPr lang="en-IN" dirty="0"/>
+          </a:p>
+          <a:p>
+            <a:endParaRPr lang="en-IN" dirty="0"/>
+          </a:p>
+          <a:p>
+            <a:endParaRPr lang="en-IN" dirty="0"/>
+          </a:p>
+          <a:p>
+            <a:endParaRPr lang="en-IN" dirty="0"/>
+          </a:p>
+          <a:p>
+            <a:endParaRPr lang="en-IN" dirty="0"/>
+          </a:p>
+          <a:p>
+            <a:endParaRPr lang="en-IN" dirty="0"/>
+          </a:p>
+        </p:txBody>
+      </p:sp>
+      <p:sp>
+        <p:nvSpPr>
+          <p:cNvPr id="5" name="TextBox 4">
+            <a:extLst>
+              <a:ext uri="{FF2B5EF4-FFF2-40B4-BE49-F238E27FC236}">
+                <a16:creationId xmlns:a16="http://schemas.microsoft.com/office/drawing/2014/main" id="{6B5E5C80-A9B8-5691-7DD8-576BE64FAF22}"/>
+              </a:ext>
+            </a:extLst>
+          </p:cNvPr>
+          <p:cNvSpPr txBox="1"/>
+          <p:nvPr/>
+        </p:nvSpPr>
+        <p:spPr>
+          <a:xfrm>
+            <a:off x="3310688" y="1773456"/>
+            <a:ext cx="2522624" cy="3970318"/>
+          </a:xfrm>
+          <a:prstGeom prst="rect">
+            <a:avLst/>
+          </a:prstGeom>
+          <a:solidFill>
+            <a:schemeClr val="accent3">
+              <a:lumMod val="40000"/>
+              <a:lumOff val="60000"/>
+            </a:schemeClr>
+          </a:solidFill>
+        </p:spPr>
+        <p:txBody>
+          <a:bodyPr wrap="square" rtlCol="0">
+            <a:spAutoFit/>
+          </a:bodyPr>
+          <a:lstStyle/>
+          <a:p>
+            <a:endParaRPr lang="en-US" dirty="0"/>
+          </a:p>
+          <a:p>
+            <a:endParaRPr lang="en-IN" dirty="0"/>
+          </a:p>
+          <a:p>
+            <a:endParaRPr lang="en-IN" dirty="0"/>
+          </a:p>
+          <a:p>
+            <a:endParaRPr lang="en-IN" dirty="0"/>
+          </a:p>
+          <a:p>
+            <a:endParaRPr lang="en-IN" dirty="0"/>
+          </a:p>
+          <a:p>
+            <a:endParaRPr lang="en-IN" dirty="0"/>
+          </a:p>
+          <a:p>
+            <a:endParaRPr lang="en-IN" dirty="0"/>
+          </a:p>
+          <a:p>
+            <a:pPr algn="ctr"/>
+            <a:r>
+              <a:rPr lang="en-IN" dirty="0"/>
+              <a:t>3</a:t>
+            </a:r>
+          </a:p>
+          <a:p>
+            <a:pPr algn="ctr"/>
+            <a:endParaRPr lang="en-IN" dirty="0"/>
+          </a:p>
+          <a:p>
+            <a:pPr algn="ctr"/>
+            <a:endParaRPr lang="en-IN" dirty="0"/>
+          </a:p>
+          <a:p>
+            <a:pPr algn="ctr"/>
+            <a:endParaRPr lang="en-IN" dirty="0"/>
+          </a:p>
+          <a:p>
+            <a:pPr algn="ctr"/>
+            <a:endParaRPr lang="en-IN" dirty="0"/>
+          </a:p>
+          <a:p>
+            <a:pPr algn="ctr"/>
+            <a:endParaRPr lang="en-IN" dirty="0"/>
+          </a:p>
+          <a:p>
+            <a:pPr algn="ctr"/>
+            <a:endParaRPr lang="en-IN" dirty="0"/>
+          </a:p>
+        </p:txBody>
+      </p:sp>
+      <p:sp>
+        <p:nvSpPr>
+          <p:cNvPr id="3" name="TextBox 2">
+            <a:extLst>
+              <a:ext uri="{FF2B5EF4-FFF2-40B4-BE49-F238E27FC236}">
+                <a16:creationId xmlns:a16="http://schemas.microsoft.com/office/drawing/2014/main" id="{B00B3BFD-5D1B-0F4A-C338-7E6BD9FFA646}"/>
+              </a:ext>
+            </a:extLst>
+          </p:cNvPr>
+          <p:cNvSpPr txBox="1"/>
+          <p:nvPr/>
+        </p:nvSpPr>
+        <p:spPr>
+          <a:xfrm>
+            <a:off x="5977294" y="1773456"/>
+            <a:ext cx="2709511" cy="3970318"/>
+          </a:xfrm>
+          <a:prstGeom prst="rect">
+            <a:avLst/>
+          </a:prstGeom>
+          <a:solidFill>
+            <a:schemeClr val="accent1">
+              <a:lumMod val="20000"/>
+              <a:lumOff val="80000"/>
+            </a:schemeClr>
+          </a:solidFill>
+        </p:spPr>
+        <p:txBody>
+          <a:bodyPr wrap="square" rtlCol="0">
+            <a:spAutoFit/>
+          </a:bodyPr>
+          <a:lstStyle/>
+          <a:p>
+            <a:endParaRPr lang="en-US" dirty="0"/>
+          </a:p>
+          <a:p>
+            <a:endParaRPr lang="en-IN" dirty="0"/>
+          </a:p>
+          <a:p>
+            <a:endParaRPr lang="en-IN" dirty="0"/>
+          </a:p>
+          <a:p>
+            <a:endParaRPr lang="en-IN" dirty="0"/>
+          </a:p>
+          <a:p>
+            <a:endParaRPr lang="en-IN" dirty="0"/>
+          </a:p>
+          <a:p>
+            <a:endParaRPr lang="en-IN" dirty="0"/>
+          </a:p>
+          <a:p>
+            <a:endParaRPr lang="en-IN" dirty="0"/>
+          </a:p>
+          <a:p>
+            <a:pPr algn="ctr"/>
+            <a:r>
+              <a:rPr lang="en-IN" dirty="0"/>
+              <a:t>3</a:t>
+            </a:r>
+          </a:p>
+          <a:p>
+            <a:pPr algn="ctr"/>
+            <a:endParaRPr lang="en-IN" dirty="0"/>
+          </a:p>
+          <a:p>
+            <a:endParaRPr lang="en-IN" dirty="0"/>
+          </a:p>
+          <a:p>
+            <a:endParaRPr lang="en-IN" dirty="0"/>
+          </a:p>
+          <a:p>
+            <a:endParaRPr lang="en-IN" dirty="0"/>
+          </a:p>
+          <a:p>
+            <a:endParaRPr lang="en-IN" dirty="0"/>
+          </a:p>
+          <a:p>
+            <a:endParaRPr lang="en-IN" dirty="0"/>
+          </a:p>
+        </p:txBody>
+      </p:sp>
+      <p:sp>
+        <p:nvSpPr>
+          <p:cNvPr id="10" name="Rectangle 9">
+            <a:extLst>
+              <a:ext uri="{FF2B5EF4-FFF2-40B4-BE49-F238E27FC236}">
+                <a16:creationId xmlns:a16="http://schemas.microsoft.com/office/drawing/2014/main" id="{07849951-6ED5-38E2-A5CC-8644E8366148}"/>
+              </a:ext>
+            </a:extLst>
+          </p:cNvPr>
+          <p:cNvSpPr/>
+          <p:nvPr/>
+        </p:nvSpPr>
+        <p:spPr>
+          <a:xfrm>
+            <a:off x="3310688" y="5943603"/>
+            <a:ext cx="2522624" cy="724273"/>
+          </a:xfrm>
+          <a:prstGeom prst="rect">
+            <a:avLst/>
+          </a:prstGeom>
+        </p:spPr>
+        <p:style>
+          <a:lnRef idx="1">
+            <a:schemeClr val="accent1"/>
+          </a:lnRef>
+          <a:fillRef idx="3">
+            <a:schemeClr val="accent1"/>
+          </a:fillRef>
+          <a:effectRef idx="2">
+            <a:schemeClr val="accent1"/>
+          </a:effectRef>
+          <a:fontRef idx="minor">
+            <a:schemeClr val="lt1"/>
+          </a:fontRef>
+        </p:style>
+        <p:txBody>
+          <a:bodyPr rtlCol="0" anchor="ctr"/>
+          <a:lstStyle/>
+          <a:p>
+            <a:pPr algn="ctr"/>
+            <a:endParaRPr lang="en-IN"/>
+          </a:p>
+        </p:txBody>
+      </p:sp>
+      <p:sp>
+        <p:nvSpPr>
+          <p:cNvPr id="12" name="Rectangle 11">
+            <a:extLst>
+              <a:ext uri="{FF2B5EF4-FFF2-40B4-BE49-F238E27FC236}">
+                <a16:creationId xmlns:a16="http://schemas.microsoft.com/office/drawing/2014/main" id="{84FBB502-97FD-BDAE-6AD4-0D1C06366F29}"/>
+              </a:ext>
+            </a:extLst>
+          </p:cNvPr>
+          <p:cNvSpPr/>
+          <p:nvPr/>
+        </p:nvSpPr>
+        <p:spPr>
+          <a:xfrm>
+            <a:off x="8158483" y="342200"/>
+            <a:ext cx="528321" cy="633163"/>
+          </a:xfrm>
+          <a:prstGeom prst="rect">
+            <a:avLst/>
+          </a:prstGeom>
+        </p:spPr>
+        <p:style>
+          <a:lnRef idx="1">
+            <a:schemeClr val="accent1"/>
+          </a:lnRef>
+          <a:fillRef idx="3">
+            <a:schemeClr val="accent1"/>
+          </a:fillRef>
+          <a:effectRef idx="2">
+            <a:schemeClr val="accent1"/>
+          </a:effectRef>
+          <a:fontRef idx="minor">
+            <a:schemeClr val="lt1"/>
+          </a:fontRef>
+        </p:style>
+        <p:txBody>
+          <a:bodyPr rtlCol="0" anchor="ctr"/>
+          <a:lstStyle/>
+          <a:p>
+            <a:pPr algn="ctr"/>
+            <a:endParaRPr lang="en-IN"/>
+          </a:p>
+        </p:txBody>
+      </p:sp>
+      <p:sp>
+        <p:nvSpPr>
+          <p:cNvPr id="7" name="Rectangle 6">
+            <a:extLst>
+              <a:ext uri="{FF2B5EF4-FFF2-40B4-BE49-F238E27FC236}">
+                <a16:creationId xmlns:a16="http://schemas.microsoft.com/office/drawing/2014/main" id="{D6E51943-822B-9D65-502A-C597A0728F49}"/>
+              </a:ext>
+            </a:extLst>
+          </p:cNvPr>
+          <p:cNvSpPr/>
+          <p:nvPr/>
+        </p:nvSpPr>
+        <p:spPr>
+          <a:xfrm>
+            <a:off x="523640" y="5943603"/>
+            <a:ext cx="2643072" cy="724273"/>
+          </a:xfrm>
+          <a:prstGeom prst="rect">
+            <a:avLst/>
+          </a:prstGeom>
+        </p:spPr>
+        <p:style>
+          <a:lnRef idx="1">
+            <a:schemeClr val="accent1"/>
+          </a:lnRef>
+          <a:fillRef idx="3">
+            <a:schemeClr val="accent1"/>
+          </a:fillRef>
+          <a:effectRef idx="2">
+            <a:schemeClr val="accent1"/>
+          </a:effectRef>
+          <a:fontRef idx="minor">
+            <a:schemeClr val="lt1"/>
+          </a:fontRef>
+        </p:style>
+        <p:txBody>
+          <a:bodyPr rtlCol="0" anchor="ctr"/>
+          <a:lstStyle/>
+          <a:p>
+            <a:pPr algn="ctr"/>
+            <a:endParaRPr lang="en-IN"/>
+          </a:p>
+        </p:txBody>
+      </p:sp>
+      <p:sp>
+        <p:nvSpPr>
+          <p:cNvPr id="8" name="Rectangle 7">
+            <a:extLst>
+              <a:ext uri="{FF2B5EF4-FFF2-40B4-BE49-F238E27FC236}">
+                <a16:creationId xmlns:a16="http://schemas.microsoft.com/office/drawing/2014/main" id="{C78189C5-1295-DC09-FED6-3523C707F0E6}"/>
+              </a:ext>
+            </a:extLst>
+          </p:cNvPr>
+          <p:cNvSpPr/>
+          <p:nvPr/>
+        </p:nvSpPr>
+        <p:spPr>
+          <a:xfrm>
+            <a:off x="5977291" y="5943603"/>
+            <a:ext cx="2709511" cy="724273"/>
+          </a:xfrm>
+          <a:prstGeom prst="rect">
+            <a:avLst/>
+          </a:prstGeom>
+        </p:spPr>
+        <p:style>
+          <a:lnRef idx="1">
+            <a:schemeClr val="accent1"/>
+          </a:lnRef>
+          <a:fillRef idx="3">
+            <a:schemeClr val="accent1"/>
+          </a:fillRef>
+          <a:effectRef idx="2">
+            <a:schemeClr val="accent1"/>
+          </a:effectRef>
+          <a:fontRef idx="minor">
+            <a:schemeClr val="lt1"/>
+          </a:fontRef>
+        </p:style>
+        <p:txBody>
+          <a:bodyPr rtlCol="0" anchor="ctr"/>
+          <a:lstStyle/>
+          <a:p>
+            <a:pPr algn="ctr"/>
+            <a:endParaRPr lang="en-IN"/>
+          </a:p>
+        </p:txBody>
+      </p:sp>
+    </p:spTree>
+    <p:extLst>
+      <p:ext uri="{BB962C8B-B14F-4D97-AF65-F5344CB8AC3E}">
+        <p14:creationId xmlns:p14="http://schemas.microsoft.com/office/powerpoint/2010/main" val="2909748049"/>
+      </p:ext>
+    </p:extLst>
+  </p:cSld>
+  <p:clrMapOvr>
+    <a:masterClrMapping/>
+  </p:clrMapOvr>
+</p:sld>
+</file>
+
+<file path=ppt/slides/slide7.xml><?xml version="1.0" encoding="utf-8"?>
+<p:sld xmlns:a="http://schemas.openxmlformats.org/drawingml/2006/main" xmlns:r="http://schemas.openxmlformats.org/officeDocument/2006/relationships" xmlns:p="http://schemas.openxmlformats.org/presentationml/2006/main">
+  <p:cSld>
+    <p:spTree>
+      <p:nvGrpSpPr>
+        <p:cNvPr id="1" name="">
+          <a:extLst>
+            <a:ext uri="{FF2B5EF4-FFF2-40B4-BE49-F238E27FC236}">
+              <a16:creationId xmlns:a16="http://schemas.microsoft.com/office/drawing/2014/main" id="{D0F6BBEE-0AE2-B46C-89AD-3658BE925E11}"/>
+            </a:ext>
+          </a:extLst>
+        </p:cNvPr>
+        <p:cNvGrpSpPr/>
+        <p:nvPr/>
+      </p:nvGrpSpPr>
+      <p:grpSpPr>
+        <a:xfrm>
+          <a:off x="0" y="0"/>
+          <a:ext cx="0" cy="0"/>
+          <a:chOff x="0" y="0"/>
+          <a:chExt cx="0" cy="0"/>
+        </a:xfrm>
+      </p:grpSpPr>
+      <p:sp>
+        <p:nvSpPr>
+          <p:cNvPr id="2" name="Title 1">
+            <a:extLst>
+              <a:ext uri="{FF2B5EF4-FFF2-40B4-BE49-F238E27FC236}">
+                <a16:creationId xmlns:a16="http://schemas.microsoft.com/office/drawing/2014/main" id="{F1705452-5EB5-CC07-2F33-587D19DAAA4B}"/>
+              </a:ext>
+            </a:extLst>
+          </p:cNvPr>
+          <p:cNvSpPr>
+            <a:spLocks noGrp="1"/>
+          </p:cNvSpPr>
+          <p:nvPr>
+            <p:ph type="title"/>
+          </p:nvPr>
+        </p:nvSpPr>
+        <p:spPr>
+          <a:xfrm>
+            <a:off x="457200" y="342197"/>
+            <a:ext cx="8229603" cy="1143000"/>
+          </a:xfrm>
+          <a:solidFill>
+            <a:schemeClr val="accent4">
+              <a:lumMod val="20000"/>
+              <a:lumOff val="80000"/>
+            </a:schemeClr>
+          </a:solidFill>
+        </p:spPr>
+        <p:txBody>
+          <a:bodyPr/>
+          <a:lstStyle/>
+          <a:p>
+            <a:endParaRPr lang="en-IN" dirty="0"/>
+          </a:p>
+        </p:txBody>
+      </p:sp>
+      <p:sp>
+        <p:nvSpPr>
+          <p:cNvPr id="4" name="TextBox 3">
+            <a:extLst>
+              <a:ext uri="{FF2B5EF4-FFF2-40B4-BE49-F238E27FC236}">
+                <a16:creationId xmlns:a16="http://schemas.microsoft.com/office/drawing/2014/main" id="{CEC44CCA-A261-DDC4-C19F-E35B883F6D7A}"/>
+              </a:ext>
+            </a:extLst>
+          </p:cNvPr>
+          <p:cNvSpPr txBox="1"/>
+          <p:nvPr/>
+        </p:nvSpPr>
+        <p:spPr>
+          <a:xfrm>
+            <a:off x="457204" y="1773456"/>
+            <a:ext cx="2709511" cy="3970318"/>
+          </a:xfrm>
+          <a:prstGeom prst="rect">
+            <a:avLst/>
+          </a:prstGeom>
+          <a:solidFill>
+            <a:schemeClr val="bg2">
+              <a:lumMod val="90000"/>
+            </a:schemeClr>
+          </a:solidFill>
+        </p:spPr>
+        <p:txBody>
+          <a:bodyPr wrap="square" rtlCol="0">
+            <a:spAutoFit/>
+          </a:bodyPr>
+          <a:lstStyle/>
+          <a:p>
+            <a:endParaRPr lang="en-US" dirty="0"/>
+          </a:p>
+          <a:p>
+            <a:endParaRPr lang="en-IN" dirty="0"/>
+          </a:p>
+          <a:p>
+            <a:endParaRPr lang="en-IN" dirty="0"/>
+          </a:p>
+          <a:p>
+            <a:endParaRPr lang="en-IN" dirty="0"/>
+          </a:p>
+          <a:p>
+            <a:endParaRPr lang="en-IN" dirty="0"/>
+          </a:p>
+          <a:p>
+            <a:endParaRPr lang="en-IN" dirty="0"/>
+          </a:p>
+          <a:p>
+            <a:endParaRPr lang="en-IN" dirty="0"/>
+          </a:p>
+          <a:p>
+            <a:pPr algn="ctr"/>
+            <a:r>
+              <a:rPr lang="en-IN" dirty="0"/>
+              <a:t>3</a:t>
+            </a:r>
+          </a:p>
+          <a:p>
+            <a:endParaRPr lang="en-IN" dirty="0"/>
+          </a:p>
+          <a:p>
+            <a:endParaRPr lang="en-IN" dirty="0"/>
+          </a:p>
+          <a:p>
+            <a:endParaRPr lang="en-IN" dirty="0"/>
+          </a:p>
+          <a:p>
+            <a:endParaRPr lang="en-IN" dirty="0"/>
+          </a:p>
+          <a:p>
+            <a:endParaRPr lang="en-IN" dirty="0"/>
+          </a:p>
+          <a:p>
+            <a:endParaRPr lang="en-IN" dirty="0"/>
+          </a:p>
+        </p:txBody>
+      </p:sp>
+      <p:sp>
+        <p:nvSpPr>
+          <p:cNvPr id="5" name="TextBox 4">
+            <a:extLst>
+              <a:ext uri="{FF2B5EF4-FFF2-40B4-BE49-F238E27FC236}">
+                <a16:creationId xmlns:a16="http://schemas.microsoft.com/office/drawing/2014/main" id="{6B5E5C80-A9B8-5691-7DD8-576BE64FAF22}"/>
+              </a:ext>
+            </a:extLst>
+          </p:cNvPr>
+          <p:cNvSpPr txBox="1"/>
+          <p:nvPr/>
+        </p:nvSpPr>
+        <p:spPr>
+          <a:xfrm>
+            <a:off x="3310688" y="1773456"/>
+            <a:ext cx="2522624" cy="3970318"/>
+          </a:xfrm>
+          <a:prstGeom prst="rect">
+            <a:avLst/>
+          </a:prstGeom>
+          <a:solidFill>
+            <a:schemeClr val="accent3">
+              <a:lumMod val="40000"/>
+              <a:lumOff val="60000"/>
+            </a:schemeClr>
+          </a:solidFill>
+        </p:spPr>
+        <p:txBody>
+          <a:bodyPr wrap="square" rtlCol="0">
+            <a:spAutoFit/>
+          </a:bodyPr>
+          <a:lstStyle/>
+          <a:p>
+            <a:endParaRPr lang="en-US" dirty="0"/>
+          </a:p>
+          <a:p>
+            <a:endParaRPr lang="en-IN" dirty="0"/>
+          </a:p>
+          <a:p>
+            <a:endParaRPr lang="en-IN" dirty="0"/>
+          </a:p>
+          <a:p>
+            <a:endParaRPr lang="en-IN" dirty="0"/>
+          </a:p>
+          <a:p>
+            <a:endParaRPr lang="en-IN" dirty="0"/>
+          </a:p>
+          <a:p>
+            <a:endParaRPr lang="en-IN" dirty="0"/>
+          </a:p>
+          <a:p>
+            <a:endParaRPr lang="en-IN" dirty="0"/>
+          </a:p>
+          <a:p>
+            <a:pPr algn="ctr"/>
+            <a:r>
+              <a:rPr lang="en-IN" dirty="0"/>
+              <a:t>3</a:t>
+            </a:r>
+          </a:p>
+          <a:p>
+            <a:pPr algn="ctr"/>
+            <a:endParaRPr lang="en-IN" dirty="0"/>
+          </a:p>
+          <a:p>
+            <a:pPr algn="ctr"/>
+            <a:endParaRPr lang="en-IN" dirty="0"/>
+          </a:p>
+          <a:p>
+            <a:pPr algn="ctr"/>
+            <a:endParaRPr lang="en-IN" dirty="0"/>
+          </a:p>
+          <a:p>
+            <a:pPr algn="ctr"/>
+            <a:endParaRPr lang="en-IN" dirty="0"/>
+          </a:p>
+          <a:p>
+            <a:pPr algn="ctr"/>
+            <a:endParaRPr lang="en-IN" dirty="0"/>
+          </a:p>
+          <a:p>
+            <a:pPr algn="ctr"/>
+            <a:endParaRPr lang="en-IN" dirty="0"/>
+          </a:p>
+        </p:txBody>
+      </p:sp>
+      <p:sp>
+        <p:nvSpPr>
+          <p:cNvPr id="3" name="TextBox 2">
+            <a:extLst>
+              <a:ext uri="{FF2B5EF4-FFF2-40B4-BE49-F238E27FC236}">
+                <a16:creationId xmlns:a16="http://schemas.microsoft.com/office/drawing/2014/main" id="{B00B3BFD-5D1B-0F4A-C338-7E6BD9FFA646}"/>
+              </a:ext>
+            </a:extLst>
+          </p:cNvPr>
+          <p:cNvSpPr txBox="1"/>
+          <p:nvPr/>
+        </p:nvSpPr>
+        <p:spPr>
+          <a:xfrm>
+            <a:off x="5977294" y="1773456"/>
+            <a:ext cx="2709511" cy="3970318"/>
+          </a:xfrm>
+          <a:prstGeom prst="rect">
+            <a:avLst/>
+          </a:prstGeom>
+          <a:solidFill>
+            <a:schemeClr val="accent1">
+              <a:lumMod val="20000"/>
+              <a:lumOff val="80000"/>
+            </a:schemeClr>
+          </a:solidFill>
+        </p:spPr>
+        <p:txBody>
+          <a:bodyPr wrap="square" rtlCol="0">
+            <a:spAutoFit/>
+          </a:bodyPr>
+          <a:lstStyle/>
+          <a:p>
+            <a:endParaRPr lang="en-US" dirty="0"/>
+          </a:p>
+          <a:p>
+            <a:endParaRPr lang="en-IN" dirty="0"/>
+          </a:p>
+          <a:p>
+            <a:endParaRPr lang="en-IN" dirty="0"/>
+          </a:p>
+          <a:p>
+            <a:endParaRPr lang="en-IN" dirty="0"/>
+          </a:p>
+          <a:p>
+            <a:endParaRPr lang="en-IN" dirty="0"/>
+          </a:p>
+          <a:p>
+            <a:endParaRPr lang="en-IN" dirty="0"/>
+          </a:p>
+          <a:p>
+            <a:endParaRPr lang="en-IN" dirty="0"/>
+          </a:p>
+          <a:p>
+            <a:pPr algn="ctr"/>
+            <a:r>
+              <a:rPr lang="en-IN" dirty="0"/>
+              <a:t>3</a:t>
+            </a:r>
+          </a:p>
+          <a:p>
+            <a:pPr algn="ctr"/>
+            <a:endParaRPr lang="en-IN" dirty="0"/>
+          </a:p>
+          <a:p>
+            <a:endParaRPr lang="en-IN" dirty="0"/>
+          </a:p>
+          <a:p>
+            <a:endParaRPr lang="en-IN" dirty="0"/>
+          </a:p>
+          <a:p>
+            <a:endParaRPr lang="en-IN" dirty="0"/>
+          </a:p>
+          <a:p>
+            <a:endParaRPr lang="en-IN" dirty="0"/>
+          </a:p>
+          <a:p>
+            <a:endParaRPr lang="en-IN" dirty="0"/>
+          </a:p>
+        </p:txBody>
+      </p:sp>
+      <p:sp>
+        <p:nvSpPr>
+          <p:cNvPr id="6" name="Rectangle 5">
+            <a:extLst>
+              <a:ext uri="{FF2B5EF4-FFF2-40B4-BE49-F238E27FC236}">
+                <a16:creationId xmlns:a16="http://schemas.microsoft.com/office/drawing/2014/main" id="{CC928587-575F-A1B1-2614-BE8BDD630278}"/>
+              </a:ext>
+            </a:extLst>
+          </p:cNvPr>
+          <p:cNvSpPr/>
+          <p:nvPr/>
+        </p:nvSpPr>
+        <p:spPr>
+          <a:xfrm>
+            <a:off x="457203" y="5943603"/>
+            <a:ext cx="1026159" cy="724273"/>
+          </a:xfrm>
+          <a:prstGeom prst="rect">
+            <a:avLst/>
+          </a:prstGeom>
+        </p:spPr>
+        <p:style>
+          <a:lnRef idx="1">
+            <a:schemeClr val="accent1"/>
+          </a:lnRef>
+          <a:fillRef idx="3">
+            <a:schemeClr val="accent1"/>
+          </a:fillRef>
+          <a:effectRef idx="2">
+            <a:schemeClr val="accent1"/>
+          </a:effectRef>
+          <a:fontRef idx="minor">
+            <a:schemeClr val="lt1"/>
+          </a:fontRef>
+        </p:style>
+        <p:txBody>
+          <a:bodyPr rtlCol="0" anchor="ctr"/>
+          <a:lstStyle/>
+          <a:p>
+            <a:pPr algn="ctr"/>
+            <a:endParaRPr lang="en-IN"/>
+          </a:p>
+        </p:txBody>
+      </p:sp>
+      <p:sp>
+        <p:nvSpPr>
+          <p:cNvPr id="10" name="Rectangle 9">
+            <a:extLst>
+              <a:ext uri="{FF2B5EF4-FFF2-40B4-BE49-F238E27FC236}">
+                <a16:creationId xmlns:a16="http://schemas.microsoft.com/office/drawing/2014/main" id="{07849951-6ED5-38E2-A5CC-8644E8366148}"/>
+              </a:ext>
+            </a:extLst>
+          </p:cNvPr>
+          <p:cNvSpPr/>
+          <p:nvPr/>
+        </p:nvSpPr>
+        <p:spPr>
+          <a:xfrm>
+            <a:off x="1564643" y="5943602"/>
+            <a:ext cx="6177279" cy="724273"/>
+          </a:xfrm>
+          <a:prstGeom prst="rect">
+            <a:avLst/>
+          </a:prstGeom>
+        </p:spPr>
+        <p:style>
+          <a:lnRef idx="1">
+            <a:schemeClr val="accent1"/>
+          </a:lnRef>
+          <a:fillRef idx="3">
+            <a:schemeClr val="accent1"/>
+          </a:fillRef>
+          <a:effectRef idx="2">
+            <a:schemeClr val="accent1"/>
+          </a:effectRef>
+          <a:fontRef idx="minor">
+            <a:schemeClr val="lt1"/>
+          </a:fontRef>
+        </p:style>
+        <p:txBody>
+          <a:bodyPr rtlCol="0" anchor="ctr"/>
+          <a:lstStyle/>
+          <a:p>
+            <a:pPr algn="ctr"/>
+            <a:endParaRPr lang="en-IN"/>
+          </a:p>
+        </p:txBody>
+      </p:sp>
+      <p:sp>
+        <p:nvSpPr>
+          <p:cNvPr id="11" name="Rectangle 10">
+            <a:extLst>
+              <a:ext uri="{FF2B5EF4-FFF2-40B4-BE49-F238E27FC236}">
+                <a16:creationId xmlns:a16="http://schemas.microsoft.com/office/drawing/2014/main" id="{00857C9E-351A-0614-7337-2254968C4BF3}"/>
+              </a:ext>
+            </a:extLst>
+          </p:cNvPr>
+          <p:cNvSpPr/>
+          <p:nvPr/>
+        </p:nvSpPr>
+        <p:spPr>
+          <a:xfrm>
+            <a:off x="7854214" y="5943601"/>
+            <a:ext cx="832588" cy="724273"/>
+          </a:xfrm>
+          <a:prstGeom prst="rect">
+            <a:avLst/>
+          </a:prstGeom>
+        </p:spPr>
+        <p:style>
+          <a:lnRef idx="1">
+            <a:schemeClr val="accent1"/>
+          </a:lnRef>
+          <a:fillRef idx="3">
+            <a:schemeClr val="accent1"/>
+          </a:fillRef>
+          <a:effectRef idx="2">
+            <a:schemeClr val="accent1"/>
+          </a:effectRef>
+          <a:fontRef idx="minor">
+            <a:schemeClr val="lt1"/>
+          </a:fontRef>
+        </p:style>
+        <p:txBody>
+          <a:bodyPr rtlCol="0" anchor="ctr"/>
+          <a:lstStyle/>
+          <a:p>
+            <a:pPr algn="ctr"/>
+            <a:endParaRPr lang="en-IN"/>
+          </a:p>
+        </p:txBody>
+      </p:sp>
+    </p:spTree>
+    <p:extLst>
+      <p:ext uri="{BB962C8B-B14F-4D97-AF65-F5344CB8AC3E}">
+        <p14:creationId xmlns:p14="http://schemas.microsoft.com/office/powerpoint/2010/main" val="1273205768"/>
+      </p:ext>
+    </p:extLst>
+  </p:cSld>
+  <p:clrMapOvr>
+    <a:masterClrMapping/>
+  </p:clrMapOvr>
+</p:sld>
+</file>
+
+<file path=ppt/slides/slide8.xml><?xml version="1.0" encoding="utf-8"?>
 <p:sld xmlns:a="http://schemas.openxmlformats.org/drawingml/2006/main" xmlns:r="http://schemas.openxmlformats.org/officeDocument/2006/relationships" xmlns:p="http://schemas.openxmlformats.org/presentationml/2006/main">
   <p:cSld>
     <p:spTree>
@@ -5163,7 +6783,7 @@
         </p:nvSpPr>
         <p:spPr>
           <a:xfrm>
-            <a:off x="4652454" y="4266445"/>
+            <a:off x="4652458" y="4266446"/>
             <a:ext cx="4114801" cy="2308324"/>
           </a:xfrm>
           <a:prstGeom prst="rect">
@@ -5224,7 +6844,7 @@
         </p:nvSpPr>
         <p:spPr>
           <a:xfrm>
-            <a:off x="4652454" y="1773455"/>
+            <a:off x="4652458" y="1773455"/>
             <a:ext cx="4114801" cy="2308324"/>
           </a:xfrm>
           <a:prstGeom prst="rect">
@@ -5285,7 +6905,7 @@
         </p:nvSpPr>
         <p:spPr>
           <a:xfrm>
-            <a:off x="457201" y="1773455"/>
+            <a:off x="457202" y="1773456"/>
             <a:ext cx="3980852" cy="4801314"/>
           </a:xfrm>
           <a:prstGeom prst="rect">
@@ -5387,7 +7007,7 @@
 </p:sld>
 </file>
 
-<file path=ppt/slides/slide7.xml><?xml version="1.0" encoding="utf-8"?>
+<file path=ppt/slides/slide9.xml><?xml version="1.0" encoding="utf-8"?>
 <p:sld xmlns:a="http://schemas.openxmlformats.org/drawingml/2006/main" xmlns:r="http://schemas.openxmlformats.org/officeDocument/2006/relationships" xmlns:p="http://schemas.openxmlformats.org/presentationml/2006/main">
   <p:cSld>
     <p:spTree>
@@ -5460,7 +7080,7 @@
         </p:nvSpPr>
         <p:spPr>
           <a:xfrm>
-            <a:off x="461818" y="4358778"/>
+            <a:off x="461822" y="4358778"/>
             <a:ext cx="4114801" cy="2308324"/>
           </a:xfrm>
           <a:prstGeom prst="rect">
@@ -5521,7 +7141,7 @@
         </p:nvSpPr>
         <p:spPr>
           <a:xfrm>
-            <a:off x="457199" y="1865788"/>
+            <a:off x="457202" y="1865788"/>
             <a:ext cx="4114801" cy="2308324"/>
           </a:xfrm>
           <a:prstGeom prst="rect">
@@ -5582,7 +7202,7 @@
         </p:nvSpPr>
         <p:spPr>
           <a:xfrm>
-            <a:off x="4701330" y="1865788"/>
+            <a:off x="4701331" y="1865790"/>
             <a:ext cx="3980852" cy="4801314"/>
           </a:xfrm>
           <a:prstGeom prst="rect">
@@ -5675,534 +7295,6 @@
     <p:extLst>
       <p:ext uri="{BB962C8B-B14F-4D97-AF65-F5344CB8AC3E}">
         <p14:creationId xmlns:p14="http://schemas.microsoft.com/office/powerpoint/2010/main" val="1949459062"/>
-      </p:ext>
-    </p:extLst>
-  </p:cSld>
-  <p:clrMapOvr>
-    <a:masterClrMapping/>
-  </p:clrMapOvr>
-</p:sld>
-</file>
-
-<file path=ppt/slides/slide8.xml><?xml version="1.0" encoding="utf-8"?>
-<p:sld xmlns:a="http://schemas.openxmlformats.org/drawingml/2006/main" xmlns:r="http://schemas.openxmlformats.org/officeDocument/2006/relationships" xmlns:p="http://schemas.openxmlformats.org/presentationml/2006/main">
-  <p:cSld>
-    <p:spTree>
-      <p:nvGrpSpPr>
-        <p:cNvPr id="1" name="">
-          <a:extLst>
-            <a:ext uri="{FF2B5EF4-FFF2-40B4-BE49-F238E27FC236}">
-              <a16:creationId xmlns:a16="http://schemas.microsoft.com/office/drawing/2014/main" id="{FFDFDF42-C6CE-BF01-7B47-123D549E6D89}"/>
-            </a:ext>
-          </a:extLst>
-        </p:cNvPr>
-        <p:cNvGrpSpPr/>
-        <p:nvPr/>
-      </p:nvGrpSpPr>
-      <p:grpSpPr>
-        <a:xfrm>
-          <a:off x="0" y="0"/>
-          <a:ext cx="0" cy="0"/>
-          <a:chOff x="0" y="0"/>
-          <a:chExt cx="0" cy="0"/>
-        </a:xfrm>
-      </p:grpSpPr>
-      <p:sp>
-        <p:nvSpPr>
-          <p:cNvPr id="2" name="Title 1">
-            <a:extLst>
-              <a:ext uri="{FF2B5EF4-FFF2-40B4-BE49-F238E27FC236}">
-                <a16:creationId xmlns:a16="http://schemas.microsoft.com/office/drawing/2014/main" id="{B592266B-7FD4-3EDF-BD94-A682E8BEF37C}"/>
-              </a:ext>
-            </a:extLst>
-          </p:cNvPr>
-          <p:cNvSpPr>
-            <a:spLocks noGrp="1"/>
-          </p:cNvSpPr>
-          <p:nvPr>
-            <p:ph type="title"/>
-          </p:nvPr>
-        </p:nvSpPr>
-        <p:spPr>
-          <a:xfrm>
-            <a:off x="457201" y="342197"/>
-            <a:ext cx="8229600" cy="1143000"/>
-          </a:xfrm>
-          <a:solidFill>
-            <a:schemeClr val="accent4">
-              <a:lumMod val="20000"/>
-              <a:lumOff val="80000"/>
-            </a:schemeClr>
-          </a:solidFill>
-        </p:spPr>
-        <p:txBody>
-          <a:bodyPr/>
-          <a:lstStyle/>
-          <a:p>
-            <a:endParaRPr lang="en-IN" dirty="0"/>
-          </a:p>
-        </p:txBody>
-      </p:sp>
-      <p:sp>
-        <p:nvSpPr>
-          <p:cNvPr id="4" name="TextBox 3">
-            <a:extLst>
-              <a:ext uri="{FF2B5EF4-FFF2-40B4-BE49-F238E27FC236}">
-                <a16:creationId xmlns:a16="http://schemas.microsoft.com/office/drawing/2014/main" id="{F3B5F22B-19A1-91DC-1CE4-8E69B09A141C}"/>
-              </a:ext>
-            </a:extLst>
-          </p:cNvPr>
-          <p:cNvSpPr txBox="1"/>
-          <p:nvPr/>
-        </p:nvSpPr>
-        <p:spPr>
-          <a:xfrm>
-            <a:off x="457201" y="1773455"/>
-            <a:ext cx="4018548" cy="2585323"/>
-          </a:xfrm>
-          <a:prstGeom prst="rect">
-            <a:avLst/>
-          </a:prstGeom>
-          <a:solidFill>
-            <a:schemeClr val="bg2">
-              <a:lumMod val="90000"/>
-            </a:schemeClr>
-          </a:solidFill>
-        </p:spPr>
-        <p:txBody>
-          <a:bodyPr wrap="square" rtlCol="0">
-            <a:spAutoFit/>
-          </a:bodyPr>
-          <a:lstStyle/>
-          <a:p>
-            <a:endParaRPr lang="en-US" dirty="0"/>
-          </a:p>
-          <a:p>
-            <a:endParaRPr lang="en-IN" dirty="0"/>
-          </a:p>
-          <a:p>
-            <a:endParaRPr lang="en-IN" dirty="0"/>
-          </a:p>
-          <a:p>
-            <a:endParaRPr lang="en-IN" dirty="0"/>
-          </a:p>
-          <a:p>
-            <a:pPr algn="ctr"/>
-            <a:r>
-              <a:rPr lang="en-IN" dirty="0"/>
-              <a:t>4</a:t>
-            </a:r>
-          </a:p>
-          <a:p>
-            <a:pPr algn="ctr"/>
-            <a:endParaRPr lang="en-IN" dirty="0"/>
-          </a:p>
-          <a:p>
-            <a:pPr algn="ctr"/>
-            <a:endParaRPr lang="en-IN" dirty="0"/>
-          </a:p>
-          <a:p>
-            <a:pPr algn="ctr"/>
-            <a:endParaRPr lang="en-IN" dirty="0"/>
-          </a:p>
-          <a:p>
-            <a:pPr algn="ctr"/>
-            <a:endParaRPr lang="en-IN" dirty="0"/>
-          </a:p>
-        </p:txBody>
-      </p:sp>
-      <p:sp>
-        <p:nvSpPr>
-          <p:cNvPr id="5" name="TextBox 4">
-            <a:extLst>
-              <a:ext uri="{FF2B5EF4-FFF2-40B4-BE49-F238E27FC236}">
-                <a16:creationId xmlns:a16="http://schemas.microsoft.com/office/drawing/2014/main" id="{32E22864-B8B4-8540-9C62-B470F732F775}"/>
-              </a:ext>
-            </a:extLst>
-          </p:cNvPr>
-          <p:cNvSpPr txBox="1"/>
-          <p:nvPr/>
-        </p:nvSpPr>
-        <p:spPr>
-          <a:xfrm>
-            <a:off x="4668253" y="1773455"/>
-            <a:ext cx="4018548" cy="2585323"/>
-          </a:xfrm>
-          <a:prstGeom prst="rect">
-            <a:avLst/>
-          </a:prstGeom>
-          <a:solidFill>
-            <a:schemeClr val="accent3">
-              <a:lumMod val="40000"/>
-              <a:lumOff val="60000"/>
-            </a:schemeClr>
-          </a:solidFill>
-        </p:spPr>
-        <p:txBody>
-          <a:bodyPr wrap="square" rtlCol="0">
-            <a:spAutoFit/>
-          </a:bodyPr>
-          <a:lstStyle/>
-          <a:p>
-            <a:endParaRPr lang="en-US" dirty="0"/>
-          </a:p>
-          <a:p>
-            <a:endParaRPr lang="en-IN" dirty="0"/>
-          </a:p>
-          <a:p>
-            <a:endParaRPr lang="en-IN" dirty="0"/>
-          </a:p>
-          <a:p>
-            <a:endParaRPr lang="en-IN" dirty="0"/>
-          </a:p>
-          <a:p>
-            <a:pPr algn="ctr"/>
-            <a:r>
-              <a:rPr lang="en-IN" dirty="0"/>
-              <a:t>4</a:t>
-            </a:r>
-          </a:p>
-          <a:p>
-            <a:pPr algn="ctr"/>
-            <a:endParaRPr lang="en-IN" dirty="0"/>
-          </a:p>
-          <a:p>
-            <a:pPr algn="ctr"/>
-            <a:endParaRPr lang="en-IN" dirty="0"/>
-          </a:p>
-          <a:p>
-            <a:pPr algn="ctr"/>
-            <a:endParaRPr lang="en-IN" dirty="0"/>
-          </a:p>
-          <a:p>
-            <a:pPr algn="ctr"/>
-            <a:endParaRPr lang="en-IN" dirty="0"/>
-          </a:p>
-        </p:txBody>
-      </p:sp>
-      <p:sp>
-        <p:nvSpPr>
-          <p:cNvPr id="6" name="TextBox 5">
-            <a:extLst>
-              <a:ext uri="{FF2B5EF4-FFF2-40B4-BE49-F238E27FC236}">
-                <a16:creationId xmlns:a16="http://schemas.microsoft.com/office/drawing/2014/main" id="{5CA7B43E-1916-766A-5812-E07D940397D9}"/>
-              </a:ext>
-            </a:extLst>
-          </p:cNvPr>
-          <p:cNvSpPr txBox="1"/>
-          <p:nvPr/>
-        </p:nvSpPr>
-        <p:spPr>
-          <a:xfrm>
-            <a:off x="457201" y="4560576"/>
-            <a:ext cx="8229600" cy="2031325"/>
-          </a:xfrm>
-          <a:prstGeom prst="rect">
-            <a:avLst/>
-          </a:prstGeom>
-          <a:solidFill>
-            <a:schemeClr val="accent1">
-              <a:lumMod val="20000"/>
-              <a:lumOff val="80000"/>
-            </a:schemeClr>
-          </a:solidFill>
-        </p:spPr>
-        <p:txBody>
-          <a:bodyPr wrap="square" rtlCol="0">
-            <a:spAutoFit/>
-          </a:bodyPr>
-          <a:lstStyle/>
-          <a:p>
-            <a:endParaRPr lang="en-US" dirty="0"/>
-          </a:p>
-          <a:p>
-            <a:endParaRPr lang="en-IN" dirty="0"/>
-          </a:p>
-          <a:p>
-            <a:endParaRPr lang="en-IN" dirty="0"/>
-          </a:p>
-          <a:p>
-            <a:pPr algn="ctr"/>
-            <a:r>
-              <a:rPr lang="en-IN" dirty="0"/>
-              <a:t>2</a:t>
-            </a:r>
-          </a:p>
-          <a:p>
-            <a:pPr algn="ctr"/>
-            <a:endParaRPr lang="en-IN" dirty="0"/>
-          </a:p>
-          <a:p>
-            <a:pPr algn="ctr"/>
-            <a:endParaRPr lang="en-IN" dirty="0"/>
-          </a:p>
-          <a:p>
-            <a:pPr algn="ctr"/>
-            <a:endParaRPr lang="en-IN" dirty="0"/>
-          </a:p>
-        </p:txBody>
-      </p:sp>
-    </p:spTree>
-    <p:extLst>
-      <p:ext uri="{BB962C8B-B14F-4D97-AF65-F5344CB8AC3E}">
-        <p14:creationId xmlns:p14="http://schemas.microsoft.com/office/powerpoint/2010/main" val="1510992311"/>
-      </p:ext>
-    </p:extLst>
-  </p:cSld>
-  <p:clrMapOvr>
-    <a:masterClrMapping/>
-  </p:clrMapOvr>
-</p:sld>
-</file>
-
-<file path=ppt/slides/slide9.xml><?xml version="1.0" encoding="utf-8"?>
-<p:sld xmlns:a="http://schemas.openxmlformats.org/drawingml/2006/main" xmlns:r="http://schemas.openxmlformats.org/officeDocument/2006/relationships" xmlns:p="http://schemas.openxmlformats.org/presentationml/2006/main">
-  <p:cSld>
-    <p:spTree>
-      <p:nvGrpSpPr>
-        <p:cNvPr id="1" name="">
-          <a:extLst>
-            <a:ext uri="{FF2B5EF4-FFF2-40B4-BE49-F238E27FC236}">
-              <a16:creationId xmlns:a16="http://schemas.microsoft.com/office/drawing/2014/main" id="{BBEEFF21-0D5F-E202-31AD-F104DDD23124}"/>
-            </a:ext>
-          </a:extLst>
-        </p:cNvPr>
-        <p:cNvGrpSpPr/>
-        <p:nvPr/>
-      </p:nvGrpSpPr>
-      <p:grpSpPr>
-        <a:xfrm>
-          <a:off x="0" y="0"/>
-          <a:ext cx="0" cy="0"/>
-          <a:chOff x="0" y="0"/>
-          <a:chExt cx="0" cy="0"/>
-        </a:xfrm>
-      </p:grpSpPr>
-      <p:sp>
-        <p:nvSpPr>
-          <p:cNvPr id="2" name="Title 1">
-            <a:extLst>
-              <a:ext uri="{FF2B5EF4-FFF2-40B4-BE49-F238E27FC236}">
-                <a16:creationId xmlns:a16="http://schemas.microsoft.com/office/drawing/2014/main" id="{1C9B8325-94FC-D64E-5049-E2359FE8CF8B}"/>
-              </a:ext>
-            </a:extLst>
-          </p:cNvPr>
-          <p:cNvSpPr>
-            <a:spLocks noGrp="1"/>
-          </p:cNvSpPr>
-          <p:nvPr>
-            <p:ph type="title"/>
-          </p:nvPr>
-        </p:nvSpPr>
-        <p:spPr>
-          <a:xfrm>
-            <a:off x="457201" y="342197"/>
-            <a:ext cx="8229600" cy="1143000"/>
-          </a:xfrm>
-          <a:solidFill>
-            <a:schemeClr val="accent4">
-              <a:lumMod val="20000"/>
-              <a:lumOff val="80000"/>
-            </a:schemeClr>
-          </a:solidFill>
-        </p:spPr>
-        <p:txBody>
-          <a:bodyPr/>
-          <a:lstStyle/>
-          <a:p>
-            <a:endParaRPr lang="en-IN" dirty="0"/>
-          </a:p>
-        </p:txBody>
-      </p:sp>
-      <p:sp>
-        <p:nvSpPr>
-          <p:cNvPr id="4" name="TextBox 3">
-            <a:extLst>
-              <a:ext uri="{FF2B5EF4-FFF2-40B4-BE49-F238E27FC236}">
-                <a16:creationId xmlns:a16="http://schemas.microsoft.com/office/drawing/2014/main" id="{8704BC89-9F00-31E8-0011-D0B964AA0E9E}"/>
-              </a:ext>
-            </a:extLst>
-          </p:cNvPr>
-          <p:cNvSpPr txBox="1"/>
-          <p:nvPr/>
-        </p:nvSpPr>
-        <p:spPr>
-          <a:xfrm>
-            <a:off x="457199" y="3930480"/>
-            <a:ext cx="4018548" cy="2585323"/>
-          </a:xfrm>
-          <a:prstGeom prst="rect">
-            <a:avLst/>
-          </a:prstGeom>
-          <a:solidFill>
-            <a:schemeClr val="bg2">
-              <a:lumMod val="90000"/>
-            </a:schemeClr>
-          </a:solidFill>
-        </p:spPr>
-        <p:txBody>
-          <a:bodyPr wrap="square" rtlCol="0">
-            <a:spAutoFit/>
-          </a:bodyPr>
-          <a:lstStyle/>
-          <a:p>
-            <a:endParaRPr lang="en-US" dirty="0"/>
-          </a:p>
-          <a:p>
-            <a:endParaRPr lang="en-IN" dirty="0"/>
-          </a:p>
-          <a:p>
-            <a:endParaRPr lang="en-IN" dirty="0"/>
-          </a:p>
-          <a:p>
-            <a:endParaRPr lang="en-IN" dirty="0"/>
-          </a:p>
-          <a:p>
-            <a:endParaRPr lang="en-IN" dirty="0"/>
-          </a:p>
-          <a:p>
-            <a:endParaRPr lang="en-IN" dirty="0"/>
-          </a:p>
-          <a:p>
-            <a:endParaRPr lang="en-IN" dirty="0"/>
-          </a:p>
-          <a:p>
-            <a:endParaRPr lang="en-IN" dirty="0"/>
-          </a:p>
-          <a:p>
-            <a:r>
-              <a:rPr lang="en-IN" dirty="0"/>
-              <a:t>4</a:t>
-            </a:r>
-          </a:p>
-        </p:txBody>
-      </p:sp>
-      <p:sp>
-        <p:nvSpPr>
-          <p:cNvPr id="5" name="TextBox 4">
-            <a:extLst>
-              <a:ext uri="{FF2B5EF4-FFF2-40B4-BE49-F238E27FC236}">
-                <a16:creationId xmlns:a16="http://schemas.microsoft.com/office/drawing/2014/main" id="{4979A15B-410F-B454-3CDD-D285ED4A0A2F}"/>
-              </a:ext>
-            </a:extLst>
-          </p:cNvPr>
-          <p:cNvSpPr txBox="1"/>
-          <p:nvPr/>
-        </p:nvSpPr>
-        <p:spPr>
-          <a:xfrm>
-            <a:off x="4668253" y="3930479"/>
-            <a:ext cx="4018548" cy="2585323"/>
-          </a:xfrm>
-          <a:prstGeom prst="rect">
-            <a:avLst/>
-          </a:prstGeom>
-          <a:solidFill>
-            <a:schemeClr val="accent3">
-              <a:lumMod val="40000"/>
-              <a:lumOff val="60000"/>
-            </a:schemeClr>
-          </a:solidFill>
-        </p:spPr>
-        <p:txBody>
-          <a:bodyPr wrap="square" rtlCol="0">
-            <a:spAutoFit/>
-          </a:bodyPr>
-          <a:lstStyle/>
-          <a:p>
-            <a:endParaRPr lang="en-US" dirty="0"/>
-          </a:p>
-          <a:p>
-            <a:endParaRPr lang="en-IN" dirty="0"/>
-          </a:p>
-          <a:p>
-            <a:endParaRPr lang="en-IN" dirty="0"/>
-          </a:p>
-          <a:p>
-            <a:endParaRPr lang="en-IN" dirty="0"/>
-          </a:p>
-          <a:p>
-            <a:endParaRPr lang="en-IN" dirty="0"/>
-          </a:p>
-          <a:p>
-            <a:endParaRPr lang="en-IN" dirty="0"/>
-          </a:p>
-          <a:p>
-            <a:endParaRPr lang="en-IN" dirty="0"/>
-          </a:p>
-          <a:p>
-            <a:endParaRPr lang="en-IN" dirty="0"/>
-          </a:p>
-          <a:p>
-            <a:r>
-              <a:rPr lang="en-IN" dirty="0"/>
-              <a:t>4</a:t>
-            </a:r>
-          </a:p>
-        </p:txBody>
-      </p:sp>
-      <p:sp>
-        <p:nvSpPr>
-          <p:cNvPr id="6" name="TextBox 5">
-            <a:extLst>
-              <a:ext uri="{FF2B5EF4-FFF2-40B4-BE49-F238E27FC236}">
-                <a16:creationId xmlns:a16="http://schemas.microsoft.com/office/drawing/2014/main" id="{B1FE7197-7B6F-5962-7371-1686FB6F2CBA}"/>
-              </a:ext>
-            </a:extLst>
-          </p:cNvPr>
-          <p:cNvSpPr txBox="1"/>
-          <p:nvPr/>
-        </p:nvSpPr>
-        <p:spPr>
-          <a:xfrm>
-            <a:off x="457201" y="1692175"/>
-            <a:ext cx="8229600" cy="2031325"/>
-          </a:xfrm>
-          <a:prstGeom prst="rect">
-            <a:avLst/>
-          </a:prstGeom>
-          <a:solidFill>
-            <a:schemeClr val="accent1">
-              <a:lumMod val="20000"/>
-              <a:lumOff val="80000"/>
-            </a:schemeClr>
-          </a:solidFill>
-        </p:spPr>
-        <p:txBody>
-          <a:bodyPr wrap="square" rtlCol="0">
-            <a:spAutoFit/>
-          </a:bodyPr>
-          <a:lstStyle/>
-          <a:p>
-            <a:endParaRPr lang="en-US" dirty="0"/>
-          </a:p>
-          <a:p>
-            <a:endParaRPr lang="en-IN" dirty="0"/>
-          </a:p>
-          <a:p>
-            <a:endParaRPr lang="en-IN" dirty="0"/>
-          </a:p>
-          <a:p>
-            <a:endParaRPr lang="en-IN" dirty="0"/>
-          </a:p>
-          <a:p>
-            <a:endParaRPr lang="en-IN" dirty="0"/>
-          </a:p>
-          <a:p>
-            <a:endParaRPr lang="en-IN" dirty="0"/>
-          </a:p>
-          <a:p>
-            <a:r>
-              <a:rPr lang="en-IN" dirty="0"/>
-              <a:t>2</a:t>
-            </a:r>
-          </a:p>
-        </p:txBody>
-      </p:sp>
-    </p:spTree>
-    <p:extLst>
-      <p:ext uri="{BB962C8B-B14F-4D97-AF65-F5344CB8AC3E}">
-        <p14:creationId xmlns:p14="http://schemas.microsoft.com/office/powerpoint/2010/main" val="3541454463"/>
       </p:ext>
     </p:extLst>
   </p:cSld>

</xml_diff>